<commit_message>
update document transaction Section A
</commit_message>
<xml_diff>
--- a/docs/TransactionGuidances.pptx
+++ b/docs/TransactionGuidances.pptx
@@ -17,6 +17,13 @@
     <p:sldId id="264" r:id="rId12"/>
     <p:sldId id="265" r:id="rId13"/>
     <p:sldId id="266" r:id="rId14"/>
+    <p:sldId id="267" r:id="rId15"/>
+    <p:sldId id="268" r:id="rId16"/>
+    <p:sldId id="269" r:id="rId17"/>
+    <p:sldId id="270" r:id="rId18"/>
+    <p:sldId id="271" r:id="rId19"/>
+    <p:sldId id="272" r:id="rId20"/>
+    <p:sldId id="273" r:id="rId21"/>
   </p:sldIdLst>
   <p:sldSz cx="10080625" cy="7559675"/>
   <p:notesSz cx="7559675" cy="10691812"/>
@@ -3255,7 +3262,7 @@
                 </a:solidFill>
                 <a:latin typeface="Source Sans Pro Black"/>
               </a:rPr>
-              <a:t>&lt;date/time&gt;</a:t>
+              <a:t>Mon, July 1, 2019</a:t>
             </a:r>
             <a:endParaRPr b="1" lang="en-US" sz="1800" spc="-1" strike="noStrike">
               <a:solidFill>
@@ -3296,7 +3303,7 @@
                 </a:solidFill>
                 <a:latin typeface="Source Sans Pro Black"/>
               </a:rPr>
-              <a:t>&lt;footer&gt;</a:t>
+              <a:t> </a:t>
             </a:r>
             <a:endParaRPr b="1" lang="en-US" sz="1800" spc="-1" strike="noStrike">
               <a:solidFill>
@@ -3330,14 +3337,14 @@
           <a:bodyPr lIns="0" rIns="0" tIns="0" bIns="0" anchor="ctr"/>
           <a:p>
             <a:pPr algn="ctr"/>
-            <a:fld id="{416C46DB-9ECB-4D4D-9462-DCDBD05B38CD}" type="slidenum">
+            <a:fld id="{1F7A4339-BFE2-4714-BDE7-CC7DD00578B4}" type="slidenum">
               <a:rPr b="1" lang="en-US" sz="1800" spc="-1" strike="noStrike">
                 <a:solidFill>
                   <a:srgbClr val="ffffff"/>
                 </a:solidFill>
                 <a:latin typeface="Source Sans Pro Black"/>
               </a:rPr>
-              <a:t>&lt;number&gt;</a:t>
+              <a:t>16</a:t>
             </a:fld>
             <a:endParaRPr b="1" lang="en-US" sz="1800" spc="-1" strike="noStrike">
               <a:solidFill>
@@ -3661,7 +3668,7 @@
                 </a:solidFill>
                 <a:latin typeface="Source Sans Pro Black"/>
               </a:rPr>
-              <a:t>&lt;date/time&gt;</a:t>
+              <a:t> </a:t>
             </a:r>
             <a:endParaRPr b="1" lang="en-US" sz="1800" spc="-1" strike="noStrike">
               <a:solidFill>
@@ -3702,7 +3709,7 @@
                 </a:solidFill>
                 <a:latin typeface="Source Sans Pro Black"/>
               </a:rPr>
-              <a:t>&lt;footer&gt;</a:t>
+              <a:t> </a:t>
             </a:r>
             <a:endParaRPr b="1" lang="en-US" sz="1800" spc="-1" strike="noStrike">
               <a:solidFill>
@@ -3736,14 +3743,14 @@
           <a:bodyPr lIns="0" rIns="0" tIns="0" bIns="0"/>
           <a:p>
             <a:pPr algn="r"/>
-            <a:fld id="{56AAAE66-5653-4A47-9C9B-0FBA02FE383C}" type="slidenum">
+            <a:fld id="{45CE060C-ECED-475A-A8D2-FAC523031956}" type="slidenum">
               <a:rPr b="1" lang="en-US" sz="1800" spc="-1" strike="noStrike">
                 <a:solidFill>
                   <a:srgbClr val="e74c3c"/>
                 </a:solidFill>
                 <a:latin typeface="Source Sans Pro Black"/>
               </a:rPr>
-              <a:t>&lt;number&gt;</a:t>
+              <a:t>1</a:t>
             </a:fld>
             <a:endParaRPr b="1" lang="en-US" sz="1800" spc="-1" strike="noStrike">
               <a:solidFill>
@@ -3873,6 +3880,33 @@
       </p:sp>
     </p:spTree>
   </p:cSld>
+  <p:timing>
+    <p:tnLst>
+      <p:par>
+        <p:cTn id="1" dur="indefinite" restart="never" nodeType="tmRoot">
+          <p:childTnLst>
+            <p:seq>
+              <p:cTn id="2" dur="indefinite" nodeType="mainSeq"/>
+              <p:prevCondLst>
+                <p:cond delay="0" evt="onPrev">
+                  <p:tgtEl>
+                    <p:sldTgt/>
+                  </p:tgtEl>
+                </p:cond>
+              </p:prevCondLst>
+              <p:nextCondLst>
+                <p:cond delay="0" evt="onNext">
+                  <p:tgtEl>
+                    <p:sldTgt/>
+                  </p:tgtEl>
+                </p:cond>
+              </p:nextCondLst>
+            </p:seq>
+          </p:childTnLst>
+        </p:cTn>
+      </p:par>
+    </p:tnLst>
+  </p:timing>
 </p:sld>
 </file>
 
@@ -3895,7 +3929,7 @@
       </p:grpSpPr>
       <p:sp>
         <p:nvSpPr>
-          <p:cNvPr id="105" name="TextShape 1"/>
+          <p:cNvPr id="109" name="TextShape 1"/>
           <p:cNvSpPr txBox="1"/>
           <p:nvPr/>
         </p:nvSpPr>
@@ -3915,6 +3949,15 @@
         <p:txBody>
           <a:bodyPr lIns="0" rIns="0" tIns="0" bIns="0" anchor="b"/>
           <a:p>
+            <a:r>
+              <a:rPr b="1" lang="en-US" sz="3200" spc="-1" strike="noStrike">
+                <a:solidFill>
+                  <a:srgbClr val="ffffff"/>
+                </a:solidFill>
+                <a:latin typeface="Source Sans Pro Black"/>
+              </a:rPr>
+              <a:t>View – Section A - Search</a:t>
+            </a:r>
             <a:endParaRPr b="1" lang="en-US" sz="3200" spc="-1" strike="noStrike">
               <a:solidFill>
                 <a:srgbClr val="ffffff"/>
@@ -3926,13 +3969,13 @@
       </p:sp>
       <p:sp>
         <p:nvSpPr>
-          <p:cNvPr id="106" name="TextShape 2"/>
+          <p:cNvPr id="110" name="TextShape 2"/>
           <p:cNvSpPr txBox="1"/>
           <p:nvPr/>
         </p:nvSpPr>
         <p:spPr>
           <a:xfrm>
-            <a:off x="360000" y="1980000"/>
+            <a:off x="480600" y="1883880"/>
             <a:ext cx="9180000" cy="4680000"/>
           </a:xfrm>
           <a:prstGeom prst="rect">
@@ -3948,17 +3991,317 @@
             <a:normAutofit/>
           </a:bodyPr>
           <a:p>
-            <a:endParaRPr b="1" lang="en-US" sz="2600" spc="-1" strike="noStrike">
-              <a:solidFill>
-                <a:srgbClr val="1c1c1c"/>
-              </a:solidFill>
-              <a:latin typeface="Source Sans Pro Semibold"/>
-            </a:endParaRPr>
-          </a:p>
-        </p:txBody>
-      </p:sp>
+            <a:pPr>
+              <a:spcAft>
+                <a:spcPts val="1142"/>
+              </a:spcAft>
+            </a:pPr>
+            <a:r>
+              <a:rPr b="1" lang="en-US" sz="2600" spc="-1" strike="noStrike">
+                <a:solidFill>
+                  <a:srgbClr val="1c1c1c"/>
+                </a:solidFill>
+                <a:latin typeface="Source Sans Pro Semibold"/>
+              </a:rPr>
+              <a:t>1. Tambahkan Input untuk melakukan pencarian pada tabel barang</a:t>
+            </a:r>
+            <a:endParaRPr b="1" lang="en-US" sz="2600" spc="-1" strike="noStrike">
+              <a:solidFill>
+                <a:srgbClr val="1c1c1c"/>
+              </a:solidFill>
+              <a:latin typeface="Source Sans Pro Semibold"/>
+            </a:endParaRPr>
+          </a:p>
+          <a:p>
+            <a:pPr>
+              <a:spcAft>
+                <a:spcPts val="1142"/>
+              </a:spcAft>
+            </a:pPr>
+            <a:r>
+              <a:rPr b="1" lang="en-US" sz="2600" spc="-1" strike="noStrike">
+                <a:solidFill>
+                  <a:srgbClr val="1c1c1c"/>
+                </a:solidFill>
+                <a:latin typeface="Source Sans Pro Semibold"/>
+              </a:rPr>
+              <a:t> </a:t>
+            </a:r>
+            <a:endParaRPr b="1" lang="en-US" sz="2600" spc="-1" strike="noStrike">
+              <a:solidFill>
+                <a:srgbClr val="1c1c1c"/>
+              </a:solidFill>
+              <a:latin typeface="Source Sans Pro Semibold"/>
+            </a:endParaRPr>
+          </a:p>
+          <a:p>
+            <a:pPr>
+              <a:spcAft>
+                <a:spcPts val="1142"/>
+              </a:spcAft>
+            </a:pPr>
+            <a:r>
+              <a:rPr b="1" lang="en-US" sz="2600" spc="-1" strike="noStrike">
+                <a:solidFill>
+                  <a:srgbClr val="1c1c1c"/>
+                </a:solidFill>
+                <a:latin typeface="Source Sans Pro Semibold"/>
+              </a:rPr>
+              <a:t>2. </a:t>
+            </a:r>
+            <a:endParaRPr b="1" lang="en-US" sz="2600" spc="-1" strike="noStrike">
+              <a:solidFill>
+                <a:srgbClr val="1c1c1c"/>
+              </a:solidFill>
+              <a:latin typeface="Source Sans Pro Semibold"/>
+            </a:endParaRPr>
+          </a:p>
+          <a:p>
+            <a:pPr>
+              <a:spcAft>
+                <a:spcPts val="1142"/>
+              </a:spcAft>
+            </a:pPr>
+            <a:r>
+              <a:rPr b="1" lang="en-US" sz="1500" spc="-1" strike="noStrike">
+                <a:solidFill>
+                  <a:srgbClr val="1c1c1c"/>
+                </a:solidFill>
+                <a:latin typeface="Source Sans Pro Semibold"/>
+              </a:rPr>
+              <a:t>&lt;div class="form-group"&gt;</a:t>
+            </a:r>
+            <a:endParaRPr b="1" lang="en-US" sz="1500" spc="-1" strike="noStrike">
+              <a:solidFill>
+                <a:srgbClr val="1c1c1c"/>
+              </a:solidFill>
+              <a:latin typeface="Source Sans Pro Semibold"/>
+            </a:endParaRPr>
+          </a:p>
+          <a:p>
+            <a:pPr>
+              <a:spcAft>
+                <a:spcPts val="1142"/>
+              </a:spcAft>
+            </a:pPr>
+            <a:r>
+              <a:rPr b="1" lang="en-US" sz="1500" spc="-1" strike="noStrike">
+                <a:solidFill>
+                  <a:srgbClr val="1c1c1c"/>
+                </a:solidFill>
+                <a:latin typeface="Source Sans Pro Semibold"/>
+              </a:rPr>
+              <a:t>    </a:t>
+            </a:r>
+            <a:r>
+              <a:rPr b="1" lang="en-US" sz="1500" spc="-1" strike="noStrike">
+                <a:solidFill>
+                  <a:srgbClr val="1c1c1c"/>
+                </a:solidFill>
+                <a:latin typeface="Source Sans Pro Semibold"/>
+              </a:rPr>
+              <a:t>&lt;div class="col-sm-12"&gt;</a:t>
+            </a:r>
+            <a:endParaRPr b="1" lang="en-US" sz="1500" spc="-1" strike="noStrike">
+              <a:solidFill>
+                <a:srgbClr val="1c1c1c"/>
+              </a:solidFill>
+              <a:latin typeface="Source Sans Pro Semibold"/>
+            </a:endParaRPr>
+          </a:p>
+          <a:p>
+            <a:pPr>
+              <a:spcAft>
+                <a:spcPts val="1142"/>
+              </a:spcAft>
+            </a:pPr>
+            <a:r>
+              <a:rPr b="1" lang="en-US" sz="1500" spc="-1" strike="noStrike">
+                <a:solidFill>
+                  <a:srgbClr val="1c1c1c"/>
+                </a:solidFill>
+                <a:latin typeface="Source Sans Pro Semibold"/>
+              </a:rPr>
+              <a:t>      </a:t>
+            </a:r>
+            <a:r>
+              <a:rPr b="1" lang="en-US" sz="1500" spc="-1" strike="noStrike">
+                <a:solidFill>
+                  <a:srgbClr val="1c1c1c"/>
+                </a:solidFill>
+                <a:latin typeface="Source Sans Pro Semibold"/>
+              </a:rPr>
+              <a:t>&lt;input type="text" class="form-control" id="idcari" placeholder="Cari"&gt;</a:t>
+            </a:r>
+            <a:endParaRPr b="1" lang="en-US" sz="1500" spc="-1" strike="noStrike">
+              <a:solidFill>
+                <a:srgbClr val="1c1c1c"/>
+              </a:solidFill>
+              <a:latin typeface="Source Sans Pro Semibold"/>
+            </a:endParaRPr>
+          </a:p>
+          <a:p>
+            <a:pPr>
+              <a:spcAft>
+                <a:spcPts val="1142"/>
+              </a:spcAft>
+            </a:pPr>
+            <a:r>
+              <a:rPr b="1" lang="en-US" sz="1500" spc="-1" strike="noStrike">
+                <a:solidFill>
+                  <a:srgbClr val="1c1c1c"/>
+                </a:solidFill>
+                <a:latin typeface="Source Sans Pro Semibold"/>
+              </a:rPr>
+              <a:t>    </a:t>
+            </a:r>
+            <a:r>
+              <a:rPr b="1" lang="en-US" sz="1500" spc="-1" strike="noStrike">
+                <a:solidFill>
+                  <a:srgbClr val="1c1c1c"/>
+                </a:solidFill>
+                <a:latin typeface="Source Sans Pro Semibold"/>
+              </a:rPr>
+              <a:t>&lt;/div&gt;</a:t>
+            </a:r>
+            <a:endParaRPr b="1" lang="en-US" sz="1500" spc="-1" strike="noStrike">
+              <a:solidFill>
+                <a:srgbClr val="1c1c1c"/>
+              </a:solidFill>
+              <a:latin typeface="Source Sans Pro Semibold"/>
+            </a:endParaRPr>
+          </a:p>
+          <a:p>
+            <a:pPr>
+              <a:spcAft>
+                <a:spcPts val="1142"/>
+              </a:spcAft>
+            </a:pPr>
+            <a:r>
+              <a:rPr b="1" lang="en-US" sz="1500" spc="-1" strike="noStrike">
+                <a:solidFill>
+                  <a:srgbClr val="1c1c1c"/>
+                </a:solidFill>
+                <a:latin typeface="Source Sans Pro Semibold"/>
+              </a:rPr>
+              <a:t>  </a:t>
+            </a:r>
+            <a:r>
+              <a:rPr b="1" lang="en-US" sz="1500" spc="-1" strike="noStrike">
+                <a:solidFill>
+                  <a:srgbClr val="1c1c1c"/>
+                </a:solidFill>
+                <a:latin typeface="Source Sans Pro Semibold"/>
+              </a:rPr>
+              <a:t>&lt;/div&gt;</a:t>
+            </a:r>
+            <a:endParaRPr b="1" lang="en-US" sz="1500" spc="-1" strike="noStrike">
+              <a:solidFill>
+                <a:srgbClr val="1c1c1c"/>
+              </a:solidFill>
+              <a:latin typeface="Source Sans Pro Semibold"/>
+            </a:endParaRPr>
+          </a:p>
+          <a:p>
+            <a:pPr>
+              <a:spcAft>
+                <a:spcPts val="1142"/>
+              </a:spcAft>
+            </a:pPr>
+            <a:r>
+              <a:rPr b="1" lang="en-US" sz="2600" spc="-1" strike="noStrike">
+                <a:solidFill>
+                  <a:srgbClr val="1c1c1c"/>
+                </a:solidFill>
+                <a:latin typeface="Source Sans Pro Semibold"/>
+              </a:rPr>
+              <a:t> </a:t>
+            </a:r>
+            <a:endParaRPr b="1" lang="en-US" sz="2600" spc="-1" strike="noStrike">
+              <a:solidFill>
+                <a:srgbClr val="1c1c1c"/>
+              </a:solidFill>
+              <a:latin typeface="Source Sans Pro Semibold"/>
+            </a:endParaRPr>
+          </a:p>
+          <a:p>
+            <a:pPr>
+              <a:spcAft>
+                <a:spcPts val="1142"/>
+              </a:spcAft>
+            </a:pPr>
+            <a:r>
+              <a:rPr b="1" lang="en-US" sz="2600" spc="-1" strike="noStrike">
+                <a:solidFill>
+                  <a:srgbClr val="1c1c1c"/>
+                </a:solidFill>
+                <a:latin typeface="Source Sans Pro Semibold"/>
+              </a:rPr>
+              <a:t> </a:t>
+            </a:r>
+            <a:endParaRPr b="1" lang="en-US" sz="2600" spc="-1" strike="noStrike">
+              <a:solidFill>
+                <a:srgbClr val="1c1c1c"/>
+              </a:solidFill>
+              <a:latin typeface="Source Sans Pro Semibold"/>
+            </a:endParaRPr>
+          </a:p>
+        </p:txBody>
+      </p:sp>
+      <p:pic>
+        <p:nvPicPr>
+          <p:cNvPr id="111" name="" descr=""/>
+          <p:cNvPicPr/>
+          <p:nvPr/>
+        </p:nvPicPr>
+        <p:blipFill>
+          <a:blip r:embed="rId1"/>
+          <a:stretch/>
+        </p:blipFill>
+        <p:spPr>
+          <a:xfrm>
+            <a:off x="3474720" y="2743200"/>
+            <a:ext cx="5534280" cy="822960"/>
+          </a:xfrm>
+          <a:prstGeom prst="rect">
+            <a:avLst/>
+          </a:prstGeom>
+          <a:ln>
+            <a:solidFill>
+              <a:srgbClr val="ce181e"/>
+            </a:solidFill>
+          </a:ln>
+        </p:spPr>
+      </p:pic>
     </p:spTree>
   </p:cSld>
+  <p:timing>
+    <p:tnLst>
+      <p:par>
+        <p:cTn id="19" dur="indefinite" restart="never" nodeType="tmRoot">
+          <p:childTnLst>
+            <p:seq>
+              <p:cTn id="20" dur="indefinite" nodeType="mainSeq"/>
+              <p:prevCondLst>
+                <p:cond delay="0" evt="onPrev">
+                  <p:tgtEl>
+                    <p:sldTgt/>
+                  </p:tgtEl>
+                </p:cond>
+              </p:prevCondLst>
+              <p:nextCondLst>
+                <p:cond delay="0" evt="onNext">
+                  <p:tgtEl>
+                    <p:sldTgt/>
+                  </p:tgtEl>
+                </p:cond>
+              </p:nextCondLst>
+            </p:seq>
+          </p:childTnLst>
+        </p:cTn>
+      </p:par>
+    </p:tnLst>
+  </p:timing>
 </p:sld>
 </file>
 
@@ -3981,7 +4324,7 @@
       </p:grpSpPr>
       <p:sp>
         <p:nvSpPr>
-          <p:cNvPr id="107" name="TextShape 1"/>
+          <p:cNvPr id="112" name="TextShape 1"/>
           <p:cNvSpPr txBox="1"/>
           <p:nvPr/>
         </p:nvSpPr>
@@ -4001,6 +4344,15 @@
         <p:txBody>
           <a:bodyPr lIns="0" rIns="0" tIns="0" bIns="0" anchor="b"/>
           <a:p>
+            <a:r>
+              <a:rPr b="1" lang="en-US" sz="3200" spc="-1" strike="noStrike">
+                <a:solidFill>
+                  <a:srgbClr val="ffffff"/>
+                </a:solidFill>
+                <a:latin typeface="Source Sans Pro Black"/>
+              </a:rPr>
+              <a:t>View – List Barang</a:t>
+            </a:r>
             <a:endParaRPr b="1" lang="en-US" sz="3200" spc="-1" strike="noStrike">
               <a:solidFill>
                 <a:srgbClr val="ffffff"/>
@@ -4012,7 +4364,7 @@
       </p:sp>
       <p:sp>
         <p:nvSpPr>
-          <p:cNvPr id="108" name="TextShape 2"/>
+          <p:cNvPr id="113" name="TextShape 2"/>
           <p:cNvSpPr txBox="1"/>
           <p:nvPr/>
         </p:nvSpPr>
@@ -4034,17 +4386,2514 @@
             <a:normAutofit/>
           </a:bodyPr>
           <a:p>
-            <a:endParaRPr b="1" lang="en-US" sz="2600" spc="-1" strike="noStrike">
-              <a:solidFill>
-                <a:srgbClr val="1c1c1c"/>
-              </a:solidFill>
-              <a:latin typeface="Source Sans Pro Semibold"/>
-            </a:endParaRPr>
-          </a:p>
-        </p:txBody>
-      </p:sp>
+            <a:pPr>
+              <a:spcAft>
+                <a:spcPts val="1142"/>
+              </a:spcAft>
+            </a:pPr>
+            <a:r>
+              <a:rPr b="1" lang="en-US" sz="2600" spc="-1" strike="noStrike">
+                <a:solidFill>
+                  <a:srgbClr val="1c1c1c"/>
+                </a:solidFill>
+                <a:latin typeface="Source Sans Pro Semibold"/>
+              </a:rPr>
+              <a:t>1. Pembuatan section C, perlu tambahan method controller dan view html </a:t>
+            </a:r>
+            <a:endParaRPr b="1" lang="en-US" sz="2600" spc="-1" strike="noStrike">
+              <a:solidFill>
+                <a:srgbClr val="1c1c1c"/>
+              </a:solidFill>
+              <a:latin typeface="Source Sans Pro Semibold"/>
+            </a:endParaRPr>
+          </a:p>
+        </p:txBody>
+      </p:sp>
+      <p:pic>
+        <p:nvPicPr>
+          <p:cNvPr id="114" name="" descr=""/>
+          <p:cNvPicPr/>
+          <p:nvPr/>
+        </p:nvPicPr>
+        <p:blipFill>
+          <a:blip r:embed="rId1"/>
+          <a:stretch/>
+        </p:blipFill>
+        <p:spPr>
+          <a:xfrm>
+            <a:off x="2560320" y="2926080"/>
+            <a:ext cx="5943600" cy="3973320"/>
+          </a:xfrm>
+          <a:prstGeom prst="rect">
+            <a:avLst/>
+          </a:prstGeom>
+          <a:ln>
+            <a:noFill/>
+          </a:ln>
+        </p:spPr>
+      </p:pic>
     </p:spTree>
   </p:cSld>
+  <p:timing>
+    <p:tnLst>
+      <p:par>
+        <p:cTn id="21" dur="indefinite" restart="never" nodeType="tmRoot">
+          <p:childTnLst>
+            <p:seq>
+              <p:cTn id="22" dur="indefinite" nodeType="mainSeq"/>
+              <p:prevCondLst>
+                <p:cond delay="0" evt="onPrev">
+                  <p:tgtEl>
+                    <p:sldTgt/>
+                  </p:tgtEl>
+                </p:cond>
+              </p:prevCondLst>
+              <p:nextCondLst>
+                <p:cond delay="0" evt="onNext">
+                  <p:tgtEl>
+                    <p:sldTgt/>
+                  </p:tgtEl>
+                </p:cond>
+              </p:nextCondLst>
+            </p:seq>
+          </p:childTnLst>
+        </p:cTn>
+      </p:par>
+    </p:tnLst>
+  </p:timing>
+</p:sld>
+</file>
+
+<file path=ppt/slides/slide12.xml><?xml version="1.0" encoding="utf-8"?>
+<p:sld xmlns:a="http://schemas.openxmlformats.org/drawingml/2006/main" xmlns:p="http://schemas.openxmlformats.org/presentationml/2006/main" xmlns:r="http://schemas.openxmlformats.org/officeDocument/2006/relationships" xmlns:p14="http://schemas.microsoft.com/office/powerpoint/2010/main" xmlns:p15="http://schemas.microsoft.com/office/powerpoint/2012/main" xmlns:mc="http://schemas.openxmlformats.org/markup-compatibility/2006">
+  <p:cSld>
+    <p:spTree>
+      <p:nvGrpSpPr>
+        <p:cNvPr id="1" name=""/>
+        <p:cNvGrpSpPr/>
+        <p:nvPr/>
+      </p:nvGrpSpPr>
+      <p:grpSpPr>
+        <a:xfrm>
+          <a:off x="0" y="0"/>
+          <a:ext cx="0" cy="0"/>
+          <a:chOff x="0" y="0"/>
+          <a:chExt cx="0" cy="0"/>
+        </a:xfrm>
+      </p:grpSpPr>
+      <p:sp>
+        <p:nvSpPr>
+          <p:cNvPr id="115" name="TextShape 1"/>
+          <p:cNvSpPr txBox="1"/>
+          <p:nvPr/>
+        </p:nvSpPr>
+        <p:spPr>
+          <a:xfrm>
+            <a:off x="360000" y="360000"/>
+            <a:ext cx="9360000" cy="900000"/>
+          </a:xfrm>
+          <a:prstGeom prst="rect">
+            <a:avLst/>
+          </a:prstGeom>
+          <a:noFill/>
+          <a:ln>
+            <a:noFill/>
+          </a:ln>
+        </p:spPr>
+        <p:txBody>
+          <a:bodyPr lIns="0" rIns="0" tIns="0" bIns="0" anchor="b"/>
+          <a:p>
+            <a:r>
+              <a:rPr b="1" lang="en-US" sz="3200" spc="-1" strike="noStrike">
+                <a:solidFill>
+                  <a:srgbClr val="ffffff"/>
+                </a:solidFill>
+                <a:latin typeface="Source Sans Pro Black"/>
+              </a:rPr>
+              <a:t>View – List Barang</a:t>
+            </a:r>
+            <a:endParaRPr b="1" lang="en-US" sz="3200" spc="-1" strike="noStrike">
+              <a:solidFill>
+                <a:srgbClr val="ffffff"/>
+              </a:solidFill>
+              <a:latin typeface="Source Sans Pro Black"/>
+            </a:endParaRPr>
+          </a:p>
+        </p:txBody>
+      </p:sp>
+      <p:sp>
+        <p:nvSpPr>
+          <p:cNvPr id="116" name="TextShape 2"/>
+          <p:cNvSpPr txBox="1"/>
+          <p:nvPr/>
+        </p:nvSpPr>
+        <p:spPr>
+          <a:xfrm>
+            <a:off x="360000" y="1980000"/>
+            <a:ext cx="9180000" cy="4680000"/>
+          </a:xfrm>
+          <a:prstGeom prst="rect">
+            <a:avLst/>
+          </a:prstGeom>
+          <a:noFill/>
+          <a:ln>
+            <a:noFill/>
+          </a:ln>
+        </p:spPr>
+        <p:txBody>
+          <a:bodyPr lIns="0" rIns="0" tIns="0" bIns="0">
+            <a:normAutofit/>
+          </a:bodyPr>
+          <a:p>
+            <a:pPr>
+              <a:spcAft>
+                <a:spcPts val="1142"/>
+              </a:spcAft>
+            </a:pPr>
+            <a:r>
+              <a:rPr b="1" lang="en-US" sz="2600" spc="-1" strike="noStrike">
+                <a:solidFill>
+                  <a:srgbClr val="1c1c1c"/>
+                </a:solidFill>
+                <a:latin typeface="Source Sans Pro Semibold"/>
+              </a:rPr>
+              <a:t>1. Tambahkan tag div untuk menaruh list barang, tambahkan attribute id </a:t>
+            </a:r>
+            <a:endParaRPr b="1" lang="en-US" sz="2600" spc="-1" strike="noStrike">
+              <a:solidFill>
+                <a:srgbClr val="1c1c1c"/>
+              </a:solidFill>
+              <a:latin typeface="Source Sans Pro Semibold"/>
+            </a:endParaRPr>
+          </a:p>
+          <a:p>
+            <a:pPr>
+              <a:spcAft>
+                <a:spcPts val="1142"/>
+              </a:spcAft>
+            </a:pPr>
+            <a:r>
+              <a:rPr b="1" lang="en-US" sz="2600" spc="-1" strike="noStrike">
+                <a:solidFill>
+                  <a:srgbClr val="1c1c1c"/>
+                </a:solidFill>
+                <a:latin typeface="Source Sans Pro Semibold"/>
+              </a:rPr>
+              <a:t>2. Tambahkan tag script sebelum close tag body</a:t>
+            </a:r>
+            <a:endParaRPr b="1" lang="en-US" sz="2600" spc="-1" strike="noStrike">
+              <a:solidFill>
+                <a:srgbClr val="1c1c1c"/>
+              </a:solidFill>
+              <a:latin typeface="Source Sans Pro Semibold"/>
+            </a:endParaRPr>
+          </a:p>
+          <a:p>
+            <a:pPr>
+              <a:spcAft>
+                <a:spcPts val="1142"/>
+              </a:spcAft>
+            </a:pPr>
+            <a:r>
+              <a:rPr b="1" lang="en-US" sz="2600" spc="-1" strike="noStrike">
+                <a:solidFill>
+                  <a:srgbClr val="1c1c1c"/>
+                </a:solidFill>
+                <a:latin typeface="Source Sans Pro Semibold"/>
+              </a:rPr>
+              <a:t>3. Didalam tag script – gunakan jquery, pada saat document ready panggil method listbarangtransaction dgn ajax, untuk list barang pada transactionController</a:t>
+            </a:r>
+            <a:endParaRPr b="1" lang="en-US" sz="2600" spc="-1" strike="noStrike">
+              <a:solidFill>
+                <a:srgbClr val="1c1c1c"/>
+              </a:solidFill>
+              <a:latin typeface="Source Sans Pro Semibold"/>
+            </a:endParaRPr>
+          </a:p>
+          <a:p>
+            <a:pPr>
+              <a:spcAft>
+                <a:spcPts val="1142"/>
+              </a:spcAft>
+            </a:pPr>
+            <a:r>
+              <a:rPr b="1" lang="en-US" sz="2600" spc="-1" strike="noStrike">
+                <a:solidFill>
+                  <a:srgbClr val="1c1c1c"/>
+                </a:solidFill>
+                <a:latin typeface="Source Sans Pro Semibold"/>
+              </a:rPr>
+              <a:t>4. Buka controller transactioncontroller</a:t>
+            </a:r>
+            <a:endParaRPr b="1" lang="en-US" sz="2600" spc="-1" strike="noStrike">
+              <a:solidFill>
+                <a:srgbClr val="1c1c1c"/>
+              </a:solidFill>
+              <a:latin typeface="Source Sans Pro Semibold"/>
+            </a:endParaRPr>
+          </a:p>
+        </p:txBody>
+      </p:sp>
+    </p:spTree>
+  </p:cSld>
+  <p:timing>
+    <p:tnLst>
+      <p:par>
+        <p:cTn id="23" dur="indefinite" restart="never" nodeType="tmRoot">
+          <p:childTnLst>
+            <p:seq>
+              <p:cTn id="24" dur="indefinite" nodeType="mainSeq"/>
+              <p:prevCondLst>
+                <p:cond delay="0" evt="onPrev">
+                  <p:tgtEl>
+                    <p:sldTgt/>
+                  </p:tgtEl>
+                </p:cond>
+              </p:prevCondLst>
+              <p:nextCondLst>
+                <p:cond delay="0" evt="onNext">
+                  <p:tgtEl>
+                    <p:sldTgt/>
+                  </p:tgtEl>
+                </p:cond>
+              </p:nextCondLst>
+            </p:seq>
+          </p:childTnLst>
+        </p:cTn>
+      </p:par>
+    </p:tnLst>
+  </p:timing>
+</p:sld>
+</file>
+
+<file path=ppt/slides/slide13.xml><?xml version="1.0" encoding="utf-8"?>
+<p:sld xmlns:a="http://schemas.openxmlformats.org/drawingml/2006/main" xmlns:p="http://schemas.openxmlformats.org/presentationml/2006/main" xmlns:r="http://schemas.openxmlformats.org/officeDocument/2006/relationships" xmlns:p14="http://schemas.microsoft.com/office/powerpoint/2010/main" xmlns:p15="http://schemas.microsoft.com/office/powerpoint/2012/main" xmlns:mc="http://schemas.openxmlformats.org/markup-compatibility/2006">
+  <p:cSld>
+    <p:spTree>
+      <p:nvGrpSpPr>
+        <p:cNvPr id="1" name=""/>
+        <p:cNvGrpSpPr/>
+        <p:nvPr/>
+      </p:nvGrpSpPr>
+      <p:grpSpPr>
+        <a:xfrm>
+          <a:off x="0" y="0"/>
+          <a:ext cx="0" cy="0"/>
+          <a:chOff x="0" y="0"/>
+          <a:chExt cx="0" cy="0"/>
+        </a:xfrm>
+      </p:grpSpPr>
+      <p:sp>
+        <p:nvSpPr>
+          <p:cNvPr id="117" name="TextShape 1"/>
+          <p:cNvSpPr txBox="1"/>
+          <p:nvPr/>
+        </p:nvSpPr>
+        <p:spPr>
+          <a:xfrm>
+            <a:off x="360000" y="360000"/>
+            <a:ext cx="9360000" cy="900000"/>
+          </a:xfrm>
+          <a:prstGeom prst="rect">
+            <a:avLst/>
+          </a:prstGeom>
+          <a:noFill/>
+          <a:ln>
+            <a:noFill/>
+          </a:ln>
+        </p:spPr>
+        <p:txBody>
+          <a:bodyPr lIns="0" rIns="0" tIns="0" bIns="0" anchor="b"/>
+          <a:p>
+            <a:r>
+              <a:rPr b="1" lang="en-US" sz="3200" spc="-1" strike="noStrike">
+                <a:solidFill>
+                  <a:srgbClr val="ffffff"/>
+                </a:solidFill>
+                <a:latin typeface="Source Sans Pro Black"/>
+              </a:rPr>
+              <a:t>Controller – list barang</a:t>
+            </a:r>
+            <a:endParaRPr b="1" lang="en-US" sz="3200" spc="-1" strike="noStrike">
+              <a:solidFill>
+                <a:srgbClr val="ffffff"/>
+              </a:solidFill>
+              <a:latin typeface="Source Sans Pro Black"/>
+            </a:endParaRPr>
+          </a:p>
+        </p:txBody>
+      </p:sp>
+      <p:sp>
+        <p:nvSpPr>
+          <p:cNvPr id="118" name="TextShape 2"/>
+          <p:cNvSpPr txBox="1"/>
+          <p:nvPr/>
+        </p:nvSpPr>
+        <p:spPr>
+          <a:xfrm>
+            <a:off x="360000" y="1980000"/>
+            <a:ext cx="9180000" cy="4680000"/>
+          </a:xfrm>
+          <a:prstGeom prst="rect">
+            <a:avLst/>
+          </a:prstGeom>
+          <a:noFill/>
+          <a:ln>
+            <a:noFill/>
+          </a:ln>
+        </p:spPr>
+        <p:txBody>
+          <a:bodyPr lIns="0" rIns="0" tIns="0" bIns="0">
+            <a:normAutofit/>
+          </a:bodyPr>
+          <a:p>
+            <a:pPr>
+              <a:spcAft>
+                <a:spcPts val="1142"/>
+              </a:spcAft>
+            </a:pPr>
+            <a:r>
+              <a:rPr b="1" lang="en-US" sz="2600" spc="-1" strike="noStrike">
+                <a:solidFill>
+                  <a:srgbClr val="1c1c1c"/>
+                </a:solidFill>
+                <a:latin typeface="Source Sans Pro Semibold"/>
+              </a:rPr>
+              <a:t>1. Tambahkan method baru dengan requestMapping(“/listbarangtransaction”)</a:t>
+            </a:r>
+            <a:endParaRPr b="1" lang="en-US" sz="2600" spc="-1" strike="noStrike">
+              <a:solidFill>
+                <a:srgbClr val="1c1c1c"/>
+              </a:solidFill>
+              <a:latin typeface="Source Sans Pro Semibold"/>
+            </a:endParaRPr>
+          </a:p>
+          <a:p>
+            <a:pPr>
+              <a:spcAft>
+                <a:spcPts val="1142"/>
+              </a:spcAft>
+            </a:pPr>
+            <a:r>
+              <a:rPr b="1" lang="en-US" sz="2600" spc="-1" strike="noStrike">
+                <a:solidFill>
+                  <a:srgbClr val="1c1c1c"/>
+                </a:solidFill>
+                <a:latin typeface="Source Sans Pro Semibold"/>
+              </a:rPr>
+              <a:t>2. Panggil service untuk listbarang</a:t>
+            </a:r>
+            <a:endParaRPr b="1" lang="en-US" sz="2600" spc="-1" strike="noStrike">
+              <a:solidFill>
+                <a:srgbClr val="1c1c1c"/>
+              </a:solidFill>
+              <a:latin typeface="Source Sans Pro Semibold"/>
+            </a:endParaRPr>
+          </a:p>
+          <a:p>
+            <a:pPr>
+              <a:spcAft>
+                <a:spcPts val="1142"/>
+              </a:spcAft>
+            </a:pPr>
+            <a:r>
+              <a:rPr b="1" lang="en-US" sz="2600" spc="-1" strike="noStrike">
+                <a:solidFill>
+                  <a:srgbClr val="1c1c1c"/>
+                </a:solidFill>
+                <a:latin typeface="Source Sans Pro Semibold"/>
+              </a:rPr>
+              <a:t>3. Masukan hasil dari service listbarang kedalam model.attribute dengan key dan value </a:t>
+            </a:r>
+            <a:endParaRPr b="1" lang="en-US" sz="2600" spc="-1" strike="noStrike">
+              <a:solidFill>
+                <a:srgbClr val="1c1c1c"/>
+              </a:solidFill>
+              <a:latin typeface="Source Sans Pro Semibold"/>
+            </a:endParaRPr>
+          </a:p>
+          <a:p>
+            <a:pPr>
+              <a:spcAft>
+                <a:spcPts val="1142"/>
+              </a:spcAft>
+            </a:pPr>
+            <a:r>
+              <a:rPr b="1" lang="en-US" sz="2600" spc="-1" strike="noStrike">
+                <a:solidFill>
+                  <a:srgbClr val="1c1c1c"/>
+                </a:solidFill>
+                <a:latin typeface="Source Sans Pro Semibold"/>
+              </a:rPr>
+              <a:t>4. Return string dengan isi transaction/listbarangtransaction.htm</a:t>
+            </a:r>
+            <a:endParaRPr b="1" lang="en-US" sz="2600" spc="-1" strike="noStrike">
+              <a:solidFill>
+                <a:srgbClr val="1c1c1c"/>
+              </a:solidFill>
+              <a:latin typeface="Source Sans Pro Semibold"/>
+            </a:endParaRPr>
+          </a:p>
+          <a:p>
+            <a:pPr>
+              <a:spcAft>
+                <a:spcPts val="1142"/>
+              </a:spcAft>
+            </a:pPr>
+            <a:r>
+              <a:rPr b="1" lang="en-US" sz="2600" spc="-1" strike="noStrike">
+                <a:solidFill>
+                  <a:srgbClr val="1c1c1c"/>
+                </a:solidFill>
+                <a:latin typeface="Source Sans Pro Semibold"/>
+              </a:rPr>
+              <a:t>5. Buat file listbarangtransaction.html di folder resources-transaction</a:t>
+            </a:r>
+            <a:endParaRPr b="1" lang="en-US" sz="2600" spc="-1" strike="noStrike">
+              <a:solidFill>
+                <a:srgbClr val="1c1c1c"/>
+              </a:solidFill>
+              <a:latin typeface="Source Sans Pro Semibold"/>
+            </a:endParaRPr>
+          </a:p>
+          <a:p>
+            <a:pPr>
+              <a:spcAft>
+                <a:spcPts val="1142"/>
+              </a:spcAft>
+            </a:pPr>
+            <a:r>
+              <a:rPr b="1" lang="en-US" sz="2600" spc="-1" strike="noStrike">
+                <a:solidFill>
+                  <a:srgbClr val="1c1c1c"/>
+                </a:solidFill>
+                <a:latin typeface="Source Sans Pro Semibold"/>
+              </a:rPr>
+              <a:t>6. Buka file listbarangtransaction.html </a:t>
+            </a:r>
+            <a:endParaRPr b="1" lang="en-US" sz="2600" spc="-1" strike="noStrike">
+              <a:solidFill>
+                <a:srgbClr val="1c1c1c"/>
+              </a:solidFill>
+              <a:latin typeface="Source Sans Pro Semibold"/>
+            </a:endParaRPr>
+          </a:p>
+        </p:txBody>
+      </p:sp>
+    </p:spTree>
+  </p:cSld>
+  <p:timing>
+    <p:tnLst>
+      <p:par>
+        <p:cTn id="25" dur="indefinite" restart="never" nodeType="tmRoot">
+          <p:childTnLst>
+            <p:seq>
+              <p:cTn id="26" dur="indefinite" nodeType="mainSeq"/>
+              <p:prevCondLst>
+                <p:cond delay="0" evt="onPrev">
+                  <p:tgtEl>
+                    <p:sldTgt/>
+                  </p:tgtEl>
+                </p:cond>
+              </p:prevCondLst>
+              <p:nextCondLst>
+                <p:cond delay="0" evt="onNext">
+                  <p:tgtEl>
+                    <p:sldTgt/>
+                  </p:tgtEl>
+                </p:cond>
+              </p:nextCondLst>
+            </p:seq>
+          </p:childTnLst>
+        </p:cTn>
+      </p:par>
+    </p:tnLst>
+  </p:timing>
+</p:sld>
+</file>
+
+<file path=ppt/slides/slide14.xml><?xml version="1.0" encoding="utf-8"?>
+<p:sld xmlns:a="http://schemas.openxmlformats.org/drawingml/2006/main" xmlns:p="http://schemas.openxmlformats.org/presentationml/2006/main" xmlns:r="http://schemas.openxmlformats.org/officeDocument/2006/relationships" xmlns:p14="http://schemas.microsoft.com/office/powerpoint/2010/main" xmlns:p15="http://schemas.microsoft.com/office/powerpoint/2012/main" xmlns:mc="http://schemas.openxmlformats.org/markup-compatibility/2006">
+  <p:cSld>
+    <p:spTree>
+      <p:nvGrpSpPr>
+        <p:cNvPr id="1" name=""/>
+        <p:cNvGrpSpPr/>
+        <p:nvPr/>
+      </p:nvGrpSpPr>
+      <p:grpSpPr>
+        <a:xfrm>
+          <a:off x="0" y="0"/>
+          <a:ext cx="0" cy="0"/>
+          <a:chOff x="0" y="0"/>
+          <a:chExt cx="0" cy="0"/>
+        </a:xfrm>
+      </p:grpSpPr>
+      <p:sp>
+        <p:nvSpPr>
+          <p:cNvPr id="119" name="TextShape 1"/>
+          <p:cNvSpPr txBox="1"/>
+          <p:nvPr/>
+        </p:nvSpPr>
+        <p:spPr>
+          <a:xfrm>
+            <a:off x="360000" y="360000"/>
+            <a:ext cx="9360000" cy="900000"/>
+          </a:xfrm>
+          <a:prstGeom prst="rect">
+            <a:avLst/>
+          </a:prstGeom>
+          <a:noFill/>
+          <a:ln>
+            <a:noFill/>
+          </a:ln>
+        </p:spPr>
+        <p:txBody>
+          <a:bodyPr lIns="0" rIns="0" tIns="0" bIns="0" anchor="b"/>
+          <a:p>
+            <a:r>
+              <a:rPr b="1" lang="en-US" sz="3200" spc="-1" strike="noStrike">
+                <a:solidFill>
+                  <a:srgbClr val="ffffff"/>
+                </a:solidFill>
+                <a:latin typeface="Source Sans Pro Black"/>
+              </a:rPr>
+              <a:t>View – list barang</a:t>
+            </a:r>
+            <a:endParaRPr b="1" lang="en-US" sz="3200" spc="-1" strike="noStrike">
+              <a:solidFill>
+                <a:srgbClr val="ffffff"/>
+              </a:solidFill>
+              <a:latin typeface="Source Sans Pro Black"/>
+            </a:endParaRPr>
+          </a:p>
+        </p:txBody>
+      </p:sp>
+      <p:sp>
+        <p:nvSpPr>
+          <p:cNvPr id="120" name="TextShape 2"/>
+          <p:cNvSpPr txBox="1"/>
+          <p:nvPr/>
+        </p:nvSpPr>
+        <p:spPr>
+          <a:xfrm>
+            <a:off x="360000" y="1980000"/>
+            <a:ext cx="9180000" cy="4680000"/>
+          </a:xfrm>
+          <a:prstGeom prst="rect">
+            <a:avLst/>
+          </a:prstGeom>
+          <a:noFill/>
+          <a:ln>
+            <a:noFill/>
+          </a:ln>
+        </p:spPr>
+        <p:txBody>
+          <a:bodyPr lIns="0" rIns="0" tIns="0" bIns="0">
+            <a:normAutofit/>
+          </a:bodyPr>
+          <a:p>
+            <a:pPr>
+              <a:spcAft>
+                <a:spcPts val="1142"/>
+              </a:spcAft>
+            </a:pPr>
+            <a:r>
+              <a:rPr b="1" lang="en-US" sz="2600" spc="-1" strike="noStrike">
+                <a:solidFill>
+                  <a:srgbClr val="1c1c1c"/>
+                </a:solidFill>
+                <a:latin typeface="Source Sans Pro Semibold"/>
+              </a:rPr>
+              <a:t>1. Tambahkan table responsive pada body dari listbarangtransaction.html</a:t>
+            </a:r>
+            <a:endParaRPr b="1" lang="en-US" sz="2600" spc="-1" strike="noStrike">
+              <a:solidFill>
+                <a:srgbClr val="1c1c1c"/>
+              </a:solidFill>
+              <a:latin typeface="Source Sans Pro Semibold"/>
+            </a:endParaRPr>
+          </a:p>
+          <a:p>
+            <a:pPr>
+              <a:spcAft>
+                <a:spcPts val="1142"/>
+              </a:spcAft>
+            </a:pPr>
+            <a:r>
+              <a:rPr b="1" lang="en-US" sz="2600" spc="-1" strike="noStrike">
+                <a:solidFill>
+                  <a:srgbClr val="1c1c1c"/>
+                </a:solidFill>
+                <a:latin typeface="Source Sans Pro Semibold"/>
+              </a:rPr>
+              <a:t>&lt;div class="table-responsive"&gt;</a:t>
+            </a:r>
+            <a:endParaRPr b="1" lang="en-US" sz="2600" spc="-1" strike="noStrike">
+              <a:solidFill>
+                <a:srgbClr val="1c1c1c"/>
+              </a:solidFill>
+              <a:latin typeface="Source Sans Pro Semibold"/>
+            </a:endParaRPr>
+          </a:p>
+          <a:p>
+            <a:pPr>
+              <a:spcAft>
+                <a:spcPts val="1142"/>
+              </a:spcAft>
+            </a:pPr>
+            <a:r>
+              <a:rPr b="1" lang="en-US" sz="2600" spc="-1" strike="noStrike">
+                <a:solidFill>
+                  <a:srgbClr val="1c1c1c"/>
+                </a:solidFill>
+                <a:latin typeface="Source Sans Pro Semibold"/>
+              </a:rPr>
+              <a:t>  </a:t>
+            </a:r>
+            <a:r>
+              <a:rPr b="1" lang="en-US" sz="2600" spc="-1" strike="noStrike">
+                <a:solidFill>
+                  <a:srgbClr val="1c1c1c"/>
+                </a:solidFill>
+                <a:latin typeface="Source Sans Pro Semibold"/>
+              </a:rPr>
+              <a:t>&lt;table class="table"&gt;</a:t>
+            </a:r>
+            <a:endParaRPr b="1" lang="en-US" sz="2600" spc="-1" strike="noStrike">
+              <a:solidFill>
+                <a:srgbClr val="1c1c1c"/>
+              </a:solidFill>
+              <a:latin typeface="Source Sans Pro Semibold"/>
+            </a:endParaRPr>
+          </a:p>
+          <a:p>
+            <a:pPr>
+              <a:spcAft>
+                <a:spcPts val="1142"/>
+              </a:spcAft>
+            </a:pPr>
+            <a:r>
+              <a:rPr b="1" lang="en-US" sz="2600" spc="-1" strike="noStrike">
+                <a:solidFill>
+                  <a:srgbClr val="1c1c1c"/>
+                </a:solidFill>
+                <a:latin typeface="Source Sans Pro Semibold"/>
+              </a:rPr>
+              <a:t>    </a:t>
+            </a:r>
+            <a:r>
+              <a:rPr b="1" lang="en-US" sz="2600" spc="-1" strike="noStrike">
+                <a:solidFill>
+                  <a:srgbClr val="1c1c1c"/>
+                </a:solidFill>
+                <a:latin typeface="Source Sans Pro Semibold"/>
+              </a:rPr>
+              <a:t>Bagian D</a:t>
+            </a:r>
+            <a:endParaRPr b="1" lang="en-US" sz="2600" spc="-1" strike="noStrike">
+              <a:solidFill>
+                <a:srgbClr val="1c1c1c"/>
+              </a:solidFill>
+              <a:latin typeface="Source Sans Pro Semibold"/>
+            </a:endParaRPr>
+          </a:p>
+          <a:p>
+            <a:pPr>
+              <a:spcAft>
+                <a:spcPts val="1142"/>
+              </a:spcAft>
+            </a:pPr>
+            <a:r>
+              <a:rPr b="1" lang="en-US" sz="2600" spc="-1" strike="noStrike">
+                <a:solidFill>
+                  <a:srgbClr val="1c1c1c"/>
+                </a:solidFill>
+                <a:latin typeface="Source Sans Pro Semibold"/>
+              </a:rPr>
+              <a:t>  </a:t>
+            </a:r>
+            <a:r>
+              <a:rPr b="1" lang="en-US" sz="2600" spc="-1" strike="noStrike">
+                <a:solidFill>
+                  <a:srgbClr val="1c1c1c"/>
+                </a:solidFill>
+                <a:latin typeface="Source Sans Pro Semibold"/>
+              </a:rPr>
+              <a:t>&lt;/table&gt;</a:t>
+            </a:r>
+            <a:endParaRPr b="1" lang="en-US" sz="2600" spc="-1" strike="noStrike">
+              <a:solidFill>
+                <a:srgbClr val="1c1c1c"/>
+              </a:solidFill>
+              <a:latin typeface="Source Sans Pro Semibold"/>
+            </a:endParaRPr>
+          </a:p>
+          <a:p>
+            <a:pPr>
+              <a:spcAft>
+                <a:spcPts val="1142"/>
+              </a:spcAft>
+            </a:pPr>
+            <a:r>
+              <a:rPr b="1" lang="en-US" sz="2600" spc="-1" strike="noStrike">
+                <a:solidFill>
+                  <a:srgbClr val="1c1c1c"/>
+                </a:solidFill>
+                <a:latin typeface="Source Sans Pro Semibold"/>
+              </a:rPr>
+              <a:t>&lt;/div&gt;</a:t>
+            </a:r>
+            <a:endParaRPr b="1" lang="en-US" sz="2600" spc="-1" strike="noStrike">
+              <a:solidFill>
+                <a:srgbClr val="1c1c1c"/>
+              </a:solidFill>
+              <a:latin typeface="Source Sans Pro Semibold"/>
+            </a:endParaRPr>
+          </a:p>
+        </p:txBody>
+      </p:sp>
+    </p:spTree>
+  </p:cSld>
+  <p:timing>
+    <p:tnLst>
+      <p:par>
+        <p:cTn id="27" dur="indefinite" restart="never" nodeType="tmRoot">
+          <p:childTnLst>
+            <p:seq>
+              <p:cTn id="28" dur="indefinite" nodeType="mainSeq"/>
+              <p:prevCondLst>
+                <p:cond delay="0" evt="onPrev">
+                  <p:tgtEl>
+                    <p:sldTgt/>
+                  </p:tgtEl>
+                </p:cond>
+              </p:prevCondLst>
+              <p:nextCondLst>
+                <p:cond delay="0" evt="onNext">
+                  <p:tgtEl>
+                    <p:sldTgt/>
+                  </p:tgtEl>
+                </p:cond>
+              </p:nextCondLst>
+            </p:seq>
+          </p:childTnLst>
+        </p:cTn>
+      </p:par>
+    </p:tnLst>
+  </p:timing>
+</p:sld>
+</file>
+
+<file path=ppt/slides/slide15.xml><?xml version="1.0" encoding="utf-8"?>
+<p:sld xmlns:a="http://schemas.openxmlformats.org/drawingml/2006/main" xmlns:p="http://schemas.openxmlformats.org/presentationml/2006/main" xmlns:r="http://schemas.openxmlformats.org/officeDocument/2006/relationships" xmlns:p14="http://schemas.microsoft.com/office/powerpoint/2010/main" xmlns:p15="http://schemas.microsoft.com/office/powerpoint/2012/main" xmlns:mc="http://schemas.openxmlformats.org/markup-compatibility/2006">
+  <p:cSld>
+    <p:spTree>
+      <p:nvGrpSpPr>
+        <p:cNvPr id="1" name=""/>
+        <p:cNvGrpSpPr/>
+        <p:nvPr/>
+      </p:nvGrpSpPr>
+      <p:grpSpPr>
+        <a:xfrm>
+          <a:off x="0" y="0"/>
+          <a:ext cx="0" cy="0"/>
+          <a:chOff x="0" y="0"/>
+          <a:chExt cx="0" cy="0"/>
+        </a:xfrm>
+      </p:grpSpPr>
+      <p:sp>
+        <p:nvSpPr>
+          <p:cNvPr id="121" name="TextShape 1"/>
+          <p:cNvSpPr txBox="1"/>
+          <p:nvPr/>
+        </p:nvSpPr>
+        <p:spPr>
+          <a:xfrm>
+            <a:off x="360000" y="360000"/>
+            <a:ext cx="9360000" cy="900000"/>
+          </a:xfrm>
+          <a:prstGeom prst="rect">
+            <a:avLst/>
+          </a:prstGeom>
+          <a:noFill/>
+          <a:ln>
+            <a:noFill/>
+          </a:ln>
+        </p:spPr>
+        <p:txBody>
+          <a:bodyPr lIns="0" rIns="0" tIns="0" bIns="0" anchor="b"/>
+          <a:p>
+            <a:r>
+              <a:rPr b="1" lang="en-US" sz="3200" spc="-1" strike="noStrike">
+                <a:solidFill>
+                  <a:srgbClr val="ffffff"/>
+                </a:solidFill>
+                <a:latin typeface="Source Sans Pro Black"/>
+              </a:rPr>
+              <a:t>View – list barang – section D</a:t>
+            </a:r>
+            <a:endParaRPr b="1" lang="en-US" sz="3200" spc="-1" strike="noStrike">
+              <a:solidFill>
+                <a:srgbClr val="ffffff"/>
+              </a:solidFill>
+              <a:latin typeface="Source Sans Pro Black"/>
+            </a:endParaRPr>
+          </a:p>
+        </p:txBody>
+      </p:sp>
+      <p:sp>
+        <p:nvSpPr>
+          <p:cNvPr id="122" name="TextShape 2"/>
+          <p:cNvSpPr txBox="1"/>
+          <p:nvPr/>
+        </p:nvSpPr>
+        <p:spPr>
+          <a:xfrm>
+            <a:off x="360000" y="1980000"/>
+            <a:ext cx="9180000" cy="4680000"/>
+          </a:xfrm>
+          <a:prstGeom prst="rect">
+            <a:avLst/>
+          </a:prstGeom>
+          <a:noFill/>
+          <a:ln>
+            <a:noFill/>
+          </a:ln>
+        </p:spPr>
+        <p:txBody>
+          <a:bodyPr lIns="0" rIns="0" tIns="0" bIns="0">
+            <a:normAutofit/>
+          </a:bodyPr>
+          <a:p>
+            <a:pPr>
+              <a:spcAft>
+                <a:spcPts val="1142"/>
+              </a:spcAft>
+            </a:pPr>
+            <a:r>
+              <a:rPr b="1" lang="en-US" sz="2600" spc="-1" strike="noStrike">
+                <a:solidFill>
+                  <a:srgbClr val="1c1c1c"/>
+                </a:solidFill>
+                <a:latin typeface="Source Sans Pro Semibold"/>
+              </a:rPr>
+              <a:t>1. Tambahkan tag thead dan tbody</a:t>
+            </a:r>
+            <a:endParaRPr b="1" lang="en-US" sz="2600" spc="-1" strike="noStrike">
+              <a:solidFill>
+                <a:srgbClr val="1c1c1c"/>
+              </a:solidFill>
+              <a:latin typeface="Source Sans Pro Semibold"/>
+            </a:endParaRPr>
+          </a:p>
+          <a:p>
+            <a:pPr>
+              <a:spcAft>
+                <a:spcPts val="1142"/>
+              </a:spcAft>
+            </a:pPr>
+            <a:r>
+              <a:rPr b="1" lang="en-US" sz="2600" spc="-1" strike="noStrike">
+                <a:solidFill>
+                  <a:srgbClr val="1c1c1c"/>
+                </a:solidFill>
+                <a:latin typeface="Source Sans Pro Semibold"/>
+              </a:rPr>
+              <a:t>2. Pada thead tambahkan column sesuai gambar</a:t>
+            </a:r>
+            <a:endParaRPr b="1" lang="en-US" sz="2600" spc="-1" strike="noStrike">
+              <a:solidFill>
+                <a:srgbClr val="1c1c1c"/>
+              </a:solidFill>
+              <a:latin typeface="Source Sans Pro Semibold"/>
+            </a:endParaRPr>
+          </a:p>
+          <a:p>
+            <a:pPr>
+              <a:spcAft>
+                <a:spcPts val="1142"/>
+              </a:spcAft>
+            </a:pPr>
+            <a:r>
+              <a:rPr b="1" lang="en-US" sz="2600" spc="-1" strike="noStrike">
+                <a:solidFill>
+                  <a:srgbClr val="1c1c1c"/>
+                </a:solidFill>
+                <a:latin typeface="Source Sans Pro Semibold"/>
+              </a:rPr>
+              <a:t> </a:t>
+            </a:r>
+            <a:endParaRPr b="1" lang="en-US" sz="2600" spc="-1" strike="noStrike">
+              <a:solidFill>
+                <a:srgbClr val="1c1c1c"/>
+              </a:solidFill>
+              <a:latin typeface="Source Sans Pro Semibold"/>
+            </a:endParaRPr>
+          </a:p>
+          <a:p>
+            <a:pPr>
+              <a:spcAft>
+                <a:spcPts val="1142"/>
+              </a:spcAft>
+            </a:pPr>
+            <a:r>
+              <a:rPr b="1" lang="en-US" sz="2600" spc="-1" strike="noStrike">
+                <a:solidFill>
+                  <a:srgbClr val="1c1c1c"/>
+                </a:solidFill>
+                <a:latin typeface="Source Sans Pro Semibold"/>
+              </a:rPr>
+              <a:t> </a:t>
+            </a:r>
+            <a:endParaRPr b="1" lang="en-US" sz="2600" spc="-1" strike="noStrike">
+              <a:solidFill>
+                <a:srgbClr val="1c1c1c"/>
+              </a:solidFill>
+              <a:latin typeface="Source Sans Pro Semibold"/>
+            </a:endParaRPr>
+          </a:p>
+          <a:p>
+            <a:pPr>
+              <a:spcAft>
+                <a:spcPts val="1142"/>
+              </a:spcAft>
+            </a:pPr>
+            <a:r>
+              <a:rPr b="1" lang="en-US" sz="2600" spc="-1" strike="noStrike">
+                <a:solidFill>
+                  <a:srgbClr val="1c1c1c"/>
+                </a:solidFill>
+                <a:latin typeface="Source Sans Pro Semibold"/>
+              </a:rPr>
+              <a:t>3. Pada tbody tambahkan attribute id</a:t>
+            </a:r>
+            <a:endParaRPr b="1" lang="en-US" sz="2600" spc="-1" strike="noStrike">
+              <a:solidFill>
+                <a:srgbClr val="1c1c1c"/>
+              </a:solidFill>
+              <a:latin typeface="Source Sans Pro Semibold"/>
+            </a:endParaRPr>
+          </a:p>
+          <a:p>
+            <a:pPr>
+              <a:spcAft>
+                <a:spcPts val="1142"/>
+              </a:spcAft>
+            </a:pPr>
+            <a:r>
+              <a:rPr b="1" lang="en-US" sz="2600" spc="-1" strike="noStrike">
+                <a:solidFill>
+                  <a:srgbClr val="1c1c1c"/>
+                </a:solidFill>
+                <a:latin typeface="Source Sans Pro Semibold"/>
+              </a:rPr>
+              <a:t>4. Lalu tambahkan data looping dari controller method listbarangtransaction sesuai gambar </a:t>
+            </a:r>
+            <a:endParaRPr b="1" lang="en-US" sz="2600" spc="-1" strike="noStrike">
+              <a:solidFill>
+                <a:srgbClr val="1c1c1c"/>
+              </a:solidFill>
+              <a:latin typeface="Source Sans Pro Semibold"/>
+            </a:endParaRPr>
+          </a:p>
+        </p:txBody>
+      </p:sp>
+      <p:pic>
+        <p:nvPicPr>
+          <p:cNvPr id="123" name="" descr=""/>
+          <p:cNvPicPr/>
+          <p:nvPr/>
+        </p:nvPicPr>
+        <p:blipFill>
+          <a:blip r:embed="rId1"/>
+          <a:stretch/>
+        </p:blipFill>
+        <p:spPr>
+          <a:xfrm>
+            <a:off x="1681200" y="3061440"/>
+            <a:ext cx="5816880" cy="779040"/>
+          </a:xfrm>
+          <a:prstGeom prst="rect">
+            <a:avLst/>
+          </a:prstGeom>
+          <a:ln>
+            <a:noFill/>
+          </a:ln>
+        </p:spPr>
+      </p:pic>
+    </p:spTree>
+  </p:cSld>
+  <p:timing>
+    <p:tnLst>
+      <p:par>
+        <p:cTn id="29" dur="indefinite" restart="never" nodeType="tmRoot">
+          <p:childTnLst>
+            <p:seq>
+              <p:cTn id="30" dur="indefinite" nodeType="mainSeq"/>
+              <p:prevCondLst>
+                <p:cond delay="0" evt="onPrev">
+                  <p:tgtEl>
+                    <p:sldTgt/>
+                  </p:tgtEl>
+                </p:cond>
+              </p:prevCondLst>
+              <p:nextCondLst>
+                <p:cond delay="0" evt="onNext">
+                  <p:tgtEl>
+                    <p:sldTgt/>
+                  </p:tgtEl>
+                </p:cond>
+              </p:nextCondLst>
+            </p:seq>
+          </p:childTnLst>
+        </p:cTn>
+      </p:par>
+    </p:tnLst>
+  </p:timing>
+</p:sld>
+</file>
+
+<file path=ppt/slides/slide16.xml><?xml version="1.0" encoding="utf-8"?>
+<p:sld xmlns:a="http://schemas.openxmlformats.org/drawingml/2006/main" xmlns:p="http://schemas.openxmlformats.org/presentationml/2006/main" xmlns:r="http://schemas.openxmlformats.org/officeDocument/2006/relationships" xmlns:p14="http://schemas.microsoft.com/office/powerpoint/2010/main" xmlns:p15="http://schemas.microsoft.com/office/powerpoint/2012/main" xmlns:mc="http://schemas.openxmlformats.org/markup-compatibility/2006">
+  <p:cSld>
+    <p:spTree>
+      <p:nvGrpSpPr>
+        <p:cNvPr id="1" name=""/>
+        <p:cNvGrpSpPr/>
+        <p:nvPr/>
+      </p:nvGrpSpPr>
+      <p:grpSpPr>
+        <a:xfrm>
+          <a:off x="0" y="0"/>
+          <a:ext cx="0" cy="0"/>
+          <a:chOff x="0" y="0"/>
+          <a:chExt cx="0" cy="0"/>
+        </a:xfrm>
+      </p:grpSpPr>
+      <p:sp>
+        <p:nvSpPr>
+          <p:cNvPr id="124" name="TextShape 1"/>
+          <p:cNvSpPr txBox="1"/>
+          <p:nvPr/>
+        </p:nvSpPr>
+        <p:spPr>
+          <a:xfrm>
+            <a:off x="360000" y="360000"/>
+            <a:ext cx="9360000" cy="900000"/>
+          </a:xfrm>
+          <a:prstGeom prst="rect">
+            <a:avLst/>
+          </a:prstGeom>
+          <a:noFill/>
+          <a:ln>
+            <a:noFill/>
+          </a:ln>
+        </p:spPr>
+        <p:txBody>
+          <a:bodyPr lIns="0" rIns="0" tIns="0" bIns="0" anchor="b"/>
+          <a:p>
+            <a:r>
+              <a:rPr b="1" lang="en-US" sz="3200" spc="-1" strike="noStrike">
+                <a:solidFill>
+                  <a:srgbClr val="ffffff"/>
+                </a:solidFill>
+                <a:latin typeface="Source Sans Pro Black"/>
+              </a:rPr>
+              <a:t>View – list barang - parsing</a:t>
+            </a:r>
+            <a:endParaRPr b="1" lang="en-US" sz="3200" spc="-1" strike="noStrike">
+              <a:solidFill>
+                <a:srgbClr val="ffffff"/>
+              </a:solidFill>
+              <a:latin typeface="Source Sans Pro Black"/>
+            </a:endParaRPr>
+          </a:p>
+        </p:txBody>
+      </p:sp>
+      <p:sp>
+        <p:nvSpPr>
+          <p:cNvPr id="125" name="TextShape 2"/>
+          <p:cNvSpPr txBox="1"/>
+          <p:nvPr/>
+        </p:nvSpPr>
+        <p:spPr>
+          <a:xfrm>
+            <a:off x="360000" y="1980000"/>
+            <a:ext cx="9180000" cy="4680000"/>
+          </a:xfrm>
+          <a:prstGeom prst="rect">
+            <a:avLst/>
+          </a:prstGeom>
+          <a:noFill/>
+          <a:ln>
+            <a:noFill/>
+          </a:ln>
+        </p:spPr>
+        <p:txBody>
+          <a:bodyPr lIns="0" rIns="0" tIns="0" bIns="0">
+            <a:normAutofit/>
+          </a:bodyPr>
+          <a:p>
+            <a:pPr>
+              <a:spcAft>
+                <a:spcPts val="1142"/>
+              </a:spcAft>
+            </a:pPr>
+            <a:r>
+              <a:rPr b="1" lang="en-US" sz="2600" spc="-1" strike="noStrike">
+                <a:solidFill>
+                  <a:srgbClr val="1c1c1c"/>
+                </a:solidFill>
+                <a:latin typeface="Source Sans Pro Semibold"/>
+              </a:rPr>
+              <a:t>1. Parsing data dari model.attribute di </a:t>
+            </a:r>
+            <a:r>
+              <a:rPr b="1" lang="en-US" sz="2600" spc="-1" strike="noStrike">
+                <a:solidFill>
+                  <a:srgbClr val="1c1c1c"/>
+                </a:solidFill>
+                <a:latin typeface="Source Sans Pro Semibold"/>
+              </a:rPr>
+              <a:t>controller</a:t>
+            </a:r>
+            <a:endParaRPr b="1" lang="en-US" sz="2600" spc="-1" strike="noStrike">
+              <a:solidFill>
+                <a:srgbClr val="1c1c1c"/>
+              </a:solidFill>
+              <a:latin typeface="Source Sans Pro Semibold"/>
+            </a:endParaRPr>
+          </a:p>
+          <a:p>
+            <a:r>
+              <a:rPr b="1" lang="en-US" sz="1800" spc="-1" strike="noStrike">
+                <a:solidFill>
+                  <a:srgbClr val="008080"/>
+                </a:solidFill>
+                <a:latin typeface="Monospace"/>
+                <a:ea typeface="Monospace"/>
+              </a:rPr>
+              <a:t>&lt;</a:t>
+            </a:r>
+            <a:r>
+              <a:rPr b="1" lang="en-US" sz="1800" spc="-1" strike="noStrike">
+                <a:solidFill>
+                  <a:srgbClr val="3f7f7f"/>
+                </a:solidFill>
+                <a:latin typeface="Monospace"/>
+                <a:ea typeface="Monospace"/>
+              </a:rPr>
+              <a:t>tr</a:t>
+            </a:r>
+            <a:r>
+              <a:rPr b="1" lang="en-US" sz="1800" spc="-1" strike="noStrike">
+                <a:solidFill>
+                  <a:srgbClr val="1c1c1c"/>
+                </a:solidFill>
+                <a:latin typeface="Monospace"/>
+              </a:rPr>
+              <a:t> </a:t>
+            </a:r>
+            <a:r>
+              <a:rPr b="1" lang="en-US" sz="1800" spc="-1" strike="noStrike" u="sng">
+                <a:solidFill>
+                  <a:srgbClr val="7f007f"/>
+                </a:solidFill>
+                <a:uFillTx/>
+                <a:latin typeface="Monospace"/>
+                <a:ea typeface="Monospace"/>
+              </a:rPr>
+              <a:t>th:each</a:t>
+            </a:r>
+            <a:r>
+              <a:rPr b="1" lang="en-US" sz="1800" spc="-1" strike="noStrike">
+                <a:solidFill>
+                  <a:srgbClr val="3c3c3c"/>
+                </a:solidFill>
+                <a:latin typeface="Monospace"/>
+                <a:ea typeface="Monospace"/>
+              </a:rPr>
+              <a:t>=</a:t>
+            </a:r>
+            <a:r>
+              <a:rPr b="1" i="1" lang="en-US" sz="1800" spc="-1" strike="noStrike">
+                <a:solidFill>
+                  <a:srgbClr val="2a00ff"/>
+                </a:solidFill>
+                <a:latin typeface="Monospace"/>
+                <a:ea typeface="Monospace"/>
+              </a:rPr>
+              <a:t>"item : ${keybarang}"</a:t>
+            </a:r>
+            <a:r>
+              <a:rPr b="1" lang="en-US" sz="1800" spc="-1" strike="noStrike">
+                <a:solidFill>
+                  <a:srgbClr val="008080"/>
+                </a:solidFill>
+                <a:latin typeface="Monospace"/>
+                <a:ea typeface="Monospace"/>
+              </a:rPr>
+              <a:t>&gt;</a:t>
+            </a:r>
+            <a:endParaRPr b="1" lang="en-US" sz="1800" spc="-1" strike="noStrike">
+              <a:solidFill>
+                <a:srgbClr val="1c1c1c"/>
+              </a:solidFill>
+              <a:latin typeface="Monospace"/>
+              <a:ea typeface="Monospace"/>
+            </a:endParaRPr>
+          </a:p>
+          <a:p>
+            <a:r>
+              <a:rPr b="1" lang="en-US" sz="1800" spc="-1" strike="noStrike">
+                <a:solidFill>
+                  <a:srgbClr val="008080"/>
+                </a:solidFill>
+                <a:latin typeface="Monospace"/>
+                <a:ea typeface="Monospace"/>
+              </a:rPr>
+              <a:t>    </a:t>
+            </a:r>
+            <a:r>
+              <a:rPr b="1" lang="en-US" sz="1800" spc="-1" strike="noStrike">
+                <a:solidFill>
+                  <a:srgbClr val="008080"/>
+                </a:solidFill>
+                <a:latin typeface="Monospace"/>
+                <a:ea typeface="Monospace"/>
+              </a:rPr>
+              <a:t>&lt;</a:t>
+            </a:r>
+            <a:r>
+              <a:rPr b="1" lang="en-US" sz="1800" spc="-1" strike="noStrike">
+                <a:solidFill>
+                  <a:srgbClr val="3f7f7f"/>
+                </a:solidFill>
+                <a:latin typeface="Monospace"/>
+                <a:ea typeface="Monospace"/>
+              </a:rPr>
+              <a:t>td</a:t>
+            </a:r>
+            <a:r>
+              <a:rPr b="1" lang="en-US" sz="1800" spc="-1" strike="noStrike">
+                <a:solidFill>
+                  <a:srgbClr val="1c1c1c"/>
+                </a:solidFill>
+                <a:latin typeface="Monospace"/>
+              </a:rPr>
+              <a:t> </a:t>
+            </a:r>
+            <a:r>
+              <a:rPr b="1" lang="en-US" sz="1800" spc="-1" strike="noStrike" u="sng">
+                <a:solidFill>
+                  <a:srgbClr val="7f007f"/>
+                </a:solidFill>
+                <a:uFillTx/>
+                <a:latin typeface="Monospace"/>
+                <a:ea typeface="Monospace"/>
+              </a:rPr>
+              <a:t>th:text</a:t>
+            </a:r>
+            <a:r>
+              <a:rPr b="1" lang="en-US" sz="1800" spc="-1" strike="noStrike">
+                <a:solidFill>
+                  <a:srgbClr val="3c3c3c"/>
+                </a:solidFill>
+                <a:latin typeface="Monospace"/>
+                <a:ea typeface="Monospace"/>
+              </a:rPr>
+              <a:t>=</a:t>
+            </a:r>
+            <a:r>
+              <a:rPr b="1" i="1" lang="en-US" sz="1800" spc="-1" strike="noStrike">
+                <a:solidFill>
+                  <a:srgbClr val="2a00ff"/>
+                </a:solidFill>
+                <a:latin typeface="Monospace"/>
+                <a:ea typeface="Monospace"/>
+              </a:rPr>
+              <a:t>"${item.namabarang}"</a:t>
+            </a:r>
+            <a:r>
+              <a:rPr b="1" lang="en-US" sz="1800" spc="-1" strike="noStrike">
+                <a:solidFill>
+                  <a:srgbClr val="008080"/>
+                </a:solidFill>
+                <a:latin typeface="Monospace"/>
+                <a:ea typeface="Monospace"/>
+              </a:rPr>
+              <a:t>&gt;</a:t>
+            </a:r>
+            <a:r>
+              <a:rPr b="1" lang="en-US" sz="1800" spc="-1" strike="noStrike">
+                <a:solidFill>
+                  <a:srgbClr val="3c3c3c"/>
+                </a:solidFill>
+                <a:latin typeface="Monospace"/>
+                <a:ea typeface="Monospace"/>
+              </a:rPr>
+              <a:t>Nama</a:t>
+            </a:r>
+            <a:r>
+              <a:rPr b="1" lang="en-US" sz="1800" spc="-1" strike="noStrike">
+                <a:solidFill>
+                  <a:srgbClr val="008080"/>
+                </a:solidFill>
+                <a:latin typeface="Monospace"/>
+                <a:ea typeface="Monospace"/>
+              </a:rPr>
+              <a:t>&lt;/</a:t>
+            </a:r>
+            <a:r>
+              <a:rPr b="1" lang="en-US" sz="1800" spc="-1" strike="noStrike">
+                <a:solidFill>
+                  <a:srgbClr val="3f7f7f"/>
+                </a:solidFill>
+                <a:latin typeface="Monospace"/>
+                <a:ea typeface="Monospace"/>
+              </a:rPr>
+              <a:t>td</a:t>
+            </a:r>
+            <a:r>
+              <a:rPr b="1" lang="en-US" sz="1800" spc="-1" strike="noStrike">
+                <a:solidFill>
+                  <a:srgbClr val="008080"/>
+                </a:solidFill>
+                <a:latin typeface="Monospace"/>
+                <a:ea typeface="Monospace"/>
+              </a:rPr>
+              <a:t>&gt;</a:t>
+            </a:r>
+            <a:endParaRPr b="1" lang="en-US" sz="1800" spc="-1" strike="noStrike">
+              <a:solidFill>
+                <a:srgbClr val="1c1c1c"/>
+              </a:solidFill>
+              <a:latin typeface="Monospace"/>
+              <a:ea typeface="Monospace"/>
+            </a:endParaRPr>
+          </a:p>
+          <a:p>
+            <a:r>
+              <a:rPr b="1" lang="en-US" sz="1800" spc="-1" strike="noStrike">
+                <a:solidFill>
+                  <a:srgbClr val="008080"/>
+                </a:solidFill>
+                <a:latin typeface="Monospace"/>
+                <a:ea typeface="Monospace"/>
+              </a:rPr>
+              <a:t>    </a:t>
+            </a:r>
+            <a:r>
+              <a:rPr b="1" lang="en-US" sz="1800" spc="-1" strike="noStrike">
+                <a:solidFill>
+                  <a:srgbClr val="008080"/>
+                </a:solidFill>
+                <a:latin typeface="Monospace"/>
+                <a:ea typeface="Monospace"/>
+              </a:rPr>
+              <a:t>&lt;</a:t>
+            </a:r>
+            <a:r>
+              <a:rPr b="1" lang="en-US" sz="1800" spc="-1" strike="noStrike">
+                <a:solidFill>
+                  <a:srgbClr val="3f7f7f"/>
+                </a:solidFill>
+                <a:latin typeface="Monospace"/>
+                <a:ea typeface="Monospace"/>
+              </a:rPr>
+              <a:t>td</a:t>
+            </a:r>
+            <a:r>
+              <a:rPr b="1" lang="en-US" sz="1800" spc="-1" strike="noStrike">
+                <a:solidFill>
+                  <a:srgbClr val="1c1c1c"/>
+                </a:solidFill>
+                <a:latin typeface="Monospace"/>
+              </a:rPr>
+              <a:t> </a:t>
+            </a:r>
+            <a:r>
+              <a:rPr b="1" lang="en-US" sz="1800" spc="-1" strike="noStrike" u="sng">
+                <a:solidFill>
+                  <a:srgbClr val="7f007f"/>
+                </a:solidFill>
+                <a:uFillTx/>
+                <a:latin typeface="Monospace"/>
+                <a:ea typeface="Monospace"/>
+              </a:rPr>
+              <a:t>th:text</a:t>
+            </a:r>
+            <a:r>
+              <a:rPr b="1" lang="en-US" sz="1800" spc="-1" strike="noStrike">
+                <a:solidFill>
+                  <a:srgbClr val="3c3c3c"/>
+                </a:solidFill>
+                <a:latin typeface="Monospace"/>
+                <a:ea typeface="Monospace"/>
+              </a:rPr>
+              <a:t>=</a:t>
+            </a:r>
+            <a:r>
+              <a:rPr b="1" i="1" lang="en-US" sz="1800" spc="-1" strike="noStrike">
+                <a:solidFill>
+                  <a:srgbClr val="2a00ff"/>
+                </a:solidFill>
+                <a:latin typeface="Monospace"/>
+                <a:ea typeface="Monospace"/>
+              </a:rPr>
+              <a:t>"${item.jenisbarang}"</a:t>
+            </a:r>
+            <a:r>
+              <a:rPr b="1" lang="en-US" sz="1800" spc="-1" strike="noStrike">
+                <a:solidFill>
+                  <a:srgbClr val="008080"/>
+                </a:solidFill>
+                <a:latin typeface="Monospace"/>
+                <a:ea typeface="Monospace"/>
+              </a:rPr>
+              <a:t>&gt;</a:t>
+            </a:r>
+            <a:r>
+              <a:rPr b="1" lang="en-US" sz="1800" spc="-1" strike="noStrike">
+                <a:solidFill>
+                  <a:srgbClr val="3c3c3c"/>
+                </a:solidFill>
+                <a:latin typeface="Monospace"/>
+                <a:ea typeface="Monospace"/>
+              </a:rPr>
+              <a:t>Jenis Barang</a:t>
+            </a:r>
+            <a:r>
+              <a:rPr b="1" lang="en-US" sz="1800" spc="-1" strike="noStrike">
+                <a:solidFill>
+                  <a:srgbClr val="008080"/>
+                </a:solidFill>
+                <a:latin typeface="Monospace"/>
+                <a:ea typeface="Monospace"/>
+              </a:rPr>
+              <a:t>&lt;/</a:t>
+            </a:r>
+            <a:r>
+              <a:rPr b="1" lang="en-US" sz="1800" spc="-1" strike="noStrike">
+                <a:solidFill>
+                  <a:srgbClr val="3f7f7f"/>
+                </a:solidFill>
+                <a:latin typeface="Monospace"/>
+                <a:ea typeface="Monospace"/>
+              </a:rPr>
+              <a:t>td</a:t>
+            </a:r>
+            <a:r>
+              <a:rPr b="1" lang="en-US" sz="1800" spc="-1" strike="noStrike">
+                <a:solidFill>
+                  <a:srgbClr val="008080"/>
+                </a:solidFill>
+                <a:latin typeface="Monospace"/>
+                <a:ea typeface="Monospace"/>
+              </a:rPr>
+              <a:t>&gt;</a:t>
+            </a:r>
+            <a:endParaRPr b="1" lang="en-US" sz="1800" spc="-1" strike="noStrike">
+              <a:solidFill>
+                <a:srgbClr val="1c1c1c"/>
+              </a:solidFill>
+              <a:latin typeface="Monospace"/>
+              <a:ea typeface="Monospace"/>
+            </a:endParaRPr>
+          </a:p>
+          <a:p>
+            <a:r>
+              <a:rPr b="1" lang="en-US" sz="1800" spc="-1" strike="noStrike">
+                <a:solidFill>
+                  <a:srgbClr val="008080"/>
+                </a:solidFill>
+                <a:latin typeface="Monospace"/>
+                <a:ea typeface="Monospace"/>
+              </a:rPr>
+              <a:t>    </a:t>
+            </a:r>
+            <a:r>
+              <a:rPr b="1" lang="en-US" sz="1800" spc="-1" strike="noStrike">
+                <a:solidFill>
+                  <a:srgbClr val="008080"/>
+                </a:solidFill>
+                <a:latin typeface="Monospace"/>
+                <a:ea typeface="Monospace"/>
+              </a:rPr>
+              <a:t>&lt;</a:t>
+            </a:r>
+            <a:r>
+              <a:rPr b="1" lang="en-US" sz="1800" spc="-1" strike="noStrike">
+                <a:solidFill>
+                  <a:srgbClr val="3f7f7f"/>
+                </a:solidFill>
+                <a:latin typeface="Monospace"/>
+                <a:ea typeface="Monospace"/>
+              </a:rPr>
+              <a:t>td</a:t>
+            </a:r>
+            <a:r>
+              <a:rPr b="1" lang="en-US" sz="1800" spc="-1" strike="noStrike">
+                <a:solidFill>
+                  <a:srgbClr val="1c1c1c"/>
+                </a:solidFill>
+                <a:latin typeface="Monospace"/>
+              </a:rPr>
+              <a:t> </a:t>
+            </a:r>
+            <a:r>
+              <a:rPr b="1" lang="en-US" sz="1800" spc="-1" strike="noStrike" u="sng">
+                <a:solidFill>
+                  <a:srgbClr val="7f007f"/>
+                </a:solidFill>
+                <a:uFillTx/>
+                <a:latin typeface="Monospace"/>
+                <a:ea typeface="Monospace"/>
+              </a:rPr>
+              <a:t>th:text</a:t>
+            </a:r>
+            <a:r>
+              <a:rPr b="1" lang="en-US" sz="1800" spc="-1" strike="noStrike">
+                <a:solidFill>
+                  <a:srgbClr val="3c3c3c"/>
+                </a:solidFill>
+                <a:latin typeface="Monospace"/>
+                <a:ea typeface="Monospace"/>
+              </a:rPr>
+              <a:t>=</a:t>
+            </a:r>
+            <a:r>
+              <a:rPr b="1" i="1" lang="en-US" sz="1800" spc="-1" strike="noStrike">
+                <a:solidFill>
+                  <a:srgbClr val="2a00ff"/>
+                </a:solidFill>
+                <a:latin typeface="Monospace"/>
+                <a:ea typeface="Monospace"/>
+              </a:rPr>
+              <a:t>"${item.hargabarang}"</a:t>
+            </a:r>
+            <a:r>
+              <a:rPr b="1" lang="en-US" sz="1800" spc="-1" strike="noStrike">
+                <a:solidFill>
+                  <a:srgbClr val="008080"/>
+                </a:solidFill>
+                <a:latin typeface="Monospace"/>
+                <a:ea typeface="Monospace"/>
+              </a:rPr>
+              <a:t>&gt;</a:t>
+            </a:r>
+            <a:r>
+              <a:rPr b="1" lang="en-US" sz="1800" spc="-1" strike="noStrike">
+                <a:solidFill>
+                  <a:srgbClr val="3c3c3c"/>
+                </a:solidFill>
+                <a:latin typeface="Monospace"/>
+                <a:ea typeface="Monospace"/>
+              </a:rPr>
+              <a:t>Harga Barang</a:t>
+            </a:r>
+            <a:r>
+              <a:rPr b="1" lang="en-US" sz="1800" spc="-1" strike="noStrike">
+                <a:solidFill>
+                  <a:srgbClr val="008080"/>
+                </a:solidFill>
+                <a:latin typeface="Monospace"/>
+                <a:ea typeface="Monospace"/>
+              </a:rPr>
+              <a:t>&lt;/</a:t>
+            </a:r>
+            <a:r>
+              <a:rPr b="1" lang="en-US" sz="1800" spc="-1" strike="noStrike">
+                <a:solidFill>
+                  <a:srgbClr val="3f7f7f"/>
+                </a:solidFill>
+                <a:latin typeface="Monospace"/>
+                <a:ea typeface="Monospace"/>
+              </a:rPr>
+              <a:t>td</a:t>
+            </a:r>
+            <a:r>
+              <a:rPr b="1" lang="en-US" sz="1800" spc="-1" strike="noStrike">
+                <a:solidFill>
+                  <a:srgbClr val="008080"/>
+                </a:solidFill>
+                <a:latin typeface="Monospace"/>
+                <a:ea typeface="Monospace"/>
+              </a:rPr>
+              <a:t>&gt;</a:t>
+            </a:r>
+            <a:endParaRPr b="1" lang="en-US" sz="1800" spc="-1" strike="noStrike">
+              <a:solidFill>
+                <a:srgbClr val="1c1c1c"/>
+              </a:solidFill>
+              <a:latin typeface="Monospace"/>
+              <a:ea typeface="Monospace"/>
+            </a:endParaRPr>
+          </a:p>
+          <a:p>
+            <a:r>
+              <a:rPr b="1" lang="en-US" sz="1800" spc="-1" strike="noStrike">
+                <a:solidFill>
+                  <a:srgbClr val="008080"/>
+                </a:solidFill>
+                <a:latin typeface="Monospace"/>
+                <a:ea typeface="Monospace"/>
+              </a:rPr>
+              <a:t>    </a:t>
+            </a:r>
+            <a:r>
+              <a:rPr b="1" lang="en-US" sz="1800" spc="-1" strike="noStrike">
+                <a:solidFill>
+                  <a:srgbClr val="008080"/>
+                </a:solidFill>
+                <a:latin typeface="Monospace"/>
+                <a:ea typeface="Monospace"/>
+              </a:rPr>
+              <a:t>&lt;</a:t>
+            </a:r>
+            <a:r>
+              <a:rPr b="1" lang="en-US" sz="1800" spc="-1" strike="noStrike">
+                <a:solidFill>
+                  <a:srgbClr val="3f7f7f"/>
+                </a:solidFill>
+                <a:latin typeface="Monospace"/>
+                <a:ea typeface="Monospace"/>
+              </a:rPr>
+              <a:t>td</a:t>
+            </a:r>
+            <a:r>
+              <a:rPr b="1" lang="en-US" sz="1800" spc="-1" strike="noStrike">
+                <a:solidFill>
+                  <a:srgbClr val="008080"/>
+                </a:solidFill>
+                <a:latin typeface="Monospace"/>
+                <a:ea typeface="Monospace"/>
+              </a:rPr>
+              <a:t>&gt;</a:t>
+            </a:r>
+            <a:endParaRPr b="1" lang="en-US" sz="1800" spc="-1" strike="noStrike">
+              <a:solidFill>
+                <a:srgbClr val="1c1c1c"/>
+              </a:solidFill>
+              <a:latin typeface="Monospace"/>
+              <a:ea typeface="Monospace"/>
+            </a:endParaRPr>
+          </a:p>
+          <a:p>
+            <a:r>
+              <a:rPr b="1" lang="en-US" sz="1800" spc="-1" strike="noStrike">
+                <a:solidFill>
+                  <a:srgbClr val="008080"/>
+                </a:solidFill>
+                <a:latin typeface="Monospace"/>
+                <a:ea typeface="Monospace"/>
+              </a:rPr>
+              <a:t>        </a:t>
+            </a:r>
+            <a:r>
+              <a:rPr b="1" lang="en-US" sz="1800" spc="-1" strike="noStrike">
+                <a:solidFill>
+                  <a:srgbClr val="008080"/>
+                </a:solidFill>
+                <a:latin typeface="Monospace"/>
+                <a:ea typeface="Monospace"/>
+              </a:rPr>
+              <a:t>&lt;</a:t>
+            </a:r>
+            <a:r>
+              <a:rPr b="1" lang="en-US" sz="1800" spc="-1" strike="noStrike">
+                <a:solidFill>
+                  <a:srgbClr val="3f7f7f"/>
+                </a:solidFill>
+                <a:latin typeface="Monospace"/>
+                <a:ea typeface="Monospace"/>
+              </a:rPr>
+              <a:t>button</a:t>
+            </a:r>
+            <a:r>
+              <a:rPr b="1" lang="en-US" sz="1800" spc="-1" strike="noStrike">
+                <a:solidFill>
+                  <a:srgbClr val="1c1c1c"/>
+                </a:solidFill>
+                <a:latin typeface="Monospace"/>
+              </a:rPr>
+              <a:t> </a:t>
+            </a:r>
+            <a:r>
+              <a:rPr b="1" lang="en-US" sz="1800" spc="-1" strike="noStrike">
+                <a:solidFill>
+                  <a:srgbClr val="7f007f"/>
+                </a:solidFill>
+                <a:latin typeface="Monospace"/>
+                <a:ea typeface="Monospace"/>
+              </a:rPr>
+              <a:t>class</a:t>
+            </a:r>
+            <a:r>
+              <a:rPr b="1" lang="en-US" sz="1800" spc="-1" strike="noStrike">
+                <a:solidFill>
+                  <a:srgbClr val="3c3c3c"/>
+                </a:solidFill>
+                <a:latin typeface="Monospace"/>
+                <a:ea typeface="Monospace"/>
+              </a:rPr>
+              <a:t>=</a:t>
+            </a:r>
+            <a:r>
+              <a:rPr b="1" i="1" lang="en-US" sz="1800" spc="-1" strike="noStrike">
+                <a:solidFill>
+                  <a:srgbClr val="2a00ff"/>
+                </a:solidFill>
+                <a:latin typeface="Monospace"/>
+                <a:ea typeface="Monospace"/>
+              </a:rPr>
+              <a:t>"btn btn-success clBtnPilihBarang"</a:t>
+            </a:r>
+            <a:r>
+              <a:rPr b="1" lang="en-US" sz="1800" spc="-1" strike="noStrike">
+                <a:solidFill>
+                  <a:srgbClr val="1c1c1c"/>
+                </a:solidFill>
+                <a:latin typeface="Monospace"/>
+              </a:rPr>
+              <a:t> </a:t>
+            </a:r>
+            <a:r>
+              <a:rPr b="1" lang="en-US" sz="1800" spc="-1" strike="noStrike" u="sng">
+                <a:solidFill>
+                  <a:srgbClr val="7f007f"/>
+                </a:solidFill>
+                <a:uFillTx/>
+                <a:latin typeface="Monospace"/>
+                <a:ea typeface="Monospace"/>
+              </a:rPr>
+              <a:t>th:data-</a:t>
+            </a:r>
+            <a:r>
+              <a:rPr b="1" lang="en-US" sz="1800" spc="-1" strike="noStrike" u="sng">
+                <a:solidFill>
+                  <a:srgbClr val="7f007f"/>
+                </a:solidFill>
+                <a:uFillTx/>
+                <a:latin typeface="Monospace"/>
+                <a:ea typeface="Monospace"/>
+              </a:rPr>
+              <a:t>idbarang</a:t>
+            </a:r>
+            <a:r>
+              <a:rPr b="1" lang="en-US" sz="1800" spc="-1" strike="noStrike">
+                <a:solidFill>
+                  <a:srgbClr val="3c3c3c"/>
+                </a:solidFill>
+                <a:latin typeface="Monospace"/>
+                <a:ea typeface="Monospace"/>
+              </a:rPr>
+              <a:t>=</a:t>
+            </a:r>
+            <a:r>
+              <a:rPr b="1" i="1" lang="en-US" sz="1800" spc="-1" strike="noStrike">
+                <a:solidFill>
+                  <a:srgbClr val="2a00ff"/>
+                </a:solidFill>
+                <a:latin typeface="Monospace"/>
+                <a:ea typeface="Monospace"/>
+              </a:rPr>
+              <a:t>"${item.id}"</a:t>
+            </a:r>
+            <a:r>
+              <a:rPr b="1" lang="en-US" sz="1800" spc="-1" strike="noStrike">
+                <a:solidFill>
+                  <a:srgbClr val="1c1c1c"/>
+                </a:solidFill>
+                <a:latin typeface="Monospace"/>
+              </a:rPr>
+              <a:t> </a:t>
+            </a:r>
+            <a:r>
+              <a:rPr b="1" lang="en-US" sz="1800" spc="-1" strike="noStrike" u="sng">
+                <a:solidFill>
+                  <a:srgbClr val="7f007f"/>
+                </a:solidFill>
+                <a:uFillTx/>
+                <a:latin typeface="Monospace"/>
+                <a:ea typeface="Monospace"/>
+              </a:rPr>
+              <a:t>th:data-nmbarang</a:t>
+            </a:r>
+            <a:r>
+              <a:rPr b="1" lang="en-US" sz="1800" spc="-1" strike="noStrike">
+                <a:solidFill>
+                  <a:srgbClr val="3c3c3c"/>
+                </a:solidFill>
+                <a:latin typeface="Monospace"/>
+                <a:ea typeface="Monospace"/>
+              </a:rPr>
+              <a:t>=</a:t>
+            </a:r>
+            <a:r>
+              <a:rPr b="1" i="1" lang="en-US" sz="1800" spc="-1" strike="noStrike">
+                <a:solidFill>
+                  <a:srgbClr val="2a00ff"/>
+                </a:solidFill>
+                <a:latin typeface="Monospace"/>
+                <a:ea typeface="Monospace"/>
+              </a:rPr>
+              <a:t>"${item.namaBarang}"</a:t>
+            </a:r>
+            <a:r>
+              <a:rPr b="1" lang="en-US" sz="1800" spc="-1" strike="noStrike">
+                <a:solidFill>
+                  <a:srgbClr val="1c1c1c"/>
+                </a:solidFill>
+                <a:latin typeface="Monospace"/>
+              </a:rPr>
+              <a:t> </a:t>
+            </a:r>
+            <a:r>
+              <a:rPr b="1" lang="en-US" sz="1800" spc="-1" strike="noStrike" u="sng">
+                <a:solidFill>
+                  <a:srgbClr val="7f007f"/>
+                </a:solidFill>
+                <a:uFillTx/>
+                <a:latin typeface="Monospace"/>
+                <a:ea typeface="Monospace"/>
+              </a:rPr>
+              <a:t>th:data-</a:t>
+            </a:r>
+            <a:r>
+              <a:rPr b="1" lang="en-US" sz="1800" spc="-1" strike="noStrike" u="sng">
+                <a:solidFill>
+                  <a:srgbClr val="7f007f"/>
+                </a:solidFill>
+                <a:uFillTx/>
+                <a:latin typeface="Monospace"/>
+                <a:ea typeface="Monospace"/>
+              </a:rPr>
+              <a:t>jnsbarang</a:t>
+            </a:r>
+            <a:r>
+              <a:rPr b="1" lang="en-US" sz="1800" spc="-1" strike="noStrike">
+                <a:solidFill>
+                  <a:srgbClr val="3c3c3c"/>
+                </a:solidFill>
+                <a:latin typeface="Monospace"/>
+                <a:ea typeface="Monospace"/>
+              </a:rPr>
+              <a:t>=</a:t>
+            </a:r>
+            <a:r>
+              <a:rPr b="1" i="1" lang="en-US" sz="1800" spc="-1" strike="noStrike">
+                <a:solidFill>
+                  <a:srgbClr val="2a00ff"/>
+                </a:solidFill>
+                <a:latin typeface="Monospace"/>
+                <a:ea typeface="Monospace"/>
+              </a:rPr>
+              <a:t>"${item.jenisBarang}"</a:t>
+            </a:r>
+            <a:r>
+              <a:rPr b="1" lang="en-US" sz="1800" spc="-1" strike="noStrike">
+                <a:solidFill>
+                  <a:srgbClr val="1c1c1c"/>
+                </a:solidFill>
+                <a:latin typeface="Monospace"/>
+              </a:rPr>
+              <a:t> </a:t>
+            </a:r>
+            <a:r>
+              <a:rPr b="1" lang="en-US" sz="1800" spc="-1" strike="noStrike" u="sng">
+                <a:solidFill>
+                  <a:srgbClr val="7f007f"/>
+                </a:solidFill>
+                <a:uFillTx/>
+                <a:latin typeface="Monospace"/>
+                <a:ea typeface="Monospace"/>
+              </a:rPr>
+              <a:t>th:data-ktpembuat</a:t>
+            </a:r>
+            <a:r>
+              <a:rPr b="1" lang="en-US" sz="1800" spc="-1" strike="noStrike">
+                <a:solidFill>
+                  <a:srgbClr val="3c3c3c"/>
+                </a:solidFill>
+                <a:latin typeface="Monospace"/>
+                <a:ea typeface="Monospace"/>
+              </a:rPr>
+              <a:t>=</a:t>
+            </a:r>
+            <a:r>
+              <a:rPr b="1" i="1" lang="en-US" sz="1800" spc="-1" strike="noStrike">
+                <a:solidFill>
+                  <a:srgbClr val="2a00ff"/>
+                </a:solidFill>
+                <a:latin typeface="Monospace"/>
+                <a:ea typeface="Monospace"/>
+              </a:rPr>
+              <a:t>"$</a:t>
+            </a:r>
+            <a:r>
+              <a:rPr b="1" i="1" lang="en-US" sz="1800" spc="-1" strike="noStrike">
+                <a:solidFill>
+                  <a:srgbClr val="2a00ff"/>
+                </a:solidFill>
+                <a:latin typeface="Monospace"/>
+                <a:ea typeface="Monospace"/>
+              </a:rPr>
+              <a:t>{item.kotaPembuat}"</a:t>
+            </a:r>
+            <a:r>
+              <a:rPr b="1" lang="en-US" sz="1800" spc="-1" strike="noStrike">
+                <a:solidFill>
+                  <a:srgbClr val="1c1c1c"/>
+                </a:solidFill>
+                <a:latin typeface="Monospace"/>
+              </a:rPr>
+              <a:t> </a:t>
+            </a:r>
+            <a:r>
+              <a:rPr b="1" lang="en-US" sz="1800" spc="-1" strike="noStrike" u="sng">
+                <a:solidFill>
+                  <a:srgbClr val="7f007f"/>
+                </a:solidFill>
+                <a:uFillTx/>
+                <a:latin typeface="Monospace"/>
+                <a:ea typeface="Monospace"/>
+              </a:rPr>
+              <a:t>th:data-jmlbarang</a:t>
+            </a:r>
+            <a:r>
+              <a:rPr b="1" lang="en-US" sz="1800" spc="-1" strike="noStrike">
+                <a:solidFill>
+                  <a:srgbClr val="3c3c3c"/>
+                </a:solidFill>
+                <a:latin typeface="Monospace"/>
+                <a:ea typeface="Monospace"/>
+              </a:rPr>
+              <a:t>=</a:t>
+            </a:r>
+            <a:r>
+              <a:rPr b="1" i="1" lang="en-US" sz="1800" spc="-1" strike="noStrike">
+                <a:solidFill>
+                  <a:srgbClr val="2a00ff"/>
+                </a:solidFill>
+                <a:latin typeface="Monospace"/>
+                <a:ea typeface="Monospace"/>
+              </a:rPr>
+              <a:t>"${item.jmlBarang}"</a:t>
+            </a:r>
+            <a:r>
+              <a:rPr b="1" lang="en-US" sz="1800" spc="-1" strike="noStrike">
+                <a:solidFill>
+                  <a:srgbClr val="1c1c1c"/>
+                </a:solidFill>
+                <a:latin typeface="Monospace"/>
+              </a:rPr>
+              <a:t> </a:t>
+            </a:r>
+            <a:r>
+              <a:rPr b="1" lang="en-US" sz="1800" spc="-1" strike="noStrike" u="sng">
+                <a:solidFill>
+                  <a:srgbClr val="7f007f"/>
+                </a:solidFill>
+                <a:uFillTx/>
+                <a:latin typeface="Monospace"/>
+                <a:ea typeface="Monospace"/>
+              </a:rPr>
+              <a:t>th:data-</a:t>
+            </a:r>
+            <a:r>
+              <a:rPr b="1" lang="en-US" sz="1800" spc="-1" strike="noStrike" u="sng">
+                <a:solidFill>
+                  <a:srgbClr val="7f007f"/>
+                </a:solidFill>
+                <a:uFillTx/>
+                <a:latin typeface="Monospace"/>
+                <a:ea typeface="Monospace"/>
+              </a:rPr>
+              <a:t>hrgbarang</a:t>
+            </a:r>
+            <a:r>
+              <a:rPr b="1" lang="en-US" sz="1800" spc="-1" strike="noStrike">
+                <a:solidFill>
+                  <a:srgbClr val="3c3c3c"/>
+                </a:solidFill>
+                <a:latin typeface="Monospace"/>
+                <a:ea typeface="Monospace"/>
+              </a:rPr>
+              <a:t>=</a:t>
+            </a:r>
+            <a:r>
+              <a:rPr b="1" i="1" lang="en-US" sz="1800" spc="-1" strike="noStrike">
+                <a:solidFill>
+                  <a:srgbClr val="2a00ff"/>
+                </a:solidFill>
+                <a:latin typeface="Monospace"/>
+                <a:ea typeface="Monospace"/>
+              </a:rPr>
+              <a:t>"${item.hargaBarang}"</a:t>
+            </a:r>
+            <a:r>
+              <a:rPr b="1" lang="en-US" sz="1800" spc="-1" strike="noStrike">
+                <a:solidFill>
+                  <a:srgbClr val="008080"/>
+                </a:solidFill>
+                <a:latin typeface="Monospace"/>
+                <a:ea typeface="Monospace"/>
+              </a:rPr>
+              <a:t>&gt; + </a:t>
+            </a:r>
+            <a:r>
+              <a:rPr b="1" lang="en-US" sz="1800" spc="-1" strike="noStrike">
+                <a:solidFill>
+                  <a:srgbClr val="008080"/>
+                </a:solidFill>
+                <a:latin typeface="Monospace"/>
+                <a:ea typeface="Monospace"/>
+              </a:rPr>
+              <a:t>	</a:t>
+            </a:r>
+            <a:r>
+              <a:rPr b="1" lang="en-US" sz="1800" spc="-1" strike="noStrike">
+                <a:solidFill>
+                  <a:srgbClr val="008080"/>
+                </a:solidFill>
+                <a:latin typeface="Monospace"/>
+                <a:ea typeface="Monospace"/>
+              </a:rPr>
+              <a:t>	</a:t>
+            </a:r>
+            <a:r>
+              <a:rPr b="1" lang="en-US" sz="1800" spc="-1" strike="noStrike">
+                <a:solidFill>
+                  <a:srgbClr val="008080"/>
+                </a:solidFill>
+                <a:latin typeface="Monospace"/>
+                <a:ea typeface="Monospace"/>
+              </a:rPr>
+              <a:t>	</a:t>
+            </a:r>
+            <a:endParaRPr b="1" lang="en-US" sz="1800" spc="-1" strike="noStrike">
+              <a:solidFill>
+                <a:srgbClr val="1c1c1c"/>
+              </a:solidFill>
+              <a:latin typeface="Monospace"/>
+              <a:ea typeface="Monospace"/>
+            </a:endParaRPr>
+          </a:p>
+          <a:p>
+            <a:r>
+              <a:rPr b="1" lang="en-US" sz="1800" spc="-1" strike="noStrike">
+                <a:solidFill>
+                  <a:srgbClr val="008080"/>
+                </a:solidFill>
+                <a:latin typeface="Monospace"/>
+                <a:ea typeface="Monospace"/>
+              </a:rPr>
+              <a:t>        </a:t>
+            </a:r>
+            <a:r>
+              <a:rPr b="1" lang="en-US" sz="1800" spc="-1" strike="noStrike">
+                <a:solidFill>
+                  <a:srgbClr val="008080"/>
+                </a:solidFill>
+                <a:latin typeface="Monospace"/>
+                <a:ea typeface="Monospace"/>
+              </a:rPr>
+              <a:t>&lt;/</a:t>
+            </a:r>
+            <a:r>
+              <a:rPr b="1" lang="en-US" sz="1800" spc="-1" strike="noStrike">
+                <a:solidFill>
+                  <a:srgbClr val="3f7f7f"/>
+                </a:solidFill>
+                <a:latin typeface="Monospace"/>
+                <a:ea typeface="Monospace"/>
+              </a:rPr>
+              <a:t>button</a:t>
+            </a:r>
+            <a:r>
+              <a:rPr b="1" lang="en-US" sz="1800" spc="-1" strike="noStrike">
+                <a:solidFill>
+                  <a:srgbClr val="008080"/>
+                </a:solidFill>
+                <a:latin typeface="Monospace"/>
+                <a:ea typeface="Monospace"/>
+              </a:rPr>
+              <a:t>&gt;</a:t>
+            </a:r>
+            <a:endParaRPr b="1" lang="en-US" sz="1800" spc="-1" strike="noStrike">
+              <a:solidFill>
+                <a:srgbClr val="1c1c1c"/>
+              </a:solidFill>
+              <a:latin typeface="Monospace"/>
+              <a:ea typeface="Monospace"/>
+            </a:endParaRPr>
+          </a:p>
+          <a:p>
+            <a:r>
+              <a:rPr b="1" lang="en-US" sz="1800" spc="-1" strike="noStrike">
+                <a:solidFill>
+                  <a:srgbClr val="008080"/>
+                </a:solidFill>
+                <a:latin typeface="Monospace"/>
+                <a:ea typeface="Monospace"/>
+              </a:rPr>
+              <a:t>    </a:t>
+            </a:r>
+            <a:r>
+              <a:rPr b="1" lang="en-US" sz="1800" spc="-1" strike="noStrike">
+                <a:solidFill>
+                  <a:srgbClr val="008080"/>
+                </a:solidFill>
+                <a:latin typeface="Monospace"/>
+                <a:ea typeface="Monospace"/>
+              </a:rPr>
+              <a:t>&lt;/</a:t>
+            </a:r>
+            <a:r>
+              <a:rPr b="1" lang="en-US" sz="1800" spc="-1" strike="noStrike">
+                <a:solidFill>
+                  <a:srgbClr val="3f7f7f"/>
+                </a:solidFill>
+                <a:latin typeface="Monospace"/>
+                <a:ea typeface="Monospace"/>
+              </a:rPr>
+              <a:t>td</a:t>
+            </a:r>
+            <a:r>
+              <a:rPr b="1" lang="en-US" sz="1800" spc="-1" strike="noStrike">
+                <a:solidFill>
+                  <a:srgbClr val="008080"/>
+                </a:solidFill>
+                <a:latin typeface="Monospace"/>
+                <a:ea typeface="Monospace"/>
+              </a:rPr>
+              <a:t>&gt;</a:t>
+            </a:r>
+            <a:endParaRPr b="1" lang="en-US" sz="1800" spc="-1" strike="noStrike">
+              <a:solidFill>
+                <a:srgbClr val="1c1c1c"/>
+              </a:solidFill>
+              <a:latin typeface="Monospace"/>
+              <a:ea typeface="Monospace"/>
+            </a:endParaRPr>
+          </a:p>
+          <a:p>
+            <a:r>
+              <a:rPr b="1" lang="en-US" sz="1800" spc="-1" strike="noStrike">
+                <a:solidFill>
+                  <a:srgbClr val="008080"/>
+                </a:solidFill>
+                <a:latin typeface="Monospace"/>
+                <a:ea typeface="Monospace"/>
+              </a:rPr>
+              <a:t>&lt;/</a:t>
+            </a:r>
+            <a:r>
+              <a:rPr b="1" lang="en-US" sz="1800" spc="-1" strike="noStrike">
+                <a:solidFill>
+                  <a:srgbClr val="3f7f7f"/>
+                </a:solidFill>
+                <a:latin typeface="Monospace"/>
+                <a:ea typeface="Monospace"/>
+              </a:rPr>
+              <a:t>tr</a:t>
+            </a:r>
+            <a:r>
+              <a:rPr b="1" lang="en-US" sz="1800" spc="-1" strike="noStrike">
+                <a:solidFill>
+                  <a:srgbClr val="008080"/>
+                </a:solidFill>
+                <a:latin typeface="Monospace"/>
+                <a:ea typeface="Monospace"/>
+              </a:rPr>
+              <a:t>&gt;</a:t>
+            </a:r>
+            <a:r>
+              <a:rPr b="1" lang="en-US" sz="1800" spc="-1" strike="noStrike">
+                <a:solidFill>
+                  <a:srgbClr val="3c3c3c"/>
+                </a:solidFill>
+                <a:latin typeface="Monospace"/>
+                <a:ea typeface="Monospace"/>
+              </a:rPr>
+              <a:t>	</a:t>
+            </a:r>
+            <a:endParaRPr b="1" lang="en-US" sz="1800" spc="-1" strike="noStrike">
+              <a:solidFill>
+                <a:srgbClr val="1c1c1c"/>
+              </a:solidFill>
+              <a:latin typeface="Monospace"/>
+              <a:ea typeface="Monospace"/>
+            </a:endParaRPr>
+          </a:p>
+          <a:p>
+            <a:endParaRPr b="1" lang="en-US" sz="1800" spc="-1" strike="noStrike">
+              <a:solidFill>
+                <a:srgbClr val="1c1c1c"/>
+              </a:solidFill>
+              <a:latin typeface="Monospace"/>
+              <a:ea typeface="Monospace"/>
+            </a:endParaRPr>
+          </a:p>
+        </p:txBody>
+      </p:sp>
+    </p:spTree>
+  </p:cSld>
+  <p:timing>
+    <p:tnLst>
+      <p:par>
+        <p:cTn id="31" dur="indefinite" restart="never" nodeType="tmRoot">
+          <p:childTnLst>
+            <p:seq>
+              <p:cTn id="32" dur="indefinite" nodeType="mainSeq"/>
+              <p:prevCondLst>
+                <p:cond delay="0" evt="onPrev">
+                  <p:tgtEl>
+                    <p:sldTgt/>
+                  </p:tgtEl>
+                </p:cond>
+              </p:prevCondLst>
+              <p:nextCondLst>
+                <p:cond delay="0" evt="onNext">
+                  <p:tgtEl>
+                    <p:sldTgt/>
+                  </p:tgtEl>
+                </p:cond>
+              </p:nextCondLst>
+            </p:seq>
+          </p:childTnLst>
+        </p:cTn>
+      </p:par>
+    </p:tnLst>
+  </p:timing>
+</p:sld>
+</file>
+
+<file path=ppt/slides/slide17.xml><?xml version="1.0" encoding="utf-8"?>
+<p:sld xmlns:a="http://schemas.openxmlformats.org/drawingml/2006/main" xmlns:p="http://schemas.openxmlformats.org/presentationml/2006/main" xmlns:r="http://schemas.openxmlformats.org/officeDocument/2006/relationships" xmlns:p14="http://schemas.microsoft.com/office/powerpoint/2010/main" xmlns:p15="http://schemas.microsoft.com/office/powerpoint/2012/main" xmlns:mc="http://schemas.openxmlformats.org/markup-compatibility/2006">
+  <p:cSld>
+    <p:spTree>
+      <p:nvGrpSpPr>
+        <p:cNvPr id="1" name=""/>
+        <p:cNvGrpSpPr/>
+        <p:nvPr/>
+      </p:nvGrpSpPr>
+      <p:grpSpPr>
+        <a:xfrm>
+          <a:off x="0" y="0"/>
+          <a:ext cx="0" cy="0"/>
+          <a:chOff x="0" y="0"/>
+          <a:chExt cx="0" cy="0"/>
+        </a:xfrm>
+      </p:grpSpPr>
+      <p:sp>
+        <p:nvSpPr>
+          <p:cNvPr id="126" name="TextShape 1"/>
+          <p:cNvSpPr txBox="1"/>
+          <p:nvPr/>
+        </p:nvSpPr>
+        <p:spPr>
+          <a:xfrm>
+            <a:off x="360000" y="360000"/>
+            <a:ext cx="9360000" cy="900000"/>
+          </a:xfrm>
+          <a:prstGeom prst="rect">
+            <a:avLst/>
+          </a:prstGeom>
+          <a:noFill/>
+          <a:ln>
+            <a:noFill/>
+          </a:ln>
+        </p:spPr>
+        <p:txBody>
+          <a:bodyPr lIns="0" rIns="0" tIns="0" bIns="0" anchor="b"/>
+          <a:p>
+            <a:endParaRPr b="1" lang="en-US" sz="3200" spc="-1" strike="noStrike">
+              <a:solidFill>
+                <a:srgbClr val="ffffff"/>
+              </a:solidFill>
+              <a:latin typeface="Source Sans Pro Black"/>
+            </a:endParaRPr>
+          </a:p>
+        </p:txBody>
+      </p:sp>
+      <p:sp>
+        <p:nvSpPr>
+          <p:cNvPr id="127" name="TextShape 2"/>
+          <p:cNvSpPr txBox="1"/>
+          <p:nvPr/>
+        </p:nvSpPr>
+        <p:spPr>
+          <a:xfrm>
+            <a:off x="360000" y="1980000"/>
+            <a:ext cx="9180000" cy="4680000"/>
+          </a:xfrm>
+          <a:prstGeom prst="rect">
+            <a:avLst/>
+          </a:prstGeom>
+          <a:noFill/>
+          <a:ln>
+            <a:noFill/>
+          </a:ln>
+        </p:spPr>
+        <p:txBody>
+          <a:bodyPr lIns="0" rIns="0" tIns="0" bIns="0">
+            <a:normAutofit/>
+          </a:bodyPr>
+          <a:p>
+            <a:endParaRPr b="1" lang="en-US" sz="2600" spc="-1" strike="noStrike">
+              <a:solidFill>
+                <a:srgbClr val="1c1c1c"/>
+              </a:solidFill>
+              <a:latin typeface="Source Sans Pro Semibold"/>
+            </a:endParaRPr>
+          </a:p>
+        </p:txBody>
+      </p:sp>
+    </p:spTree>
+  </p:cSld>
+  <p:timing>
+    <p:tnLst>
+      <p:par>
+        <p:cTn id="33" dur="indefinite" restart="never" nodeType="tmRoot">
+          <p:childTnLst>
+            <p:seq>
+              <p:cTn id="34" dur="indefinite" nodeType="mainSeq"/>
+              <p:prevCondLst>
+                <p:cond delay="0" evt="onPrev">
+                  <p:tgtEl>
+                    <p:sldTgt/>
+                  </p:tgtEl>
+                </p:cond>
+              </p:prevCondLst>
+              <p:nextCondLst>
+                <p:cond delay="0" evt="onNext">
+                  <p:tgtEl>
+                    <p:sldTgt/>
+                  </p:tgtEl>
+                </p:cond>
+              </p:nextCondLst>
+            </p:seq>
+          </p:childTnLst>
+        </p:cTn>
+      </p:par>
+    </p:tnLst>
+  </p:timing>
+</p:sld>
+</file>
+
+<file path=ppt/slides/slide18.xml><?xml version="1.0" encoding="utf-8"?>
+<p:sld xmlns:a="http://schemas.openxmlformats.org/drawingml/2006/main" xmlns:p="http://schemas.openxmlformats.org/presentationml/2006/main" xmlns:r="http://schemas.openxmlformats.org/officeDocument/2006/relationships" xmlns:p14="http://schemas.microsoft.com/office/powerpoint/2010/main" xmlns:p15="http://schemas.microsoft.com/office/powerpoint/2012/main" xmlns:mc="http://schemas.openxmlformats.org/markup-compatibility/2006">
+  <p:cSld>
+    <p:spTree>
+      <p:nvGrpSpPr>
+        <p:cNvPr id="1" name=""/>
+        <p:cNvGrpSpPr/>
+        <p:nvPr/>
+      </p:nvGrpSpPr>
+      <p:grpSpPr>
+        <a:xfrm>
+          <a:off x="0" y="0"/>
+          <a:ext cx="0" cy="0"/>
+          <a:chOff x="0" y="0"/>
+          <a:chExt cx="0" cy="0"/>
+        </a:xfrm>
+      </p:grpSpPr>
+      <p:sp>
+        <p:nvSpPr>
+          <p:cNvPr id="128" name="TextShape 1"/>
+          <p:cNvSpPr txBox="1"/>
+          <p:nvPr/>
+        </p:nvSpPr>
+        <p:spPr>
+          <a:xfrm>
+            <a:off x="360000" y="360000"/>
+            <a:ext cx="9360000" cy="900000"/>
+          </a:xfrm>
+          <a:prstGeom prst="rect">
+            <a:avLst/>
+          </a:prstGeom>
+          <a:noFill/>
+          <a:ln>
+            <a:noFill/>
+          </a:ln>
+        </p:spPr>
+        <p:txBody>
+          <a:bodyPr lIns="0" rIns="0" tIns="0" bIns="0" anchor="b"/>
+          <a:p>
+            <a:endParaRPr b="1" lang="en-US" sz="3200" spc="-1" strike="noStrike">
+              <a:solidFill>
+                <a:srgbClr val="ffffff"/>
+              </a:solidFill>
+              <a:latin typeface="Source Sans Pro Black"/>
+            </a:endParaRPr>
+          </a:p>
+        </p:txBody>
+      </p:sp>
+      <p:sp>
+        <p:nvSpPr>
+          <p:cNvPr id="129" name="TextShape 2"/>
+          <p:cNvSpPr txBox="1"/>
+          <p:nvPr/>
+        </p:nvSpPr>
+        <p:spPr>
+          <a:xfrm>
+            <a:off x="360000" y="1980000"/>
+            <a:ext cx="9180000" cy="4680000"/>
+          </a:xfrm>
+          <a:prstGeom prst="rect">
+            <a:avLst/>
+          </a:prstGeom>
+          <a:noFill/>
+          <a:ln>
+            <a:noFill/>
+          </a:ln>
+        </p:spPr>
+        <p:txBody>
+          <a:bodyPr lIns="0" rIns="0" tIns="0" bIns="0">
+            <a:normAutofit/>
+          </a:bodyPr>
+          <a:p>
+            <a:endParaRPr b="1" lang="en-US" sz="2600" spc="-1" strike="noStrike">
+              <a:solidFill>
+                <a:srgbClr val="1c1c1c"/>
+              </a:solidFill>
+              <a:latin typeface="Source Sans Pro Semibold"/>
+            </a:endParaRPr>
+          </a:p>
+        </p:txBody>
+      </p:sp>
+    </p:spTree>
+  </p:cSld>
+  <p:timing>
+    <p:tnLst>
+      <p:par>
+        <p:cTn id="35" dur="indefinite" restart="never" nodeType="tmRoot">
+          <p:childTnLst>
+            <p:seq>
+              <p:cTn id="36" dur="indefinite" nodeType="mainSeq"/>
+              <p:prevCondLst>
+                <p:cond delay="0" evt="onPrev">
+                  <p:tgtEl>
+                    <p:sldTgt/>
+                  </p:tgtEl>
+                </p:cond>
+              </p:prevCondLst>
+              <p:nextCondLst>
+                <p:cond delay="0" evt="onNext">
+                  <p:tgtEl>
+                    <p:sldTgt/>
+                  </p:tgtEl>
+                </p:cond>
+              </p:nextCondLst>
+            </p:seq>
+          </p:childTnLst>
+        </p:cTn>
+      </p:par>
+    </p:tnLst>
+  </p:timing>
 </p:sld>
 </file>
 
@@ -4130,6 +6979,33 @@
       </p:pic>
     </p:spTree>
   </p:cSld>
+  <p:timing>
+    <p:tnLst>
+      <p:par>
+        <p:cTn id="3" dur="indefinite" restart="never" nodeType="tmRoot">
+          <p:childTnLst>
+            <p:seq>
+              <p:cTn id="4" dur="indefinite" nodeType="mainSeq"/>
+              <p:prevCondLst>
+                <p:cond delay="0" evt="onPrev">
+                  <p:tgtEl>
+                    <p:sldTgt/>
+                  </p:tgtEl>
+                </p:cond>
+              </p:prevCondLst>
+              <p:nextCondLst>
+                <p:cond delay="0" evt="onNext">
+                  <p:tgtEl>
+                    <p:sldTgt/>
+                  </p:tgtEl>
+                </p:cond>
+              </p:nextCondLst>
+            </p:seq>
+          </p:childTnLst>
+        </p:cTn>
+      </p:par>
+    </p:tnLst>
+  </p:timing>
 </p:sld>
 </file>
 
@@ -4327,6 +7203,33 @@
       </p:sp>
     </p:spTree>
   </p:cSld>
+  <p:timing>
+    <p:tnLst>
+      <p:par>
+        <p:cTn id="5" dur="indefinite" restart="never" nodeType="tmRoot">
+          <p:childTnLst>
+            <p:seq>
+              <p:cTn id="6" dur="indefinite" nodeType="mainSeq"/>
+              <p:prevCondLst>
+                <p:cond delay="0" evt="onPrev">
+                  <p:tgtEl>
+                    <p:sldTgt/>
+                  </p:tgtEl>
+                </p:cond>
+              </p:prevCondLst>
+              <p:nextCondLst>
+                <p:cond delay="0" evt="onNext">
+                  <p:tgtEl>
+                    <p:sldTgt/>
+                  </p:tgtEl>
+                </p:cond>
+              </p:nextCondLst>
+            </p:seq>
+          </p:childTnLst>
+        </p:cTn>
+      </p:par>
+    </p:tnLst>
+  </p:timing>
 </p:sld>
 </file>
 
@@ -4527,10 +7430,10 @@
   <p:timing>
     <p:tnLst>
       <p:par>
-        <p:cTn id="1" dur="indefinite" restart="never" nodeType="tmRoot">
+        <p:cTn id="7" dur="indefinite" restart="never" nodeType="tmRoot">
           <p:childTnLst>
             <p:seq>
-              <p:cTn id="2" dur="indefinite" nodeType="mainSeq"/>
+              <p:cTn id="8" dur="indefinite" nodeType="mainSeq"/>
               <p:prevCondLst>
                 <p:cond delay="0" evt="onPrev">
                   <p:tgtEl>
@@ -4647,7 +7550,7 @@
                 </a:solidFill>
                 <a:latin typeface="Source Sans Pro Semibold"/>
               </a:rPr>
-              <a:t>1. Gandeng css dan jquery yang di perlukan untuk membuat layout sesuai tampilan</a:t>
+              <a:t>1. Buka file transaction.html - gandeng css dan jquery yang di perlukan untuk membuat layout sesuai tampilan</a:t>
             </a:r>
             <a:endParaRPr b="1" lang="en-US" sz="2600" spc="-1" strike="noStrike">
               <a:solidFill>
@@ -4751,97 +7654,13 @@
               </a:spcAft>
             </a:pPr>
             <a:r>
-              <a:rPr b="0" lang="en-US" sz="2200" spc="-1" strike="noStrike">
+              <a:rPr b="1" lang="en-US" sz="2200" spc="-1" strike="noStrike">
                 <a:solidFill>
                   <a:srgbClr val="1c1c1c"/>
                 </a:solidFill>
                 <a:latin typeface="Source Sans Pro Light"/>
               </a:rPr>
-              <a:t>&lt;div class="row"&gt;</a:t>
-            </a:r>
-            <a:endParaRPr b="0" lang="en-US" sz="2200" spc="-1" strike="noStrike">
-              <a:solidFill>
-                <a:srgbClr val="1c1c1c"/>
-              </a:solidFill>
-              <a:latin typeface="Source Sans Pro Light"/>
-            </a:endParaRPr>
-          </a:p>
-          <a:p>
-            <a:pPr lvl="1" marL="288000">
-              <a:spcAft>
-                <a:spcPts val="1134"/>
-              </a:spcAft>
-            </a:pPr>
-            <a:r>
-              <a:rPr b="0" lang="en-US" sz="2200" spc="-1" strike="noStrike">
-                <a:solidFill>
-                  <a:srgbClr val="1c1c1c"/>
-                </a:solidFill>
-                <a:latin typeface="Source Sans Pro Light"/>
-              </a:rPr>
-              <a:t>  </a:t>
-            </a:r>
-            <a:r>
-              <a:rPr b="0" lang="en-US" sz="2200" spc="-1" strike="noStrike">
-                <a:solidFill>
-                  <a:srgbClr val="1c1c1c"/>
-                </a:solidFill>
-                <a:latin typeface="Source Sans Pro Light"/>
-              </a:rPr>
-              <a:t>&lt;div class="col-md-6"&gt;.col-md-6&lt;/div&gt;</a:t>
-            </a:r>
-            <a:endParaRPr b="0" lang="en-US" sz="2200" spc="-1" strike="noStrike">
-              <a:solidFill>
-                <a:srgbClr val="1c1c1c"/>
-              </a:solidFill>
-              <a:latin typeface="Source Sans Pro Light"/>
-            </a:endParaRPr>
-          </a:p>
-          <a:p>
-            <a:pPr lvl="1" marL="288000">
-              <a:spcAft>
-                <a:spcPts val="1134"/>
-              </a:spcAft>
-            </a:pPr>
-            <a:r>
-              <a:rPr b="0" lang="en-US" sz="2200" spc="-1" strike="noStrike">
-                <a:solidFill>
-                  <a:srgbClr val="1c1c1c"/>
-                </a:solidFill>
-                <a:latin typeface="Source Sans Pro Light"/>
-              </a:rPr>
-              <a:t>  </a:t>
-            </a:r>
-            <a:r>
-              <a:rPr b="0" lang="en-US" sz="2200" spc="-1" strike="noStrike">
-                <a:solidFill>
-                  <a:srgbClr val="1c1c1c"/>
-                </a:solidFill>
-                <a:latin typeface="Source Sans Pro Light"/>
-              </a:rPr>
-              <a:t>&lt;div class="col-md-6"&gt;.col-md-6&lt;/div&gt;</a:t>
-            </a:r>
-            <a:endParaRPr b="0" lang="en-US" sz="2200" spc="-1" strike="noStrike">
-              <a:solidFill>
-                <a:srgbClr val="1c1c1c"/>
-              </a:solidFill>
-              <a:latin typeface="Source Sans Pro Light"/>
-            </a:endParaRPr>
-          </a:p>
-          <a:p>
-            <a:pPr lvl="1" marL="288000">
-              <a:spcAft>
-                <a:spcPts val="1134"/>
-              </a:spcAft>
-            </a:pPr>
-            <a:r>
-              <a:rPr b="0" lang="en-US" sz="2200" spc="-1" strike="noStrike">
-                <a:solidFill>
-                  <a:srgbClr val="1c1c1c"/>
-                </a:solidFill>
-                <a:latin typeface="Source Sans Pro Light"/>
-              </a:rPr>
-              <a:t>&lt;/div&gt;</a:t>
+              <a:t> </a:t>
             </a:r>
             <a:endParaRPr b="0" lang="en-US" sz="2200" spc="-1" strike="noStrike">
               <a:solidFill>
@@ -4854,6 +7673,33 @@
       </p:sp>
     </p:spTree>
   </p:cSld>
+  <p:timing>
+    <p:tnLst>
+      <p:par>
+        <p:cTn id="9" dur="indefinite" restart="never" nodeType="tmRoot">
+          <p:childTnLst>
+            <p:seq>
+              <p:cTn id="10" dur="indefinite" nodeType="mainSeq"/>
+              <p:prevCondLst>
+                <p:cond delay="0" evt="onPrev">
+                  <p:tgtEl>
+                    <p:sldTgt/>
+                  </p:tgtEl>
+                </p:cond>
+              </p:prevCondLst>
+              <p:nextCondLst>
+                <p:cond delay="0" evt="onNext">
+                  <p:tgtEl>
+                    <p:sldTgt/>
+                  </p:tgtEl>
+                </p:cond>
+              </p:nextCondLst>
+            </p:seq>
+          </p:childTnLst>
+        </p:cTn>
+      </p:par>
+    </p:tnLst>
+  </p:timing>
 </p:sld>
 </file>
 
@@ -4896,6 +7742,15 @@
         <p:txBody>
           <a:bodyPr lIns="0" rIns="0" tIns="0" bIns="0" anchor="b"/>
           <a:p>
+            <a:r>
+              <a:rPr b="1" lang="en-US" sz="3200" spc="-1" strike="noStrike">
+                <a:solidFill>
+                  <a:srgbClr val="ffffff"/>
+                </a:solidFill>
+                <a:latin typeface="Source Sans Pro Black"/>
+              </a:rPr>
+              <a:t>View – with 2 sections</a:t>
+            </a:r>
             <a:endParaRPr b="1" lang="en-US" sz="3200" spc="-1" strike="noStrike">
               <a:solidFill>
                 <a:srgbClr val="ffffff"/>
@@ -4913,8 +7768,8 @@
         </p:nvSpPr>
         <p:spPr>
           <a:xfrm>
-            <a:off x="360000" y="1980000"/>
-            <a:ext cx="9180000" cy="4680000"/>
+            <a:off x="457200" y="1828800"/>
+            <a:ext cx="6126480" cy="1517760"/>
           </a:xfrm>
           <a:prstGeom prst="rect">
             <a:avLst/>
@@ -4925,21 +7780,117 @@
           </a:ln>
         </p:spPr>
         <p:txBody>
-          <a:bodyPr lIns="0" rIns="0" tIns="0" bIns="0">
-            <a:normAutofit/>
-          </a:bodyPr>
-          <a:p>
-            <a:endParaRPr b="1" lang="en-US" sz="2600" spc="-1" strike="noStrike">
-              <a:solidFill>
-                <a:srgbClr val="1c1c1c"/>
-              </a:solidFill>
-              <a:latin typeface="Source Sans Pro Semibold"/>
-            </a:endParaRPr>
-          </a:p>
-        </p:txBody>
-      </p:sp>
+          <a:bodyPr lIns="90000" rIns="90000" tIns="45000" bIns="45000"/>
+          <a:p>
+            <a:r>
+              <a:rPr b="1" lang="en-US" sz="1800" spc="-1" strike="noStrike">
+                <a:latin typeface="Source Sans Pro"/>
+              </a:rPr>
+              <a:t>&lt;div class="row"&gt;</a:t>
+            </a:r>
+            <a:endParaRPr b="0" lang="en-US" sz="1800" spc="-1" strike="noStrike">
+              <a:latin typeface="Source Sans Pro"/>
+            </a:endParaRPr>
+          </a:p>
+          <a:p>
+            <a:r>
+              <a:rPr b="1" lang="en-US" sz="1800" spc="-1" strike="noStrike">
+                <a:latin typeface="Source Sans Pro"/>
+              </a:rPr>
+              <a:t>  </a:t>
+            </a:r>
+            <a:r>
+              <a:rPr b="1" lang="en-US" sz="1800" spc="-1" strike="noStrike">
+                <a:latin typeface="Source Sans Pro"/>
+              </a:rPr>
+              <a:t>&lt;div class="col-md-6"&gt;Bagian A&lt;/div&gt;</a:t>
+            </a:r>
+            <a:endParaRPr b="0" lang="en-US" sz="1800" spc="-1" strike="noStrike">
+              <a:latin typeface="Source Sans Pro"/>
+            </a:endParaRPr>
+          </a:p>
+          <a:p>
+            <a:r>
+              <a:rPr b="1" lang="en-US" sz="1800" spc="-1" strike="noStrike">
+                <a:latin typeface="Source Sans Pro"/>
+              </a:rPr>
+              <a:t>  </a:t>
+            </a:r>
+            <a:r>
+              <a:rPr b="1" lang="en-US" sz="1800" spc="-1" strike="noStrike">
+                <a:latin typeface="Source Sans Pro"/>
+              </a:rPr>
+              <a:t>&lt;div class="col-md-6"&gt;Bagian B&lt;/div&gt;</a:t>
+            </a:r>
+            <a:endParaRPr b="0" lang="en-US" sz="1800" spc="-1" strike="noStrike">
+              <a:latin typeface="Source Sans Pro"/>
+            </a:endParaRPr>
+          </a:p>
+          <a:p>
+            <a:r>
+              <a:rPr b="1" lang="en-US" sz="1800" spc="-1" strike="noStrike">
+                <a:latin typeface="Source Sans Pro"/>
+              </a:rPr>
+              <a:t>&lt;/div&gt;</a:t>
+            </a:r>
+            <a:endParaRPr b="0" lang="en-US" sz="1800" spc="-1" strike="noStrike">
+              <a:latin typeface="Source Sans Pro"/>
+            </a:endParaRPr>
+          </a:p>
+        </p:txBody>
+      </p:sp>
+      <p:pic>
+        <p:nvPicPr>
+          <p:cNvPr id="99" name="" descr=""/>
+          <p:cNvPicPr/>
+          <p:nvPr/>
+        </p:nvPicPr>
+        <p:blipFill>
+          <a:blip r:embed="rId1"/>
+          <a:stretch/>
+        </p:blipFill>
+        <p:spPr>
+          <a:xfrm>
+            <a:off x="2712960" y="2743200"/>
+            <a:ext cx="7162560" cy="4028400"/>
+          </a:xfrm>
+          <a:prstGeom prst="rect">
+            <a:avLst/>
+          </a:prstGeom>
+          <a:ln>
+            <a:noFill/>
+          </a:ln>
+        </p:spPr>
+      </p:pic>
     </p:spTree>
   </p:cSld>
+  <p:timing>
+    <p:tnLst>
+      <p:par>
+        <p:cTn id="11" dur="indefinite" restart="never" nodeType="tmRoot">
+          <p:childTnLst>
+            <p:seq>
+              <p:cTn id="12" dur="indefinite" nodeType="mainSeq"/>
+              <p:prevCondLst>
+                <p:cond delay="0" evt="onPrev">
+                  <p:tgtEl>
+                    <p:sldTgt/>
+                  </p:tgtEl>
+                </p:cond>
+              </p:prevCondLst>
+              <p:nextCondLst>
+                <p:cond delay="0" evt="onNext">
+                  <p:tgtEl>
+                    <p:sldTgt/>
+                  </p:tgtEl>
+                </p:cond>
+              </p:nextCondLst>
+            </p:seq>
+          </p:childTnLst>
+        </p:cTn>
+      </p:par>
+    </p:tnLst>
+  </p:timing>
 </p:sld>
 </file>
 
@@ -4962,7 +7913,7 @@
       </p:grpSpPr>
       <p:sp>
         <p:nvSpPr>
-          <p:cNvPr id="99" name="TextShape 1"/>
+          <p:cNvPr id="100" name="TextShape 1"/>
           <p:cNvSpPr txBox="1"/>
           <p:nvPr/>
         </p:nvSpPr>
@@ -4982,6 +7933,15 @@
         <p:txBody>
           <a:bodyPr lIns="0" rIns="0" tIns="0" bIns="0" anchor="b"/>
           <a:p>
+            <a:r>
+              <a:rPr b="1" lang="en-US" sz="3200" spc="-1" strike="noStrike">
+                <a:solidFill>
+                  <a:srgbClr val="ffffff"/>
+                </a:solidFill>
+                <a:latin typeface="Source Sans Pro Black"/>
+              </a:rPr>
+              <a:t>View – Section A (bagian A)</a:t>
+            </a:r>
             <a:endParaRPr b="1" lang="en-US" sz="3200" spc="-1" strike="noStrike">
               <a:solidFill>
                 <a:srgbClr val="ffffff"/>
@@ -4993,7 +7953,7 @@
       </p:sp>
       <p:sp>
         <p:nvSpPr>
-          <p:cNvPr id="100" name="TextShape 2"/>
+          <p:cNvPr id="101" name="TextShape 2"/>
           <p:cNvSpPr txBox="1"/>
           <p:nvPr/>
         </p:nvSpPr>
@@ -5015,17 +7975,348 @@
             <a:normAutofit/>
           </a:bodyPr>
           <a:p>
-            <a:endParaRPr b="1" lang="en-US" sz="2600" spc="-1" strike="noStrike">
-              <a:solidFill>
-                <a:srgbClr val="1c1c1c"/>
-              </a:solidFill>
-              <a:latin typeface="Source Sans Pro Semibold"/>
-            </a:endParaRPr>
-          </a:p>
-        </p:txBody>
-      </p:sp>
+            <a:pPr>
+              <a:spcAft>
+                <a:spcPts val="1142"/>
+              </a:spcAft>
+            </a:pPr>
+            <a:r>
+              <a:rPr b="1" lang="en-US" sz="2600" spc="-1" strike="noStrike">
+                <a:solidFill>
+                  <a:srgbClr val="1c1c1c"/>
+                </a:solidFill>
+                <a:latin typeface="Source Sans Pro Semibold"/>
+              </a:rPr>
+              <a:t>1. Tambahkan label dan input sesuai gambar petunjuk – No Faktur</a:t>
+            </a:r>
+            <a:endParaRPr b="1" lang="en-US" sz="2600" spc="-1" strike="noStrike">
+              <a:solidFill>
+                <a:srgbClr val="1c1c1c"/>
+              </a:solidFill>
+              <a:latin typeface="Source Sans Pro Semibold"/>
+            </a:endParaRPr>
+          </a:p>
+          <a:p>
+            <a:pPr>
+              <a:spcAft>
+                <a:spcPts val="1142"/>
+              </a:spcAft>
+            </a:pPr>
+            <a:r>
+              <a:rPr b="1" lang="en-US" sz="2600" spc="-1" strike="noStrike">
+                <a:solidFill>
+                  <a:srgbClr val="1c1c1c"/>
+                </a:solidFill>
+                <a:latin typeface="Source Sans Pro Semibold"/>
+              </a:rPr>
+              <a:t> </a:t>
+            </a:r>
+            <a:endParaRPr b="1" lang="en-US" sz="2600" spc="-1" strike="noStrike">
+              <a:solidFill>
+                <a:srgbClr val="1c1c1c"/>
+              </a:solidFill>
+              <a:latin typeface="Source Sans Pro Semibold"/>
+            </a:endParaRPr>
+          </a:p>
+          <a:p>
+            <a:pPr>
+              <a:spcAft>
+                <a:spcPts val="1142"/>
+              </a:spcAft>
+            </a:pPr>
+            <a:r>
+              <a:rPr b="1" lang="en-US" sz="2600" spc="-1" strike="noStrike">
+                <a:solidFill>
+                  <a:srgbClr val="1c1c1c"/>
+                </a:solidFill>
+                <a:latin typeface="Source Sans Pro Semibold"/>
+              </a:rPr>
+              <a:t>2. </a:t>
+            </a:r>
+            <a:endParaRPr b="1" lang="en-US" sz="2600" spc="-1" strike="noStrike">
+              <a:solidFill>
+                <a:srgbClr val="1c1c1c"/>
+              </a:solidFill>
+              <a:latin typeface="Source Sans Pro Semibold"/>
+            </a:endParaRPr>
+          </a:p>
+          <a:p>
+            <a:pPr>
+              <a:spcAft>
+                <a:spcPts val="1142"/>
+              </a:spcAft>
+            </a:pPr>
+            <a:r>
+              <a:rPr b="1" lang="en-US" sz="1500" spc="-1" strike="noStrike">
+                <a:solidFill>
+                  <a:srgbClr val="1c1c1c"/>
+                </a:solidFill>
+                <a:latin typeface="Source Sans Pro Semibold"/>
+              </a:rPr>
+              <a:t>&lt;div class="form-group"&gt;</a:t>
+            </a:r>
+            <a:endParaRPr b="1" lang="en-US" sz="1500" spc="-1" strike="noStrike">
+              <a:solidFill>
+                <a:srgbClr val="1c1c1c"/>
+              </a:solidFill>
+              <a:latin typeface="Source Sans Pro Semibold"/>
+            </a:endParaRPr>
+          </a:p>
+          <a:p>
+            <a:pPr>
+              <a:spcAft>
+                <a:spcPts val="1142"/>
+              </a:spcAft>
+            </a:pPr>
+            <a:r>
+              <a:rPr b="1" lang="en-US" sz="1500" spc="-1" strike="noStrike">
+                <a:solidFill>
+                  <a:srgbClr val="1c1c1c"/>
+                </a:solidFill>
+                <a:latin typeface="Source Sans Pro Semibold"/>
+              </a:rPr>
+              <a:t>    </a:t>
+            </a:r>
+            <a:r>
+              <a:rPr b="1" lang="en-US" sz="1500" spc="-1" strike="noStrike">
+                <a:solidFill>
+                  <a:srgbClr val="1c1c1c"/>
+                </a:solidFill>
+                <a:latin typeface="Source Sans Pro Semibold"/>
+              </a:rPr>
+              <a:t>&lt;label for="nofaktur" class="col-sm-2 control-label"&gt;No Faktur&lt;/label&gt;</a:t>
+            </a:r>
+            <a:endParaRPr b="1" lang="en-US" sz="1500" spc="-1" strike="noStrike">
+              <a:solidFill>
+                <a:srgbClr val="1c1c1c"/>
+              </a:solidFill>
+              <a:latin typeface="Source Sans Pro Semibold"/>
+            </a:endParaRPr>
+          </a:p>
+          <a:p>
+            <a:pPr>
+              <a:spcAft>
+                <a:spcPts val="1142"/>
+              </a:spcAft>
+            </a:pPr>
+            <a:r>
+              <a:rPr b="1" lang="en-US" sz="1500" spc="-1" strike="noStrike">
+                <a:solidFill>
+                  <a:srgbClr val="1c1c1c"/>
+                </a:solidFill>
+                <a:latin typeface="Source Sans Pro Semibold"/>
+              </a:rPr>
+              <a:t>    </a:t>
+            </a:r>
+            <a:r>
+              <a:rPr b="1" lang="en-US" sz="1500" spc="-1" strike="noStrike">
+                <a:solidFill>
+                  <a:srgbClr val="1c1c1c"/>
+                </a:solidFill>
+                <a:latin typeface="Source Sans Pro Semibold"/>
+              </a:rPr>
+              <a:t>&lt;div class="col-sm-10"&gt;</a:t>
+            </a:r>
+            <a:endParaRPr b="1" lang="en-US" sz="1500" spc="-1" strike="noStrike">
+              <a:solidFill>
+                <a:srgbClr val="1c1c1c"/>
+              </a:solidFill>
+              <a:latin typeface="Source Sans Pro Semibold"/>
+            </a:endParaRPr>
+          </a:p>
+          <a:p>
+            <a:pPr>
+              <a:spcAft>
+                <a:spcPts val="1142"/>
+              </a:spcAft>
+            </a:pPr>
+            <a:r>
+              <a:rPr b="1" lang="en-US" sz="1500" spc="-1" strike="noStrike">
+                <a:solidFill>
+                  <a:srgbClr val="1c1c1c"/>
+                </a:solidFill>
+                <a:latin typeface="Source Sans Pro Semibold"/>
+              </a:rPr>
+              <a:t>      </a:t>
+            </a:r>
+            <a:r>
+              <a:rPr b="1" lang="en-US" sz="1500" spc="-1" strike="noStrike">
+                <a:solidFill>
+                  <a:srgbClr val="1c1c1c"/>
+                </a:solidFill>
+                <a:latin typeface="Source Sans Pro Semibold"/>
+              </a:rPr>
+              <a:t>&lt;input type="text" class="form-control" id="idnofaktur" placeholder="No Faktur"&gt;</a:t>
+            </a:r>
+            <a:endParaRPr b="1" lang="en-US" sz="1500" spc="-1" strike="noStrike">
+              <a:solidFill>
+                <a:srgbClr val="1c1c1c"/>
+              </a:solidFill>
+              <a:latin typeface="Source Sans Pro Semibold"/>
+            </a:endParaRPr>
+          </a:p>
+          <a:p>
+            <a:pPr>
+              <a:spcAft>
+                <a:spcPts val="1142"/>
+              </a:spcAft>
+            </a:pPr>
+            <a:r>
+              <a:rPr b="1" lang="en-US" sz="1500" spc="-1" strike="noStrike">
+                <a:solidFill>
+                  <a:srgbClr val="1c1c1c"/>
+                </a:solidFill>
+                <a:latin typeface="Source Sans Pro Semibold"/>
+              </a:rPr>
+              <a:t>    </a:t>
+            </a:r>
+            <a:r>
+              <a:rPr b="1" lang="en-US" sz="1500" spc="-1" strike="noStrike">
+                <a:solidFill>
+                  <a:srgbClr val="1c1c1c"/>
+                </a:solidFill>
+                <a:latin typeface="Source Sans Pro Semibold"/>
+              </a:rPr>
+              <a:t>&lt;/div&gt;</a:t>
+            </a:r>
+            <a:endParaRPr b="1" lang="en-US" sz="1500" spc="-1" strike="noStrike">
+              <a:solidFill>
+                <a:srgbClr val="1c1c1c"/>
+              </a:solidFill>
+              <a:latin typeface="Source Sans Pro Semibold"/>
+            </a:endParaRPr>
+          </a:p>
+          <a:p>
+            <a:pPr>
+              <a:spcAft>
+                <a:spcPts val="1142"/>
+              </a:spcAft>
+            </a:pPr>
+            <a:r>
+              <a:rPr b="1" lang="en-US" sz="1500" spc="-1" strike="noStrike">
+                <a:solidFill>
+                  <a:srgbClr val="1c1c1c"/>
+                </a:solidFill>
+                <a:latin typeface="Source Sans Pro Semibold"/>
+              </a:rPr>
+              <a:t>  </a:t>
+            </a:r>
+            <a:r>
+              <a:rPr b="1" lang="en-US" sz="1500" spc="-1" strike="noStrike">
+                <a:solidFill>
+                  <a:srgbClr val="1c1c1c"/>
+                </a:solidFill>
+                <a:latin typeface="Source Sans Pro Semibold"/>
+              </a:rPr>
+              <a:t>&lt;/div&gt;</a:t>
+            </a:r>
+            <a:endParaRPr b="1" lang="en-US" sz="1500" spc="-1" strike="noStrike">
+              <a:solidFill>
+                <a:srgbClr val="1c1c1c"/>
+              </a:solidFill>
+              <a:latin typeface="Source Sans Pro Semibold"/>
+            </a:endParaRPr>
+          </a:p>
+          <a:p>
+            <a:pPr>
+              <a:spcAft>
+                <a:spcPts val="1142"/>
+              </a:spcAft>
+            </a:pPr>
+            <a:r>
+              <a:rPr b="1" lang="en-US" sz="2600" spc="-1" strike="noStrike">
+                <a:solidFill>
+                  <a:srgbClr val="1c1c1c"/>
+                </a:solidFill>
+                <a:latin typeface="Source Sans Pro Semibold"/>
+              </a:rPr>
+              <a:t> </a:t>
+            </a:r>
+            <a:endParaRPr b="1" lang="en-US" sz="2600" spc="-1" strike="noStrike">
+              <a:solidFill>
+                <a:srgbClr val="1c1c1c"/>
+              </a:solidFill>
+              <a:latin typeface="Source Sans Pro Semibold"/>
+            </a:endParaRPr>
+          </a:p>
+          <a:p>
+            <a:pPr>
+              <a:spcAft>
+                <a:spcPts val="1142"/>
+              </a:spcAft>
+            </a:pPr>
+            <a:r>
+              <a:rPr b="1" lang="en-US" sz="2600" spc="-1" strike="noStrike">
+                <a:solidFill>
+                  <a:srgbClr val="1c1c1c"/>
+                </a:solidFill>
+                <a:latin typeface="Source Sans Pro Semibold"/>
+              </a:rPr>
+              <a:t> </a:t>
+            </a:r>
+            <a:endParaRPr b="1" lang="en-US" sz="2600" spc="-1" strike="noStrike">
+              <a:solidFill>
+                <a:srgbClr val="1c1c1c"/>
+              </a:solidFill>
+              <a:latin typeface="Source Sans Pro Semibold"/>
+            </a:endParaRPr>
+          </a:p>
+        </p:txBody>
+      </p:sp>
+      <p:pic>
+        <p:nvPicPr>
+          <p:cNvPr id="102" name="" descr=""/>
+          <p:cNvPicPr/>
+          <p:nvPr/>
+        </p:nvPicPr>
+        <p:blipFill>
+          <a:blip r:embed="rId1"/>
+          <a:stretch/>
+        </p:blipFill>
+        <p:spPr>
+          <a:xfrm>
+            <a:off x="2194560" y="2913120"/>
+            <a:ext cx="4821120" cy="653040"/>
+          </a:xfrm>
+          <a:prstGeom prst="rect">
+            <a:avLst/>
+          </a:prstGeom>
+          <a:ln>
+            <a:solidFill>
+              <a:srgbClr val="ce181e"/>
+            </a:solidFill>
+          </a:ln>
+        </p:spPr>
+      </p:pic>
     </p:spTree>
   </p:cSld>
+  <p:timing>
+    <p:tnLst>
+      <p:par>
+        <p:cTn id="13" dur="indefinite" restart="never" nodeType="tmRoot">
+          <p:childTnLst>
+            <p:seq>
+              <p:cTn id="14" dur="indefinite" nodeType="mainSeq"/>
+              <p:prevCondLst>
+                <p:cond delay="0" evt="onPrev">
+                  <p:tgtEl>
+                    <p:sldTgt/>
+                  </p:tgtEl>
+                </p:cond>
+              </p:prevCondLst>
+              <p:nextCondLst>
+                <p:cond delay="0" evt="onNext">
+                  <p:tgtEl>
+                    <p:sldTgt/>
+                  </p:tgtEl>
+                </p:cond>
+              </p:nextCondLst>
+            </p:seq>
+          </p:childTnLst>
+        </p:cTn>
+      </p:par>
+    </p:tnLst>
+  </p:timing>
 </p:sld>
 </file>
 
@@ -5048,7 +8339,7 @@
       </p:grpSpPr>
       <p:sp>
         <p:nvSpPr>
-          <p:cNvPr id="101" name="TextShape 1"/>
+          <p:cNvPr id="103" name="TextShape 1"/>
           <p:cNvSpPr txBox="1"/>
           <p:nvPr/>
         </p:nvSpPr>
@@ -5068,6 +8359,15 @@
         <p:txBody>
           <a:bodyPr lIns="0" rIns="0" tIns="0" bIns="0" anchor="b"/>
           <a:p>
+            <a:r>
+              <a:rPr b="1" lang="en-US" sz="3200" spc="-1" strike="noStrike">
+                <a:solidFill>
+                  <a:srgbClr val="ffffff"/>
+                </a:solidFill>
+                <a:latin typeface="Source Sans Pro Black"/>
+              </a:rPr>
+              <a:t>View – Section A (bagian A)</a:t>
+            </a:r>
             <a:endParaRPr b="1" lang="en-US" sz="3200" spc="-1" strike="noStrike">
               <a:solidFill>
                 <a:srgbClr val="ffffff"/>
@@ -5079,7 +8379,7 @@
       </p:sp>
       <p:sp>
         <p:nvSpPr>
-          <p:cNvPr id="102" name="TextShape 2"/>
+          <p:cNvPr id="104" name="TextShape 2"/>
           <p:cNvSpPr txBox="1"/>
           <p:nvPr/>
         </p:nvSpPr>
@@ -5101,17 +8401,348 @@
             <a:normAutofit/>
           </a:bodyPr>
           <a:p>
-            <a:endParaRPr b="1" lang="en-US" sz="2600" spc="-1" strike="noStrike">
-              <a:solidFill>
-                <a:srgbClr val="1c1c1c"/>
-              </a:solidFill>
-              <a:latin typeface="Source Sans Pro Semibold"/>
-            </a:endParaRPr>
-          </a:p>
-        </p:txBody>
-      </p:sp>
+            <a:pPr>
+              <a:spcAft>
+                <a:spcPts val="1142"/>
+              </a:spcAft>
+            </a:pPr>
+            <a:r>
+              <a:rPr b="1" lang="en-US" sz="2600" spc="-1" strike="noStrike">
+                <a:solidFill>
+                  <a:srgbClr val="1c1c1c"/>
+                </a:solidFill>
+                <a:latin typeface="Source Sans Pro Semibold"/>
+              </a:rPr>
+              <a:t>1. Tambahkan label dan input sesuai gambar petunjuk – Tanggal</a:t>
+            </a:r>
+            <a:endParaRPr b="1" lang="en-US" sz="2600" spc="-1" strike="noStrike">
+              <a:solidFill>
+                <a:srgbClr val="1c1c1c"/>
+              </a:solidFill>
+              <a:latin typeface="Source Sans Pro Semibold"/>
+            </a:endParaRPr>
+          </a:p>
+          <a:p>
+            <a:pPr>
+              <a:spcAft>
+                <a:spcPts val="1142"/>
+              </a:spcAft>
+            </a:pPr>
+            <a:r>
+              <a:rPr b="1" lang="en-US" sz="2600" spc="-1" strike="noStrike">
+                <a:solidFill>
+                  <a:srgbClr val="1c1c1c"/>
+                </a:solidFill>
+                <a:latin typeface="Source Sans Pro Semibold"/>
+              </a:rPr>
+              <a:t> </a:t>
+            </a:r>
+            <a:endParaRPr b="1" lang="en-US" sz="2600" spc="-1" strike="noStrike">
+              <a:solidFill>
+                <a:srgbClr val="1c1c1c"/>
+              </a:solidFill>
+              <a:latin typeface="Source Sans Pro Semibold"/>
+            </a:endParaRPr>
+          </a:p>
+          <a:p>
+            <a:pPr>
+              <a:spcAft>
+                <a:spcPts val="1142"/>
+              </a:spcAft>
+            </a:pPr>
+            <a:r>
+              <a:rPr b="1" lang="en-US" sz="2600" spc="-1" strike="noStrike">
+                <a:solidFill>
+                  <a:srgbClr val="1c1c1c"/>
+                </a:solidFill>
+                <a:latin typeface="Source Sans Pro Semibold"/>
+              </a:rPr>
+              <a:t>2. </a:t>
+            </a:r>
+            <a:endParaRPr b="1" lang="en-US" sz="2600" spc="-1" strike="noStrike">
+              <a:solidFill>
+                <a:srgbClr val="1c1c1c"/>
+              </a:solidFill>
+              <a:latin typeface="Source Sans Pro Semibold"/>
+            </a:endParaRPr>
+          </a:p>
+          <a:p>
+            <a:pPr>
+              <a:spcAft>
+                <a:spcPts val="1142"/>
+              </a:spcAft>
+            </a:pPr>
+            <a:r>
+              <a:rPr b="1" lang="en-US" sz="1500" spc="-1" strike="noStrike">
+                <a:solidFill>
+                  <a:srgbClr val="1c1c1c"/>
+                </a:solidFill>
+                <a:latin typeface="Source Sans Pro Semibold"/>
+              </a:rPr>
+              <a:t>&lt;div class="form-group"&gt;</a:t>
+            </a:r>
+            <a:endParaRPr b="1" lang="en-US" sz="1500" spc="-1" strike="noStrike">
+              <a:solidFill>
+                <a:srgbClr val="1c1c1c"/>
+              </a:solidFill>
+              <a:latin typeface="Source Sans Pro Semibold"/>
+            </a:endParaRPr>
+          </a:p>
+          <a:p>
+            <a:pPr>
+              <a:spcAft>
+                <a:spcPts val="1142"/>
+              </a:spcAft>
+            </a:pPr>
+            <a:r>
+              <a:rPr b="1" lang="en-US" sz="1500" spc="-1" strike="noStrike">
+                <a:solidFill>
+                  <a:srgbClr val="1c1c1c"/>
+                </a:solidFill>
+                <a:latin typeface="Source Sans Pro Semibold"/>
+              </a:rPr>
+              <a:t>    </a:t>
+            </a:r>
+            <a:r>
+              <a:rPr b="1" lang="en-US" sz="1500" spc="-1" strike="noStrike">
+                <a:solidFill>
+                  <a:srgbClr val="1c1c1c"/>
+                </a:solidFill>
+                <a:latin typeface="Source Sans Pro Semibold"/>
+              </a:rPr>
+              <a:t>&lt;label for="tanggal" class="col-sm-2 control-label"&gt;Tanggal&lt;/label&gt;</a:t>
+            </a:r>
+            <a:endParaRPr b="1" lang="en-US" sz="1500" spc="-1" strike="noStrike">
+              <a:solidFill>
+                <a:srgbClr val="1c1c1c"/>
+              </a:solidFill>
+              <a:latin typeface="Source Sans Pro Semibold"/>
+            </a:endParaRPr>
+          </a:p>
+          <a:p>
+            <a:pPr>
+              <a:spcAft>
+                <a:spcPts val="1142"/>
+              </a:spcAft>
+            </a:pPr>
+            <a:r>
+              <a:rPr b="1" lang="en-US" sz="1500" spc="-1" strike="noStrike">
+                <a:solidFill>
+                  <a:srgbClr val="1c1c1c"/>
+                </a:solidFill>
+                <a:latin typeface="Source Sans Pro Semibold"/>
+              </a:rPr>
+              <a:t>    </a:t>
+            </a:r>
+            <a:r>
+              <a:rPr b="1" lang="en-US" sz="1500" spc="-1" strike="noStrike">
+                <a:solidFill>
+                  <a:srgbClr val="1c1c1c"/>
+                </a:solidFill>
+                <a:latin typeface="Source Sans Pro Semibold"/>
+              </a:rPr>
+              <a:t>&lt;div class="col-sm-10"&gt;</a:t>
+            </a:r>
+            <a:endParaRPr b="1" lang="en-US" sz="1500" spc="-1" strike="noStrike">
+              <a:solidFill>
+                <a:srgbClr val="1c1c1c"/>
+              </a:solidFill>
+              <a:latin typeface="Source Sans Pro Semibold"/>
+            </a:endParaRPr>
+          </a:p>
+          <a:p>
+            <a:pPr>
+              <a:spcAft>
+                <a:spcPts val="1142"/>
+              </a:spcAft>
+            </a:pPr>
+            <a:r>
+              <a:rPr b="1" lang="en-US" sz="1500" spc="-1" strike="noStrike">
+                <a:solidFill>
+                  <a:srgbClr val="1c1c1c"/>
+                </a:solidFill>
+                <a:latin typeface="Source Sans Pro Semibold"/>
+              </a:rPr>
+              <a:t>      </a:t>
+            </a:r>
+            <a:r>
+              <a:rPr b="1" lang="en-US" sz="1500" spc="-1" strike="noStrike">
+                <a:solidFill>
+                  <a:srgbClr val="1c1c1c"/>
+                </a:solidFill>
+                <a:latin typeface="Source Sans Pro Semibold"/>
+              </a:rPr>
+              <a:t>&lt;input type="date" class="form-control" id="idtanggal" placeholder="Tanggal"&gt;</a:t>
+            </a:r>
+            <a:endParaRPr b="1" lang="en-US" sz="1500" spc="-1" strike="noStrike">
+              <a:solidFill>
+                <a:srgbClr val="1c1c1c"/>
+              </a:solidFill>
+              <a:latin typeface="Source Sans Pro Semibold"/>
+            </a:endParaRPr>
+          </a:p>
+          <a:p>
+            <a:pPr>
+              <a:spcAft>
+                <a:spcPts val="1142"/>
+              </a:spcAft>
+            </a:pPr>
+            <a:r>
+              <a:rPr b="1" lang="en-US" sz="1500" spc="-1" strike="noStrike">
+                <a:solidFill>
+                  <a:srgbClr val="1c1c1c"/>
+                </a:solidFill>
+                <a:latin typeface="Source Sans Pro Semibold"/>
+              </a:rPr>
+              <a:t>    </a:t>
+            </a:r>
+            <a:r>
+              <a:rPr b="1" lang="en-US" sz="1500" spc="-1" strike="noStrike">
+                <a:solidFill>
+                  <a:srgbClr val="1c1c1c"/>
+                </a:solidFill>
+                <a:latin typeface="Source Sans Pro Semibold"/>
+              </a:rPr>
+              <a:t>&lt;/div&gt;</a:t>
+            </a:r>
+            <a:endParaRPr b="1" lang="en-US" sz="1500" spc="-1" strike="noStrike">
+              <a:solidFill>
+                <a:srgbClr val="1c1c1c"/>
+              </a:solidFill>
+              <a:latin typeface="Source Sans Pro Semibold"/>
+            </a:endParaRPr>
+          </a:p>
+          <a:p>
+            <a:pPr>
+              <a:spcAft>
+                <a:spcPts val="1142"/>
+              </a:spcAft>
+            </a:pPr>
+            <a:r>
+              <a:rPr b="1" lang="en-US" sz="1500" spc="-1" strike="noStrike">
+                <a:solidFill>
+                  <a:srgbClr val="1c1c1c"/>
+                </a:solidFill>
+                <a:latin typeface="Source Sans Pro Semibold"/>
+              </a:rPr>
+              <a:t>  </a:t>
+            </a:r>
+            <a:r>
+              <a:rPr b="1" lang="en-US" sz="1500" spc="-1" strike="noStrike">
+                <a:solidFill>
+                  <a:srgbClr val="1c1c1c"/>
+                </a:solidFill>
+                <a:latin typeface="Source Sans Pro Semibold"/>
+              </a:rPr>
+              <a:t>&lt;/div&gt;</a:t>
+            </a:r>
+            <a:endParaRPr b="1" lang="en-US" sz="1500" spc="-1" strike="noStrike">
+              <a:solidFill>
+                <a:srgbClr val="1c1c1c"/>
+              </a:solidFill>
+              <a:latin typeface="Source Sans Pro Semibold"/>
+            </a:endParaRPr>
+          </a:p>
+          <a:p>
+            <a:pPr>
+              <a:spcAft>
+                <a:spcPts val="1142"/>
+              </a:spcAft>
+            </a:pPr>
+            <a:r>
+              <a:rPr b="1" lang="en-US" sz="2600" spc="-1" strike="noStrike">
+                <a:solidFill>
+                  <a:srgbClr val="1c1c1c"/>
+                </a:solidFill>
+                <a:latin typeface="Source Sans Pro Semibold"/>
+              </a:rPr>
+              <a:t> </a:t>
+            </a:r>
+            <a:endParaRPr b="1" lang="en-US" sz="2600" spc="-1" strike="noStrike">
+              <a:solidFill>
+                <a:srgbClr val="1c1c1c"/>
+              </a:solidFill>
+              <a:latin typeface="Source Sans Pro Semibold"/>
+            </a:endParaRPr>
+          </a:p>
+          <a:p>
+            <a:pPr>
+              <a:spcAft>
+                <a:spcPts val="1142"/>
+              </a:spcAft>
+            </a:pPr>
+            <a:r>
+              <a:rPr b="1" lang="en-US" sz="2600" spc="-1" strike="noStrike">
+                <a:solidFill>
+                  <a:srgbClr val="1c1c1c"/>
+                </a:solidFill>
+                <a:latin typeface="Source Sans Pro Semibold"/>
+              </a:rPr>
+              <a:t> </a:t>
+            </a:r>
+            <a:endParaRPr b="1" lang="en-US" sz="2600" spc="-1" strike="noStrike">
+              <a:solidFill>
+                <a:srgbClr val="1c1c1c"/>
+              </a:solidFill>
+              <a:latin typeface="Source Sans Pro Semibold"/>
+            </a:endParaRPr>
+          </a:p>
+        </p:txBody>
+      </p:sp>
+      <p:pic>
+        <p:nvPicPr>
+          <p:cNvPr id="105" name="" descr=""/>
+          <p:cNvPicPr/>
+          <p:nvPr/>
+        </p:nvPicPr>
+        <p:blipFill>
+          <a:blip r:embed="rId1"/>
+          <a:stretch/>
+        </p:blipFill>
+        <p:spPr>
+          <a:xfrm>
+            <a:off x="2926080" y="2926080"/>
+            <a:ext cx="4120200" cy="640080"/>
+          </a:xfrm>
+          <a:prstGeom prst="rect">
+            <a:avLst/>
+          </a:prstGeom>
+          <a:ln>
+            <a:solidFill>
+              <a:srgbClr val="ce181e"/>
+            </a:solidFill>
+          </a:ln>
+        </p:spPr>
+      </p:pic>
     </p:spTree>
   </p:cSld>
+  <p:timing>
+    <p:tnLst>
+      <p:par>
+        <p:cTn id="15" dur="indefinite" restart="never" nodeType="tmRoot">
+          <p:childTnLst>
+            <p:seq>
+              <p:cTn id="16" dur="indefinite" nodeType="mainSeq"/>
+              <p:prevCondLst>
+                <p:cond delay="0" evt="onPrev">
+                  <p:tgtEl>
+                    <p:sldTgt/>
+                  </p:tgtEl>
+                </p:cond>
+              </p:prevCondLst>
+              <p:nextCondLst>
+                <p:cond delay="0" evt="onNext">
+                  <p:tgtEl>
+                    <p:sldTgt/>
+                  </p:tgtEl>
+                </p:cond>
+              </p:nextCondLst>
+            </p:seq>
+          </p:childTnLst>
+        </p:cTn>
+      </p:par>
+    </p:tnLst>
+  </p:timing>
 </p:sld>
 </file>
 
@@ -5134,7 +8765,7 @@
       </p:grpSpPr>
       <p:sp>
         <p:nvSpPr>
-          <p:cNvPr id="103" name="TextShape 1"/>
+          <p:cNvPr id="106" name="TextShape 1"/>
           <p:cNvSpPr txBox="1"/>
           <p:nvPr/>
         </p:nvSpPr>
@@ -5154,6 +8785,15 @@
         <p:txBody>
           <a:bodyPr lIns="0" rIns="0" tIns="0" bIns="0" anchor="b"/>
           <a:p>
+            <a:r>
+              <a:rPr b="1" lang="en-US" sz="3200" spc="-1" strike="noStrike">
+                <a:solidFill>
+                  <a:srgbClr val="ffffff"/>
+                </a:solidFill>
+                <a:latin typeface="Source Sans Pro Black"/>
+              </a:rPr>
+              <a:t>View – Section A (bagian A)</a:t>
+            </a:r>
             <a:endParaRPr b="1" lang="en-US" sz="3200" spc="-1" strike="noStrike">
               <a:solidFill>
                 <a:srgbClr val="ffffff"/>
@@ -5165,7 +8805,7 @@
       </p:sp>
       <p:sp>
         <p:nvSpPr>
-          <p:cNvPr id="104" name="TextShape 2"/>
+          <p:cNvPr id="107" name="TextShape 2"/>
           <p:cNvSpPr txBox="1"/>
           <p:nvPr/>
         </p:nvSpPr>
@@ -5187,17 +8827,348 @@
             <a:normAutofit/>
           </a:bodyPr>
           <a:p>
-            <a:endParaRPr b="1" lang="en-US" sz="2600" spc="-1" strike="noStrike">
-              <a:solidFill>
-                <a:srgbClr val="1c1c1c"/>
-              </a:solidFill>
-              <a:latin typeface="Source Sans Pro Semibold"/>
-            </a:endParaRPr>
-          </a:p>
-        </p:txBody>
-      </p:sp>
+            <a:pPr>
+              <a:spcAft>
+                <a:spcPts val="1142"/>
+              </a:spcAft>
+            </a:pPr>
+            <a:r>
+              <a:rPr b="1" lang="en-US" sz="2600" spc="-1" strike="noStrike">
+                <a:solidFill>
+                  <a:srgbClr val="1c1c1c"/>
+                </a:solidFill>
+                <a:latin typeface="Source Sans Pro Semibold"/>
+              </a:rPr>
+              <a:t>1. Tambahkan label dan input sesuai gambar petunjuk – Nama Kasir</a:t>
+            </a:r>
+            <a:endParaRPr b="1" lang="en-US" sz="2600" spc="-1" strike="noStrike">
+              <a:solidFill>
+                <a:srgbClr val="1c1c1c"/>
+              </a:solidFill>
+              <a:latin typeface="Source Sans Pro Semibold"/>
+            </a:endParaRPr>
+          </a:p>
+          <a:p>
+            <a:pPr>
+              <a:spcAft>
+                <a:spcPts val="1142"/>
+              </a:spcAft>
+            </a:pPr>
+            <a:r>
+              <a:rPr b="1" lang="en-US" sz="2600" spc="-1" strike="noStrike">
+                <a:solidFill>
+                  <a:srgbClr val="1c1c1c"/>
+                </a:solidFill>
+                <a:latin typeface="Source Sans Pro Semibold"/>
+              </a:rPr>
+              <a:t> </a:t>
+            </a:r>
+            <a:endParaRPr b="1" lang="en-US" sz="2600" spc="-1" strike="noStrike">
+              <a:solidFill>
+                <a:srgbClr val="1c1c1c"/>
+              </a:solidFill>
+              <a:latin typeface="Source Sans Pro Semibold"/>
+            </a:endParaRPr>
+          </a:p>
+          <a:p>
+            <a:pPr>
+              <a:spcAft>
+                <a:spcPts val="1142"/>
+              </a:spcAft>
+            </a:pPr>
+            <a:r>
+              <a:rPr b="1" lang="en-US" sz="2600" spc="-1" strike="noStrike">
+                <a:solidFill>
+                  <a:srgbClr val="1c1c1c"/>
+                </a:solidFill>
+                <a:latin typeface="Source Sans Pro Semibold"/>
+              </a:rPr>
+              <a:t>2. </a:t>
+            </a:r>
+            <a:endParaRPr b="1" lang="en-US" sz="2600" spc="-1" strike="noStrike">
+              <a:solidFill>
+                <a:srgbClr val="1c1c1c"/>
+              </a:solidFill>
+              <a:latin typeface="Source Sans Pro Semibold"/>
+            </a:endParaRPr>
+          </a:p>
+          <a:p>
+            <a:pPr>
+              <a:spcAft>
+                <a:spcPts val="1142"/>
+              </a:spcAft>
+            </a:pPr>
+            <a:r>
+              <a:rPr b="1" lang="en-US" sz="1500" spc="-1" strike="noStrike">
+                <a:solidFill>
+                  <a:srgbClr val="1c1c1c"/>
+                </a:solidFill>
+                <a:latin typeface="Source Sans Pro Semibold"/>
+              </a:rPr>
+              <a:t>&lt;div class="form-group"&gt;</a:t>
+            </a:r>
+            <a:endParaRPr b="1" lang="en-US" sz="1500" spc="-1" strike="noStrike">
+              <a:solidFill>
+                <a:srgbClr val="1c1c1c"/>
+              </a:solidFill>
+              <a:latin typeface="Source Sans Pro Semibold"/>
+            </a:endParaRPr>
+          </a:p>
+          <a:p>
+            <a:pPr>
+              <a:spcAft>
+                <a:spcPts val="1142"/>
+              </a:spcAft>
+            </a:pPr>
+            <a:r>
+              <a:rPr b="1" lang="en-US" sz="1500" spc="-1" strike="noStrike">
+                <a:solidFill>
+                  <a:srgbClr val="1c1c1c"/>
+                </a:solidFill>
+                <a:latin typeface="Source Sans Pro Semibold"/>
+              </a:rPr>
+              <a:t>    </a:t>
+            </a:r>
+            <a:r>
+              <a:rPr b="1" lang="en-US" sz="1500" spc="-1" strike="noStrike">
+                <a:solidFill>
+                  <a:srgbClr val="1c1c1c"/>
+                </a:solidFill>
+                <a:latin typeface="Source Sans Pro Semibold"/>
+              </a:rPr>
+              <a:t>&lt;label for="namakasir" class="col-sm-2 control-label"&gt;Nama Kasir&lt;/label&gt;</a:t>
+            </a:r>
+            <a:endParaRPr b="1" lang="en-US" sz="1500" spc="-1" strike="noStrike">
+              <a:solidFill>
+                <a:srgbClr val="1c1c1c"/>
+              </a:solidFill>
+              <a:latin typeface="Source Sans Pro Semibold"/>
+            </a:endParaRPr>
+          </a:p>
+          <a:p>
+            <a:pPr>
+              <a:spcAft>
+                <a:spcPts val="1142"/>
+              </a:spcAft>
+            </a:pPr>
+            <a:r>
+              <a:rPr b="1" lang="en-US" sz="1500" spc="-1" strike="noStrike">
+                <a:solidFill>
+                  <a:srgbClr val="1c1c1c"/>
+                </a:solidFill>
+                <a:latin typeface="Source Sans Pro Semibold"/>
+              </a:rPr>
+              <a:t>    </a:t>
+            </a:r>
+            <a:r>
+              <a:rPr b="1" lang="en-US" sz="1500" spc="-1" strike="noStrike">
+                <a:solidFill>
+                  <a:srgbClr val="1c1c1c"/>
+                </a:solidFill>
+                <a:latin typeface="Source Sans Pro Semibold"/>
+              </a:rPr>
+              <a:t>&lt;div class="col-sm-10"&gt;</a:t>
+            </a:r>
+            <a:endParaRPr b="1" lang="en-US" sz="1500" spc="-1" strike="noStrike">
+              <a:solidFill>
+                <a:srgbClr val="1c1c1c"/>
+              </a:solidFill>
+              <a:latin typeface="Source Sans Pro Semibold"/>
+            </a:endParaRPr>
+          </a:p>
+          <a:p>
+            <a:pPr>
+              <a:spcAft>
+                <a:spcPts val="1142"/>
+              </a:spcAft>
+            </a:pPr>
+            <a:r>
+              <a:rPr b="1" lang="en-US" sz="1500" spc="-1" strike="noStrike">
+                <a:solidFill>
+                  <a:srgbClr val="1c1c1c"/>
+                </a:solidFill>
+                <a:latin typeface="Source Sans Pro Semibold"/>
+              </a:rPr>
+              <a:t>      </a:t>
+            </a:r>
+            <a:r>
+              <a:rPr b="1" lang="en-US" sz="1500" spc="-1" strike="noStrike">
+                <a:solidFill>
+                  <a:srgbClr val="1c1c1c"/>
+                </a:solidFill>
+                <a:latin typeface="Source Sans Pro Semibold"/>
+              </a:rPr>
+              <a:t>&lt;input type="text" class="form-control" id="idnamakasir" placeholder="Nama Kasir"&gt;</a:t>
+            </a:r>
+            <a:endParaRPr b="1" lang="en-US" sz="1500" spc="-1" strike="noStrike">
+              <a:solidFill>
+                <a:srgbClr val="1c1c1c"/>
+              </a:solidFill>
+              <a:latin typeface="Source Sans Pro Semibold"/>
+            </a:endParaRPr>
+          </a:p>
+          <a:p>
+            <a:pPr>
+              <a:spcAft>
+                <a:spcPts val="1142"/>
+              </a:spcAft>
+            </a:pPr>
+            <a:r>
+              <a:rPr b="1" lang="en-US" sz="1500" spc="-1" strike="noStrike">
+                <a:solidFill>
+                  <a:srgbClr val="1c1c1c"/>
+                </a:solidFill>
+                <a:latin typeface="Source Sans Pro Semibold"/>
+              </a:rPr>
+              <a:t>    </a:t>
+            </a:r>
+            <a:r>
+              <a:rPr b="1" lang="en-US" sz="1500" spc="-1" strike="noStrike">
+                <a:solidFill>
+                  <a:srgbClr val="1c1c1c"/>
+                </a:solidFill>
+                <a:latin typeface="Source Sans Pro Semibold"/>
+              </a:rPr>
+              <a:t>&lt;/div&gt;</a:t>
+            </a:r>
+            <a:endParaRPr b="1" lang="en-US" sz="1500" spc="-1" strike="noStrike">
+              <a:solidFill>
+                <a:srgbClr val="1c1c1c"/>
+              </a:solidFill>
+              <a:latin typeface="Source Sans Pro Semibold"/>
+            </a:endParaRPr>
+          </a:p>
+          <a:p>
+            <a:pPr>
+              <a:spcAft>
+                <a:spcPts val="1142"/>
+              </a:spcAft>
+            </a:pPr>
+            <a:r>
+              <a:rPr b="1" lang="en-US" sz="1500" spc="-1" strike="noStrike">
+                <a:solidFill>
+                  <a:srgbClr val="1c1c1c"/>
+                </a:solidFill>
+                <a:latin typeface="Source Sans Pro Semibold"/>
+              </a:rPr>
+              <a:t>  </a:t>
+            </a:r>
+            <a:r>
+              <a:rPr b="1" lang="en-US" sz="1500" spc="-1" strike="noStrike">
+                <a:solidFill>
+                  <a:srgbClr val="1c1c1c"/>
+                </a:solidFill>
+                <a:latin typeface="Source Sans Pro Semibold"/>
+              </a:rPr>
+              <a:t>&lt;/div&gt;</a:t>
+            </a:r>
+            <a:endParaRPr b="1" lang="en-US" sz="1500" spc="-1" strike="noStrike">
+              <a:solidFill>
+                <a:srgbClr val="1c1c1c"/>
+              </a:solidFill>
+              <a:latin typeface="Source Sans Pro Semibold"/>
+            </a:endParaRPr>
+          </a:p>
+          <a:p>
+            <a:pPr>
+              <a:spcAft>
+                <a:spcPts val="1142"/>
+              </a:spcAft>
+            </a:pPr>
+            <a:r>
+              <a:rPr b="1" lang="en-US" sz="2600" spc="-1" strike="noStrike">
+                <a:solidFill>
+                  <a:srgbClr val="1c1c1c"/>
+                </a:solidFill>
+                <a:latin typeface="Source Sans Pro Semibold"/>
+              </a:rPr>
+              <a:t> </a:t>
+            </a:r>
+            <a:endParaRPr b="1" lang="en-US" sz="2600" spc="-1" strike="noStrike">
+              <a:solidFill>
+                <a:srgbClr val="1c1c1c"/>
+              </a:solidFill>
+              <a:latin typeface="Source Sans Pro Semibold"/>
+            </a:endParaRPr>
+          </a:p>
+          <a:p>
+            <a:pPr>
+              <a:spcAft>
+                <a:spcPts val="1142"/>
+              </a:spcAft>
+            </a:pPr>
+            <a:r>
+              <a:rPr b="1" lang="en-US" sz="2600" spc="-1" strike="noStrike">
+                <a:solidFill>
+                  <a:srgbClr val="1c1c1c"/>
+                </a:solidFill>
+                <a:latin typeface="Source Sans Pro Semibold"/>
+              </a:rPr>
+              <a:t> </a:t>
+            </a:r>
+            <a:endParaRPr b="1" lang="en-US" sz="2600" spc="-1" strike="noStrike">
+              <a:solidFill>
+                <a:srgbClr val="1c1c1c"/>
+              </a:solidFill>
+              <a:latin typeface="Source Sans Pro Semibold"/>
+            </a:endParaRPr>
+          </a:p>
+        </p:txBody>
+      </p:sp>
+      <p:pic>
+        <p:nvPicPr>
+          <p:cNvPr id="108" name="" descr=""/>
+          <p:cNvPicPr/>
+          <p:nvPr/>
+        </p:nvPicPr>
+        <p:blipFill>
+          <a:blip r:embed="rId1"/>
+          <a:stretch/>
+        </p:blipFill>
+        <p:spPr>
+          <a:xfrm>
+            <a:off x="2651760" y="3035160"/>
+            <a:ext cx="4433760" cy="622440"/>
+          </a:xfrm>
+          <a:prstGeom prst="rect">
+            <a:avLst/>
+          </a:prstGeom>
+          <a:ln>
+            <a:solidFill>
+              <a:srgbClr val="ce181e"/>
+            </a:solidFill>
+          </a:ln>
+        </p:spPr>
+      </p:pic>
     </p:spTree>
   </p:cSld>
+  <p:timing>
+    <p:tnLst>
+      <p:par>
+        <p:cTn id="17" dur="indefinite" restart="never" nodeType="tmRoot">
+          <p:childTnLst>
+            <p:seq>
+              <p:cTn id="18" dur="indefinite" nodeType="mainSeq"/>
+              <p:prevCondLst>
+                <p:cond delay="0" evt="onPrev">
+                  <p:tgtEl>
+                    <p:sldTgt/>
+                  </p:tgtEl>
+                </p:cond>
+              </p:prevCondLst>
+              <p:nextCondLst>
+                <p:cond delay="0" evt="onNext">
+                  <p:tgtEl>
+                    <p:sldTgt/>
+                  </p:tgtEl>
+                </p:cond>
+              </p:nextCondLst>
+            </p:seq>
+          </p:childTnLst>
+        </p:cTn>
+      </p:par>
+    </p:tnLst>
+  </p:timing>
 </p:sld>
 </file>
 

</xml_diff>

<commit_message>
update document transaction Section B
</commit_message>
<xml_diff>
--- a/docs/TransactionGuidances.pptx
+++ b/docs/TransactionGuidances.pptx
@@ -24,6 +24,12 @@
     <p:sldId id="271" r:id="rId19"/>
     <p:sldId id="272" r:id="rId20"/>
     <p:sldId id="273" r:id="rId21"/>
+    <p:sldId id="274" r:id="rId22"/>
+    <p:sldId id="275" r:id="rId23"/>
+    <p:sldId id="276" r:id="rId24"/>
+    <p:sldId id="277" r:id="rId25"/>
+    <p:sldId id="278" r:id="rId26"/>
+    <p:sldId id="279" r:id="rId27"/>
   </p:sldIdLst>
   <p:sldSz cx="10080625" cy="7559675"/>
   <p:notesSz cx="7559675" cy="10691812"/>
@@ -3262,7 +3268,7 @@
                 </a:solidFill>
                 <a:latin typeface="Source Sans Pro Black"/>
               </a:rPr>
-              <a:t>Mon, July 1, 2019</a:t>
+              <a:t>&lt;date/time&gt;</a:t>
             </a:r>
             <a:endParaRPr b="1" lang="en-US" sz="1800" spc="-1" strike="noStrike">
               <a:solidFill>
@@ -3303,7 +3309,7 @@
                 </a:solidFill>
                 <a:latin typeface="Source Sans Pro Black"/>
               </a:rPr>
-              <a:t> </a:t>
+              <a:t>&lt;footer&gt;</a:t>
             </a:r>
             <a:endParaRPr b="1" lang="en-US" sz="1800" spc="-1" strike="noStrike">
               <a:solidFill>
@@ -3337,14 +3343,14 @@
           <a:bodyPr lIns="0" rIns="0" tIns="0" bIns="0" anchor="ctr"/>
           <a:p>
             <a:pPr algn="ctr"/>
-            <a:fld id="{1F7A4339-BFE2-4714-BDE7-CC7DD00578B4}" type="slidenum">
+            <a:fld id="{4AC6FBC5-E146-416D-9A97-217DC57478E0}" type="slidenum">
               <a:rPr b="1" lang="en-US" sz="1800" spc="-1" strike="noStrike">
                 <a:solidFill>
                   <a:srgbClr val="ffffff"/>
                 </a:solidFill>
                 <a:latin typeface="Source Sans Pro Black"/>
               </a:rPr>
-              <a:t>16</a:t>
+              <a:t>&lt;number&gt;</a:t>
             </a:fld>
             <a:endParaRPr b="1" lang="en-US" sz="1800" spc="-1" strike="noStrike">
               <a:solidFill>
@@ -3668,7 +3674,7 @@
                 </a:solidFill>
                 <a:latin typeface="Source Sans Pro Black"/>
               </a:rPr>
-              <a:t> </a:t>
+              <a:t>&lt;date/time&gt;</a:t>
             </a:r>
             <a:endParaRPr b="1" lang="en-US" sz="1800" spc="-1" strike="noStrike">
               <a:solidFill>
@@ -3709,7 +3715,7 @@
                 </a:solidFill>
                 <a:latin typeface="Source Sans Pro Black"/>
               </a:rPr>
-              <a:t> </a:t>
+              <a:t>&lt;footer&gt;</a:t>
             </a:r>
             <a:endParaRPr b="1" lang="en-US" sz="1800" spc="-1" strike="noStrike">
               <a:solidFill>
@@ -3743,14 +3749,14 @@
           <a:bodyPr lIns="0" rIns="0" tIns="0" bIns="0"/>
           <a:p>
             <a:pPr algn="r"/>
-            <a:fld id="{45CE060C-ECED-475A-A8D2-FAC523031956}" type="slidenum">
+            <a:fld id="{E043D340-6650-48F0-BCA3-B217D0591D25}" type="slidenum">
               <a:rPr b="1" lang="en-US" sz="1800" spc="-1" strike="noStrike">
                 <a:solidFill>
                   <a:srgbClr val="e74c3c"/>
                 </a:solidFill>
                 <a:latin typeface="Source Sans Pro Black"/>
               </a:rPr>
-              <a:t>1</a:t>
+              <a:t>&lt;number&gt;</a:t>
             </a:fld>
             <a:endParaRPr b="1" lang="en-US" sz="1800" spc="-1" strike="noStrike">
               <a:solidFill>
@@ -5547,16 +5553,7 @@
                 </a:solidFill>
                 <a:latin typeface="Source Sans Pro Semibold"/>
               </a:rPr>
-              <a:t>1. Parsing data dari model.attribute di </a:t>
-            </a:r>
-            <a:r>
-              <a:rPr b="1" lang="en-US" sz="2600" spc="-1" strike="noStrike">
-                <a:solidFill>
-                  <a:srgbClr val="1c1c1c"/>
-                </a:solidFill>
-                <a:latin typeface="Source Sans Pro Semibold"/>
-              </a:rPr>
-              <a:t>controller</a:t>
+              <a:t>1. Parsing data dari model.attribute di controller</a:t>
             </a:r>
             <a:endParaRPr b="1" lang="en-US" sz="2600" spc="-1" strike="noStrike">
               <a:solidFill>
@@ -6168,7 +6165,36 @@
                 <a:latin typeface="Monospace"/>
                 <a:ea typeface="Monospace"/>
               </a:rPr>
-              <a:t>th:data-</a:t>
+              <a:t>th:data-idbarang</a:t>
+            </a:r>
+            <a:r>
+              <a:rPr b="1" lang="en-US" sz="1800" spc="-1" strike="noStrike">
+                <a:solidFill>
+                  <a:srgbClr val="3c3c3c"/>
+                </a:solidFill>
+                <a:latin typeface="Monospace"/>
+                <a:ea typeface="Monospace"/>
+              </a:rPr>
+              <a:t>=</a:t>
+            </a:r>
+            <a:r>
+              <a:rPr b="1" i="1" lang="en-US" sz="1800" spc="-1" strike="noStrike">
+                <a:solidFill>
+                  <a:srgbClr val="2a00ff"/>
+                </a:solidFill>
+                <a:latin typeface="Monospace"/>
+                <a:ea typeface="Monospace"/>
+              </a:rPr>
+              <a:t>"${item.id}"</a:t>
+            </a:r>
+            <a:r>
+              <a:rPr b="1" lang="en-US" sz="1800" spc="-1" strike="noStrike">
+                <a:solidFill>
+                  <a:srgbClr val="1c1c1c"/>
+                </a:solidFill>
+                <a:latin typeface="Monospace"/>
+              </a:rPr>
+              <a:t> </a:t>
             </a:r>
             <a:r>
               <a:rPr b="1" lang="en-US" sz="1800" spc="-1" strike="noStrike" u="sng">
@@ -6179,7 +6205,7 @@
                 <a:latin typeface="Monospace"/>
                 <a:ea typeface="Monospace"/>
               </a:rPr>
-              <a:t>idbarang</a:t>
+              <a:t>th:data-nmbarang</a:t>
             </a:r>
             <a:r>
               <a:rPr b="1" lang="en-US" sz="1800" spc="-1" strike="noStrike">
@@ -6199,7 +6225,7 @@
                 <a:latin typeface="Monospace"/>
                 <a:ea typeface="Monospace"/>
               </a:rPr>
-              <a:t>"${item.id}"</a:t>
+              <a:t>"${item.namaBarang}"</a:t>
             </a:r>
             <a:r>
               <a:rPr b="1" lang="en-US" sz="1800" spc="-1" strike="noStrike">
@@ -6219,7 +6245,7 @@
                 <a:latin typeface="Monospace"/>
                 <a:ea typeface="Monospace"/>
               </a:rPr>
-              <a:t>th:data-nmbarang</a:t>
+              <a:t>th:data-jnsbarang</a:t>
             </a:r>
             <a:r>
               <a:rPr b="1" lang="en-US" sz="1800" spc="-1" strike="noStrike">
@@ -6239,7 +6265,7 @@
                 <a:latin typeface="Monospace"/>
                 <a:ea typeface="Monospace"/>
               </a:rPr>
-              <a:t>"${item.namaBarang}"</a:t>
+              <a:t>"${item.jenisBarang}"</a:t>
             </a:r>
             <a:r>
               <a:rPr b="1" lang="en-US" sz="1800" spc="-1" strike="noStrike">
@@ -6259,7 +6285,36 @@
                 <a:latin typeface="Monospace"/>
                 <a:ea typeface="Monospace"/>
               </a:rPr>
-              <a:t>th:data-</a:t>
+              <a:t>th:data-ktpembuat</a:t>
+            </a:r>
+            <a:r>
+              <a:rPr b="1" lang="en-US" sz="1800" spc="-1" strike="noStrike">
+                <a:solidFill>
+                  <a:srgbClr val="3c3c3c"/>
+                </a:solidFill>
+                <a:latin typeface="Monospace"/>
+                <a:ea typeface="Monospace"/>
+              </a:rPr>
+              <a:t>=</a:t>
+            </a:r>
+            <a:r>
+              <a:rPr b="1" i="1" lang="en-US" sz="1800" spc="-1" strike="noStrike">
+                <a:solidFill>
+                  <a:srgbClr val="2a00ff"/>
+                </a:solidFill>
+                <a:latin typeface="Monospace"/>
+                <a:ea typeface="Monospace"/>
+              </a:rPr>
+              <a:t>"${item.kotaPembuat}"</a:t>
+            </a:r>
+            <a:r>
+              <a:rPr b="1" lang="en-US" sz="1800" spc="-1" strike="noStrike">
+                <a:solidFill>
+                  <a:srgbClr val="1c1c1c"/>
+                </a:solidFill>
+                <a:latin typeface="Monospace"/>
+              </a:rPr>
+              <a:t> </a:t>
             </a:r>
             <a:r>
               <a:rPr b="1" lang="en-US" sz="1800" spc="-1" strike="noStrike" u="sng">
@@ -6270,7 +6325,7 @@
                 <a:latin typeface="Monospace"/>
                 <a:ea typeface="Monospace"/>
               </a:rPr>
-              <a:t>jnsbarang</a:t>
+              <a:t>th:data-jmlbarang</a:t>
             </a:r>
             <a:r>
               <a:rPr b="1" lang="en-US" sz="1800" spc="-1" strike="noStrike">
@@ -6290,7 +6345,7 @@
                 <a:latin typeface="Monospace"/>
                 <a:ea typeface="Monospace"/>
               </a:rPr>
-              <a:t>"${item.jenisBarang}"</a:t>
+              <a:t>"${item.jmlBarang}"</a:t>
             </a:r>
             <a:r>
               <a:rPr b="1" lang="en-US" sz="1800" spc="-1" strike="noStrike">
@@ -6310,108 +6365,7 @@
                 <a:latin typeface="Monospace"/>
                 <a:ea typeface="Monospace"/>
               </a:rPr>
-              <a:t>th:data-ktpembuat</a:t>
-            </a:r>
-            <a:r>
-              <a:rPr b="1" lang="en-US" sz="1800" spc="-1" strike="noStrike">
-                <a:solidFill>
-                  <a:srgbClr val="3c3c3c"/>
-                </a:solidFill>
-                <a:latin typeface="Monospace"/>
-                <a:ea typeface="Monospace"/>
-              </a:rPr>
-              <a:t>=</a:t>
-            </a:r>
-            <a:r>
-              <a:rPr b="1" i="1" lang="en-US" sz="1800" spc="-1" strike="noStrike">
-                <a:solidFill>
-                  <a:srgbClr val="2a00ff"/>
-                </a:solidFill>
-                <a:latin typeface="Monospace"/>
-                <a:ea typeface="Monospace"/>
-              </a:rPr>
-              <a:t>"$</a:t>
-            </a:r>
-            <a:r>
-              <a:rPr b="1" i="1" lang="en-US" sz="1800" spc="-1" strike="noStrike">
-                <a:solidFill>
-                  <a:srgbClr val="2a00ff"/>
-                </a:solidFill>
-                <a:latin typeface="Monospace"/>
-                <a:ea typeface="Monospace"/>
-              </a:rPr>
-              <a:t>{item.kotaPembuat}"</a:t>
-            </a:r>
-            <a:r>
-              <a:rPr b="1" lang="en-US" sz="1800" spc="-1" strike="noStrike">
-                <a:solidFill>
-                  <a:srgbClr val="1c1c1c"/>
-                </a:solidFill>
-                <a:latin typeface="Monospace"/>
-              </a:rPr>
-              <a:t> </a:t>
-            </a:r>
-            <a:r>
-              <a:rPr b="1" lang="en-US" sz="1800" spc="-1" strike="noStrike" u="sng">
-                <a:solidFill>
-                  <a:srgbClr val="7f007f"/>
-                </a:solidFill>
-                <a:uFillTx/>
-                <a:latin typeface="Monospace"/>
-                <a:ea typeface="Monospace"/>
-              </a:rPr>
-              <a:t>th:data-jmlbarang</a:t>
-            </a:r>
-            <a:r>
-              <a:rPr b="1" lang="en-US" sz="1800" spc="-1" strike="noStrike">
-                <a:solidFill>
-                  <a:srgbClr val="3c3c3c"/>
-                </a:solidFill>
-                <a:latin typeface="Monospace"/>
-                <a:ea typeface="Monospace"/>
-              </a:rPr>
-              <a:t>=</a:t>
-            </a:r>
-            <a:r>
-              <a:rPr b="1" i="1" lang="en-US" sz="1800" spc="-1" strike="noStrike">
-                <a:solidFill>
-                  <a:srgbClr val="2a00ff"/>
-                </a:solidFill>
-                <a:latin typeface="Monospace"/>
-                <a:ea typeface="Monospace"/>
-              </a:rPr>
-              <a:t>"${item.jmlBarang}"</a:t>
-            </a:r>
-            <a:r>
-              <a:rPr b="1" lang="en-US" sz="1800" spc="-1" strike="noStrike">
-                <a:solidFill>
-                  <a:srgbClr val="1c1c1c"/>
-                </a:solidFill>
-                <a:latin typeface="Monospace"/>
-              </a:rPr>
-              <a:t> </a:t>
-            </a:r>
-            <a:r>
-              <a:rPr b="1" lang="en-US" sz="1800" spc="-1" strike="noStrike" u="sng">
-                <a:solidFill>
-                  <a:srgbClr val="7f007f"/>
-                </a:solidFill>
-                <a:uFillTx/>
-                <a:latin typeface="Monospace"/>
-                <a:ea typeface="Monospace"/>
-              </a:rPr>
-              <a:t>th:data-</a:t>
-            </a:r>
-            <a:r>
-              <a:rPr b="1" lang="en-US" sz="1800" spc="-1" strike="noStrike" u="sng">
-                <a:solidFill>
-                  <a:srgbClr val="7f007f"/>
-                </a:solidFill>
-                <a:uFillTx/>
-                <a:latin typeface="Monospace"/>
-                <a:ea typeface="Monospace"/>
-              </a:rPr>
-              <a:t>hrgbarang</a:t>
+              <a:t>th:data-hrgbarang</a:t>
             </a:r>
             <a:r>
               <a:rPr b="1" lang="en-US" sz="1800" spc="-1" strike="noStrike">
@@ -6710,6 +6664,15 @@
         <p:txBody>
           <a:bodyPr lIns="0" rIns="0" tIns="0" bIns="0" anchor="b"/>
           <a:p>
+            <a:r>
+              <a:rPr b="1" lang="en-US" sz="3200" spc="-1" strike="noStrike">
+                <a:solidFill>
+                  <a:srgbClr val="ffffff"/>
+                </a:solidFill>
+                <a:latin typeface="Source Sans Pro Black"/>
+              </a:rPr>
+              <a:t>View – Section B</a:t>
+            </a:r>
             <a:endParaRPr b="1" lang="en-US" sz="3200" spc="-1" strike="noStrike">
               <a:solidFill>
                 <a:srgbClr val="ffffff"/>
@@ -6743,15 +6706,220 @@
             <a:normAutofit/>
           </a:bodyPr>
           <a:p>
-            <a:endParaRPr b="1" lang="en-US" sz="2600" spc="-1" strike="noStrike">
-              <a:solidFill>
-                <a:srgbClr val="1c1c1c"/>
-              </a:solidFill>
-              <a:latin typeface="Source Sans Pro Semibold"/>
-            </a:endParaRPr>
-          </a:p>
-        </p:txBody>
-      </p:sp>
+            <a:pPr>
+              <a:spcAft>
+                <a:spcPts val="1142"/>
+              </a:spcAft>
+            </a:pPr>
+            <a:r>
+              <a:rPr b="1" lang="en-US" sz="2600" spc="-1" strike="noStrike">
+                <a:solidFill>
+                  <a:srgbClr val="1c1c1c"/>
+                </a:solidFill>
+                <a:latin typeface="Source Sans Pro Semibold"/>
+              </a:rPr>
+              <a:t>1. </a:t>
+            </a:r>
+            <a:r>
+              <a:rPr b="1" lang="en-US" sz="2600" spc="-1" strike="noStrike">
+                <a:solidFill>
+                  <a:srgbClr val="1c1c1c"/>
+                </a:solidFill>
+                <a:latin typeface="Source Sans Pro Semibold"/>
+              </a:rPr>
+              <a:t>Tambahkan table responsive pada body dari listbarangtransaction.html</a:t>
+            </a:r>
+            <a:endParaRPr b="1" lang="en-US" sz="2600" spc="-1" strike="noStrike">
+              <a:solidFill>
+                <a:srgbClr val="1c1c1c"/>
+              </a:solidFill>
+              <a:latin typeface="Source Sans Pro Semibold"/>
+            </a:endParaRPr>
+          </a:p>
+          <a:p>
+            <a:pPr>
+              <a:spcAft>
+                <a:spcPts val="1142"/>
+              </a:spcAft>
+            </a:pPr>
+            <a:r>
+              <a:rPr b="1" lang="en-US" sz="2600" spc="-1" strike="noStrike">
+                <a:solidFill>
+                  <a:srgbClr val="1c1c1c"/>
+                </a:solidFill>
+                <a:latin typeface="Source Sans Pro Semibold"/>
+              </a:rPr>
+              <a:t>&lt;div class="table-responsive"&gt;</a:t>
+            </a:r>
+            <a:endParaRPr b="1" lang="en-US" sz="2600" spc="-1" strike="noStrike">
+              <a:solidFill>
+                <a:srgbClr val="1c1c1c"/>
+              </a:solidFill>
+              <a:latin typeface="Source Sans Pro Semibold"/>
+            </a:endParaRPr>
+          </a:p>
+          <a:p>
+            <a:pPr>
+              <a:spcAft>
+                <a:spcPts val="1142"/>
+              </a:spcAft>
+            </a:pPr>
+            <a:r>
+              <a:rPr b="1" lang="en-US" sz="2600" spc="-1" strike="noStrike">
+                <a:solidFill>
+                  <a:srgbClr val="1c1c1c"/>
+                </a:solidFill>
+                <a:latin typeface="Source Sans Pro Semibold"/>
+              </a:rPr>
+              <a:t>  </a:t>
+            </a:r>
+            <a:r>
+              <a:rPr b="1" lang="en-US" sz="2600" spc="-1" strike="noStrike">
+                <a:solidFill>
+                  <a:srgbClr val="1c1c1c"/>
+                </a:solidFill>
+                <a:latin typeface="Source Sans Pro Semibold"/>
+              </a:rPr>
+              <a:t>&lt;table class="table"&gt;</a:t>
+            </a:r>
+            <a:endParaRPr b="1" lang="en-US" sz="2600" spc="-1" strike="noStrike">
+              <a:solidFill>
+                <a:srgbClr val="1c1c1c"/>
+              </a:solidFill>
+              <a:latin typeface="Source Sans Pro Semibold"/>
+            </a:endParaRPr>
+          </a:p>
+          <a:p>
+            <a:pPr>
+              <a:spcAft>
+                <a:spcPts val="1142"/>
+              </a:spcAft>
+            </a:pPr>
+            <a:r>
+              <a:rPr b="1" lang="en-US" sz="2600" spc="-1" strike="noStrike">
+                <a:solidFill>
+                  <a:srgbClr val="1c1c1c"/>
+                </a:solidFill>
+                <a:latin typeface="Source Sans Pro Semibold"/>
+              </a:rPr>
+              <a:t>    </a:t>
+            </a:r>
+            <a:r>
+              <a:rPr b="1" lang="en-US" sz="2600" spc="-1" strike="noStrike">
+                <a:solidFill>
+                  <a:srgbClr val="1c1c1c"/>
+                </a:solidFill>
+                <a:latin typeface="Source Sans Pro Semibold"/>
+              </a:rPr>
+              <a:t>Bagian E</a:t>
+            </a:r>
+            <a:endParaRPr b="1" lang="en-US" sz="2600" spc="-1" strike="noStrike">
+              <a:solidFill>
+                <a:srgbClr val="1c1c1c"/>
+              </a:solidFill>
+              <a:latin typeface="Source Sans Pro Semibold"/>
+            </a:endParaRPr>
+          </a:p>
+          <a:p>
+            <a:pPr>
+              <a:spcAft>
+                <a:spcPts val="1142"/>
+              </a:spcAft>
+            </a:pPr>
+            <a:r>
+              <a:rPr b="1" lang="en-US" sz="2600" spc="-1" strike="noStrike">
+                <a:solidFill>
+                  <a:srgbClr val="1c1c1c"/>
+                </a:solidFill>
+                <a:latin typeface="Source Sans Pro Semibold"/>
+              </a:rPr>
+              <a:t>  </a:t>
+            </a:r>
+            <a:r>
+              <a:rPr b="1" lang="en-US" sz="2600" spc="-1" strike="noStrike">
+                <a:solidFill>
+                  <a:srgbClr val="1c1c1c"/>
+                </a:solidFill>
+                <a:latin typeface="Source Sans Pro Semibold"/>
+              </a:rPr>
+              <a:t>&lt;/table&gt;</a:t>
+            </a:r>
+            <a:endParaRPr b="1" lang="en-US" sz="2600" spc="-1" strike="noStrike">
+              <a:solidFill>
+                <a:srgbClr val="1c1c1c"/>
+              </a:solidFill>
+              <a:latin typeface="Source Sans Pro Semibold"/>
+            </a:endParaRPr>
+          </a:p>
+          <a:p>
+            <a:pPr>
+              <a:spcAft>
+                <a:spcPts val="1142"/>
+              </a:spcAft>
+            </a:pPr>
+            <a:r>
+              <a:rPr b="1" lang="en-US" sz="2600" spc="-1" strike="noStrike">
+                <a:solidFill>
+                  <a:srgbClr val="1c1c1c"/>
+                </a:solidFill>
+                <a:latin typeface="Source Sans Pro Semibold"/>
+              </a:rPr>
+              <a:t>&lt;/div&gt;</a:t>
+            </a:r>
+            <a:endParaRPr b="1" lang="en-US" sz="2600" spc="-1" strike="noStrike">
+              <a:solidFill>
+                <a:srgbClr val="1c1c1c"/>
+              </a:solidFill>
+              <a:latin typeface="Source Sans Pro Semibold"/>
+            </a:endParaRPr>
+          </a:p>
+          <a:p>
+            <a:pPr>
+              <a:spcAft>
+                <a:spcPts val="1142"/>
+              </a:spcAft>
+            </a:pPr>
+            <a:r>
+              <a:rPr b="1" lang="en-US" sz="2600" spc="-1" strike="noStrike">
+                <a:solidFill>
+                  <a:srgbClr val="1c1c1c"/>
+                </a:solidFill>
+                <a:latin typeface="Source Sans Pro Semibold"/>
+              </a:rPr>
+              <a:t> </a:t>
+            </a:r>
+            <a:endParaRPr b="1" lang="en-US" sz="2600" spc="-1" strike="noStrike">
+              <a:solidFill>
+                <a:srgbClr val="1c1c1c"/>
+              </a:solidFill>
+              <a:latin typeface="Source Sans Pro Semibold"/>
+            </a:endParaRPr>
+          </a:p>
+        </p:txBody>
+      </p:sp>
+      <p:pic>
+        <p:nvPicPr>
+          <p:cNvPr id="128" name="" descr=""/>
+          <p:cNvPicPr/>
+          <p:nvPr/>
+        </p:nvPicPr>
+        <p:blipFill>
+          <a:blip r:embed="rId1"/>
+          <a:stretch/>
+        </p:blipFill>
+        <p:spPr>
+          <a:xfrm>
+            <a:off x="2834640" y="4019760"/>
+            <a:ext cx="7093080" cy="2015280"/>
+          </a:xfrm>
+          <a:prstGeom prst="rect">
+            <a:avLst/>
+          </a:prstGeom>
+          <a:ln>
+            <a:noFill/>
+          </a:ln>
+        </p:spPr>
+      </p:pic>
     </p:spTree>
   </p:cSld>
   <p:timing>
@@ -6803,7 +6971,7 @@
       </p:grpSpPr>
       <p:sp>
         <p:nvSpPr>
-          <p:cNvPr id="128" name="TextShape 1"/>
+          <p:cNvPr id="129" name="TextShape 1"/>
           <p:cNvSpPr txBox="1"/>
           <p:nvPr/>
         </p:nvSpPr>
@@ -6823,6 +6991,15 @@
         <p:txBody>
           <a:bodyPr lIns="0" rIns="0" tIns="0" bIns="0" anchor="b"/>
           <a:p>
+            <a:r>
+              <a:rPr b="1" lang="en-US" sz="3200" spc="-1" strike="noStrike">
+                <a:solidFill>
+                  <a:srgbClr val="ffffff"/>
+                </a:solidFill>
+                <a:latin typeface="Source Sans Pro Black"/>
+              </a:rPr>
+              <a:t>View – Section B</a:t>
+            </a:r>
             <a:endParaRPr b="1" lang="en-US" sz="3200" spc="-1" strike="noStrike">
               <a:solidFill>
                 <a:srgbClr val="ffffff"/>
@@ -6834,7 +7011,7 @@
       </p:sp>
       <p:sp>
         <p:nvSpPr>
-          <p:cNvPr id="129" name="TextShape 2"/>
+          <p:cNvPr id="130" name="TextShape 2"/>
           <p:cNvSpPr txBox="1"/>
           <p:nvPr/>
         </p:nvSpPr>
@@ -6856,15 +7033,140 @@
             <a:normAutofit/>
           </a:bodyPr>
           <a:p>
-            <a:endParaRPr b="1" lang="en-US" sz="2600" spc="-1" strike="noStrike">
-              <a:solidFill>
-                <a:srgbClr val="1c1c1c"/>
-              </a:solidFill>
-              <a:latin typeface="Source Sans Pro Semibold"/>
-            </a:endParaRPr>
-          </a:p>
-        </p:txBody>
-      </p:sp>
+            <a:pPr>
+              <a:spcAft>
+                <a:spcPts val="1142"/>
+              </a:spcAft>
+            </a:pPr>
+            <a:r>
+              <a:rPr b="1" lang="en-US" sz="2600" spc="-1" strike="noStrike">
+                <a:solidFill>
+                  <a:srgbClr val="1c1c1c"/>
+                </a:solidFill>
+                <a:latin typeface="Source Sans Pro Semibold"/>
+              </a:rPr>
+              <a:t>1. Tambahkan tag thead dan tbody</a:t>
+            </a:r>
+            <a:endParaRPr b="1" lang="en-US" sz="2600" spc="-1" strike="noStrike">
+              <a:solidFill>
+                <a:srgbClr val="1c1c1c"/>
+              </a:solidFill>
+              <a:latin typeface="Source Sans Pro Semibold"/>
+            </a:endParaRPr>
+          </a:p>
+          <a:p>
+            <a:pPr>
+              <a:spcAft>
+                <a:spcPts val="1142"/>
+              </a:spcAft>
+            </a:pPr>
+            <a:r>
+              <a:rPr b="1" lang="en-US" sz="2600" spc="-1" strike="noStrike">
+                <a:solidFill>
+                  <a:srgbClr val="1c1c1c"/>
+                </a:solidFill>
+                <a:latin typeface="Source Sans Pro Semibold"/>
+              </a:rPr>
+              <a:t>2. Pada thead tambahkan column sesuai gambar</a:t>
+            </a:r>
+            <a:endParaRPr b="1" lang="en-US" sz="2600" spc="-1" strike="noStrike">
+              <a:solidFill>
+                <a:srgbClr val="1c1c1c"/>
+              </a:solidFill>
+              <a:latin typeface="Source Sans Pro Semibold"/>
+            </a:endParaRPr>
+          </a:p>
+          <a:p>
+            <a:pPr>
+              <a:spcAft>
+                <a:spcPts val="1142"/>
+              </a:spcAft>
+            </a:pPr>
+            <a:r>
+              <a:rPr b="1" lang="en-US" sz="2600" spc="-1" strike="noStrike">
+                <a:solidFill>
+                  <a:srgbClr val="1c1c1c"/>
+                </a:solidFill>
+                <a:latin typeface="Source Sans Pro Semibold"/>
+              </a:rPr>
+              <a:t> </a:t>
+            </a:r>
+            <a:endParaRPr b="1" lang="en-US" sz="2600" spc="-1" strike="noStrike">
+              <a:solidFill>
+                <a:srgbClr val="1c1c1c"/>
+              </a:solidFill>
+              <a:latin typeface="Source Sans Pro Semibold"/>
+            </a:endParaRPr>
+          </a:p>
+          <a:p>
+            <a:pPr>
+              <a:spcAft>
+                <a:spcPts val="1142"/>
+              </a:spcAft>
+            </a:pPr>
+            <a:r>
+              <a:rPr b="1" lang="en-US" sz="2600" spc="-1" strike="noStrike">
+                <a:solidFill>
+                  <a:srgbClr val="1c1c1c"/>
+                </a:solidFill>
+                <a:latin typeface="Source Sans Pro Semibold"/>
+              </a:rPr>
+              <a:t> </a:t>
+            </a:r>
+            <a:endParaRPr b="1" lang="en-US" sz="2600" spc="-1" strike="noStrike">
+              <a:solidFill>
+                <a:srgbClr val="1c1c1c"/>
+              </a:solidFill>
+              <a:latin typeface="Source Sans Pro Semibold"/>
+            </a:endParaRPr>
+          </a:p>
+          <a:p>
+            <a:pPr>
+              <a:spcAft>
+                <a:spcPts val="1142"/>
+              </a:spcAft>
+            </a:pPr>
+            <a:r>
+              <a:rPr b="1" lang="en-US" sz="2600" spc="-1" strike="noStrike">
+                <a:solidFill>
+                  <a:srgbClr val="1c1c1c"/>
+                </a:solidFill>
+                <a:latin typeface="Source Sans Pro Semibold"/>
+              </a:rPr>
+              <a:t>3. Pada tbody tambahkan attribute id </a:t>
+            </a:r>
+            <a:endParaRPr b="1" lang="en-US" sz="2600" spc="-1" strike="noStrike">
+              <a:solidFill>
+                <a:srgbClr val="1c1c1c"/>
+              </a:solidFill>
+              <a:latin typeface="Source Sans Pro Semibold"/>
+            </a:endParaRPr>
+          </a:p>
+        </p:txBody>
+      </p:sp>
+      <p:pic>
+        <p:nvPicPr>
+          <p:cNvPr id="131" name="" descr=""/>
+          <p:cNvPicPr/>
+          <p:nvPr/>
+        </p:nvPicPr>
+        <p:blipFill>
+          <a:blip r:embed="rId1"/>
+          <a:stretch/>
+        </p:blipFill>
+        <p:spPr>
+          <a:xfrm>
+            <a:off x="3291840" y="3108960"/>
+            <a:ext cx="4206240" cy="670680"/>
+          </a:xfrm>
+          <a:prstGeom prst="rect">
+            <a:avLst/>
+          </a:prstGeom>
+          <a:ln>
+            <a:noFill/>
+          </a:ln>
+        </p:spPr>
+      </p:pic>
     </p:spTree>
   </p:cSld>
   <p:timing>
@@ -6897,6 +7199,381 @@
 </p:sld>
 </file>
 
+<file path=ppt/slides/slide19.xml><?xml version="1.0" encoding="utf-8"?>
+<p:sld xmlns:a="http://schemas.openxmlformats.org/drawingml/2006/main" xmlns:p="http://schemas.openxmlformats.org/presentationml/2006/main" xmlns:r="http://schemas.openxmlformats.org/officeDocument/2006/relationships" xmlns:p14="http://schemas.microsoft.com/office/powerpoint/2010/main" xmlns:p15="http://schemas.microsoft.com/office/powerpoint/2012/main" xmlns:mc="http://schemas.openxmlformats.org/markup-compatibility/2006">
+  <p:cSld>
+    <p:spTree>
+      <p:nvGrpSpPr>
+        <p:cNvPr id="1" name=""/>
+        <p:cNvGrpSpPr/>
+        <p:nvPr/>
+      </p:nvGrpSpPr>
+      <p:grpSpPr>
+        <a:xfrm>
+          <a:off x="0" y="0"/>
+          <a:ext cx="0" cy="0"/>
+          <a:chOff x="0" y="0"/>
+          <a:chExt cx="0" cy="0"/>
+        </a:xfrm>
+      </p:grpSpPr>
+      <p:sp>
+        <p:nvSpPr>
+          <p:cNvPr id="132" name="TextShape 1"/>
+          <p:cNvSpPr txBox="1"/>
+          <p:nvPr/>
+        </p:nvSpPr>
+        <p:spPr>
+          <a:xfrm>
+            <a:off x="360000" y="360000"/>
+            <a:ext cx="9360000" cy="900000"/>
+          </a:xfrm>
+          <a:prstGeom prst="rect">
+            <a:avLst/>
+          </a:prstGeom>
+          <a:noFill/>
+          <a:ln>
+            <a:noFill/>
+          </a:ln>
+        </p:spPr>
+        <p:txBody>
+          <a:bodyPr lIns="0" rIns="0" tIns="0" bIns="0" anchor="b"/>
+          <a:p>
+            <a:r>
+              <a:rPr b="1" lang="en-US" sz="3200" spc="-1" strike="noStrike">
+                <a:solidFill>
+                  <a:srgbClr val="ffffff"/>
+                </a:solidFill>
+                <a:latin typeface="Source Sans Pro Black"/>
+              </a:rPr>
+              <a:t>View – Section B</a:t>
+            </a:r>
+            <a:endParaRPr b="1" lang="en-US" sz="3200" spc="-1" strike="noStrike">
+              <a:solidFill>
+                <a:srgbClr val="ffffff"/>
+              </a:solidFill>
+              <a:latin typeface="Source Sans Pro Black"/>
+            </a:endParaRPr>
+          </a:p>
+        </p:txBody>
+      </p:sp>
+      <p:sp>
+        <p:nvSpPr>
+          <p:cNvPr id="133" name="TextShape 2"/>
+          <p:cNvSpPr txBox="1"/>
+          <p:nvPr/>
+        </p:nvSpPr>
+        <p:spPr>
+          <a:xfrm>
+            <a:off x="360000" y="1980000"/>
+            <a:ext cx="9180000" cy="4680000"/>
+          </a:xfrm>
+          <a:prstGeom prst="rect">
+            <a:avLst/>
+          </a:prstGeom>
+          <a:noFill/>
+          <a:ln>
+            <a:noFill/>
+          </a:ln>
+        </p:spPr>
+        <p:txBody>
+          <a:bodyPr lIns="0" rIns="0" tIns="0" bIns="0">
+            <a:normAutofit/>
+          </a:bodyPr>
+          <a:p>
+            <a:pPr>
+              <a:spcAft>
+                <a:spcPts val="1142"/>
+              </a:spcAft>
+            </a:pPr>
+            <a:r>
+              <a:rPr b="1" lang="en-US" sz="2600" spc="-1" strike="noStrike">
+                <a:solidFill>
+                  <a:srgbClr val="1c1c1c"/>
+                </a:solidFill>
+                <a:latin typeface="Source Sans Pro Semibold"/>
+              </a:rPr>
+              <a:t>1. Tambahkan label dan input sesuai gambar petunjuk – Total Harga</a:t>
+            </a:r>
+            <a:endParaRPr b="1" lang="en-US" sz="2600" spc="-1" strike="noStrike">
+              <a:solidFill>
+                <a:srgbClr val="1c1c1c"/>
+              </a:solidFill>
+              <a:latin typeface="Source Sans Pro Semibold"/>
+            </a:endParaRPr>
+          </a:p>
+          <a:p>
+            <a:pPr>
+              <a:spcAft>
+                <a:spcPts val="1142"/>
+              </a:spcAft>
+            </a:pPr>
+            <a:r>
+              <a:rPr b="1" lang="en-US" sz="2600" spc="-1" strike="noStrike">
+                <a:solidFill>
+                  <a:srgbClr val="1c1c1c"/>
+                </a:solidFill>
+                <a:latin typeface="Source Sans Pro Semibold"/>
+              </a:rPr>
+              <a:t> </a:t>
+            </a:r>
+            <a:endParaRPr b="1" lang="en-US" sz="2600" spc="-1" strike="noStrike">
+              <a:solidFill>
+                <a:srgbClr val="1c1c1c"/>
+              </a:solidFill>
+              <a:latin typeface="Source Sans Pro Semibold"/>
+            </a:endParaRPr>
+          </a:p>
+          <a:p>
+            <a:pPr>
+              <a:spcAft>
+                <a:spcPts val="1142"/>
+              </a:spcAft>
+            </a:pPr>
+            <a:r>
+              <a:rPr b="1" lang="en-US" sz="2600" spc="-1" strike="noStrike">
+                <a:solidFill>
+                  <a:srgbClr val="1c1c1c"/>
+                </a:solidFill>
+                <a:latin typeface="Source Sans Pro Semibold"/>
+              </a:rPr>
+              <a:t>2. </a:t>
+            </a:r>
+            <a:endParaRPr b="1" lang="en-US" sz="2600" spc="-1" strike="noStrike">
+              <a:solidFill>
+                <a:srgbClr val="1c1c1c"/>
+              </a:solidFill>
+              <a:latin typeface="Source Sans Pro Semibold"/>
+            </a:endParaRPr>
+          </a:p>
+          <a:p>
+            <a:pPr>
+              <a:spcAft>
+                <a:spcPts val="1142"/>
+              </a:spcAft>
+            </a:pPr>
+            <a:r>
+              <a:rPr b="1" lang="en-US" sz="1500" spc="-1" strike="noStrike">
+                <a:solidFill>
+                  <a:srgbClr val="1c1c1c"/>
+                </a:solidFill>
+                <a:latin typeface="Source Sans Pro Semibold"/>
+              </a:rPr>
+              <a:t>&lt;div class="form-group"&gt;</a:t>
+            </a:r>
+            <a:endParaRPr b="1" lang="en-US" sz="1500" spc="-1" strike="noStrike">
+              <a:solidFill>
+                <a:srgbClr val="1c1c1c"/>
+              </a:solidFill>
+              <a:latin typeface="Source Sans Pro Semibold"/>
+            </a:endParaRPr>
+          </a:p>
+          <a:p>
+            <a:pPr>
+              <a:spcAft>
+                <a:spcPts val="1142"/>
+              </a:spcAft>
+            </a:pPr>
+            <a:r>
+              <a:rPr b="1" lang="en-US" sz="1500" spc="-1" strike="noStrike">
+                <a:solidFill>
+                  <a:srgbClr val="1c1c1c"/>
+                </a:solidFill>
+                <a:latin typeface="Source Sans Pro Semibold"/>
+              </a:rPr>
+              <a:t>    </a:t>
+            </a:r>
+            <a:r>
+              <a:rPr b="1" lang="en-US" sz="1500" spc="-1" strike="noStrike">
+                <a:solidFill>
+                  <a:srgbClr val="1c1c1c"/>
+                </a:solidFill>
+                <a:latin typeface="Source Sans Pro Semibold"/>
+              </a:rPr>
+              <a:t>&lt;label for="namakasir" class="col-sm-2 control-label"&gt;Nama Kasir&lt;/label&gt;</a:t>
+            </a:r>
+            <a:endParaRPr b="1" lang="en-US" sz="1500" spc="-1" strike="noStrike">
+              <a:solidFill>
+                <a:srgbClr val="1c1c1c"/>
+              </a:solidFill>
+              <a:latin typeface="Source Sans Pro Semibold"/>
+            </a:endParaRPr>
+          </a:p>
+          <a:p>
+            <a:pPr>
+              <a:spcAft>
+                <a:spcPts val="1142"/>
+              </a:spcAft>
+            </a:pPr>
+            <a:r>
+              <a:rPr b="1" lang="en-US" sz="1500" spc="-1" strike="noStrike">
+                <a:solidFill>
+                  <a:srgbClr val="1c1c1c"/>
+                </a:solidFill>
+                <a:latin typeface="Source Sans Pro Semibold"/>
+              </a:rPr>
+              <a:t>    </a:t>
+            </a:r>
+            <a:r>
+              <a:rPr b="1" lang="en-US" sz="1500" spc="-1" strike="noStrike">
+                <a:solidFill>
+                  <a:srgbClr val="1c1c1c"/>
+                </a:solidFill>
+                <a:latin typeface="Source Sans Pro Semibold"/>
+              </a:rPr>
+              <a:t>&lt;div class="col-sm-10"&gt;</a:t>
+            </a:r>
+            <a:endParaRPr b="1" lang="en-US" sz="1500" spc="-1" strike="noStrike">
+              <a:solidFill>
+                <a:srgbClr val="1c1c1c"/>
+              </a:solidFill>
+              <a:latin typeface="Source Sans Pro Semibold"/>
+            </a:endParaRPr>
+          </a:p>
+          <a:p>
+            <a:pPr>
+              <a:spcAft>
+                <a:spcPts val="1142"/>
+              </a:spcAft>
+            </a:pPr>
+            <a:r>
+              <a:rPr b="1" lang="en-US" sz="1500" spc="-1" strike="noStrike">
+                <a:solidFill>
+                  <a:srgbClr val="1c1c1c"/>
+                </a:solidFill>
+                <a:latin typeface="Source Sans Pro Semibold"/>
+              </a:rPr>
+              <a:t>      </a:t>
+            </a:r>
+            <a:r>
+              <a:rPr b="1" lang="en-US" sz="1500" spc="-1" strike="noStrike">
+                <a:solidFill>
+                  <a:srgbClr val="1c1c1c"/>
+                </a:solidFill>
+                <a:latin typeface="Source Sans Pro Semibold"/>
+              </a:rPr>
+              <a:t>&lt;input type="text" class="form-control" id="idnamakasir" placeholder="Nama Kasir"&gt;</a:t>
+            </a:r>
+            <a:endParaRPr b="1" lang="en-US" sz="1500" spc="-1" strike="noStrike">
+              <a:solidFill>
+                <a:srgbClr val="1c1c1c"/>
+              </a:solidFill>
+              <a:latin typeface="Source Sans Pro Semibold"/>
+            </a:endParaRPr>
+          </a:p>
+          <a:p>
+            <a:pPr>
+              <a:spcAft>
+                <a:spcPts val="1142"/>
+              </a:spcAft>
+            </a:pPr>
+            <a:r>
+              <a:rPr b="1" lang="en-US" sz="1500" spc="-1" strike="noStrike">
+                <a:solidFill>
+                  <a:srgbClr val="1c1c1c"/>
+                </a:solidFill>
+                <a:latin typeface="Source Sans Pro Semibold"/>
+              </a:rPr>
+              <a:t>    </a:t>
+            </a:r>
+            <a:r>
+              <a:rPr b="1" lang="en-US" sz="1500" spc="-1" strike="noStrike">
+                <a:solidFill>
+                  <a:srgbClr val="1c1c1c"/>
+                </a:solidFill>
+                <a:latin typeface="Source Sans Pro Semibold"/>
+              </a:rPr>
+              <a:t>&lt;/div&gt;</a:t>
+            </a:r>
+            <a:endParaRPr b="1" lang="en-US" sz="1500" spc="-1" strike="noStrike">
+              <a:solidFill>
+                <a:srgbClr val="1c1c1c"/>
+              </a:solidFill>
+              <a:latin typeface="Source Sans Pro Semibold"/>
+            </a:endParaRPr>
+          </a:p>
+          <a:p>
+            <a:pPr>
+              <a:spcAft>
+                <a:spcPts val="1142"/>
+              </a:spcAft>
+            </a:pPr>
+            <a:r>
+              <a:rPr b="1" lang="en-US" sz="1500" spc="-1" strike="noStrike">
+                <a:solidFill>
+                  <a:srgbClr val="1c1c1c"/>
+                </a:solidFill>
+                <a:latin typeface="Source Sans Pro Semibold"/>
+              </a:rPr>
+              <a:t>  </a:t>
+            </a:r>
+            <a:r>
+              <a:rPr b="1" lang="en-US" sz="1500" spc="-1" strike="noStrike">
+                <a:solidFill>
+                  <a:srgbClr val="1c1c1c"/>
+                </a:solidFill>
+                <a:latin typeface="Source Sans Pro Semibold"/>
+              </a:rPr>
+              <a:t>&lt;/div&gt;</a:t>
+            </a:r>
+            <a:endParaRPr b="1" lang="en-US" sz="1500" spc="-1" strike="noStrike">
+              <a:solidFill>
+                <a:srgbClr val="1c1c1c"/>
+              </a:solidFill>
+              <a:latin typeface="Source Sans Pro Semibold"/>
+            </a:endParaRPr>
+          </a:p>
+          <a:p>
+            <a:pPr>
+              <a:spcAft>
+                <a:spcPts val="1142"/>
+              </a:spcAft>
+            </a:pPr>
+            <a:r>
+              <a:rPr b="1" lang="en-US" sz="2600" spc="-1" strike="noStrike">
+                <a:solidFill>
+                  <a:srgbClr val="1c1c1c"/>
+                </a:solidFill>
+                <a:latin typeface="Source Sans Pro Semibold"/>
+              </a:rPr>
+              <a:t> </a:t>
+            </a:r>
+            <a:endParaRPr b="1" lang="en-US" sz="2600" spc="-1" strike="noStrike">
+              <a:solidFill>
+                <a:srgbClr val="1c1c1c"/>
+              </a:solidFill>
+              <a:latin typeface="Source Sans Pro Semibold"/>
+            </a:endParaRPr>
+          </a:p>
+        </p:txBody>
+      </p:sp>
+      <p:pic>
+        <p:nvPicPr>
+          <p:cNvPr id="134" name="" descr=""/>
+          <p:cNvPicPr/>
+          <p:nvPr/>
+        </p:nvPicPr>
+        <p:blipFill>
+          <a:blip r:embed="rId1"/>
+          <a:stretch/>
+        </p:blipFill>
+        <p:spPr>
+          <a:xfrm>
+            <a:off x="2335320" y="2939760"/>
+            <a:ext cx="3791160" cy="534960"/>
+          </a:xfrm>
+          <a:prstGeom prst="rect">
+            <a:avLst/>
+          </a:prstGeom>
+          <a:ln>
+            <a:noFill/>
+          </a:ln>
+        </p:spPr>
+      </p:pic>
+    </p:spTree>
+  </p:cSld>
+</p:sld>
+</file>
+
 <file path=ppt/slides/slide2.xml><?xml version="1.0" encoding="utf-8"?>
 <p:sld xmlns:a="http://schemas.openxmlformats.org/drawingml/2006/main" xmlns:p="http://schemas.openxmlformats.org/presentationml/2006/main" xmlns:r="http://schemas.openxmlformats.org/officeDocument/2006/relationships" xmlns:p14="http://schemas.microsoft.com/office/powerpoint/2010/main" xmlns:p15="http://schemas.microsoft.com/office/powerpoint/2012/main" xmlns:mc="http://schemas.openxmlformats.org/markup-compatibility/2006">
   <p:cSld>
@@ -7006,6 +7683,1042 @@
       </p:par>
     </p:tnLst>
   </p:timing>
+</p:sld>
+</file>
+
+<file path=ppt/slides/slide20.xml><?xml version="1.0" encoding="utf-8"?>
+<p:sld xmlns:a="http://schemas.openxmlformats.org/drawingml/2006/main" xmlns:p="http://schemas.openxmlformats.org/presentationml/2006/main" xmlns:r="http://schemas.openxmlformats.org/officeDocument/2006/relationships" xmlns:p14="http://schemas.microsoft.com/office/powerpoint/2010/main" xmlns:p15="http://schemas.microsoft.com/office/powerpoint/2012/main" xmlns:mc="http://schemas.openxmlformats.org/markup-compatibility/2006">
+  <p:cSld>
+    <p:spTree>
+      <p:nvGrpSpPr>
+        <p:cNvPr id="1" name=""/>
+        <p:cNvGrpSpPr/>
+        <p:nvPr/>
+      </p:nvGrpSpPr>
+      <p:grpSpPr>
+        <a:xfrm>
+          <a:off x="0" y="0"/>
+          <a:ext cx="0" cy="0"/>
+          <a:chOff x="0" y="0"/>
+          <a:chExt cx="0" cy="0"/>
+        </a:xfrm>
+      </p:grpSpPr>
+      <p:sp>
+        <p:nvSpPr>
+          <p:cNvPr id="135" name="TextShape 1"/>
+          <p:cNvSpPr txBox="1"/>
+          <p:nvPr/>
+        </p:nvSpPr>
+        <p:spPr>
+          <a:xfrm>
+            <a:off x="360000" y="360000"/>
+            <a:ext cx="9360000" cy="900000"/>
+          </a:xfrm>
+          <a:prstGeom prst="rect">
+            <a:avLst/>
+          </a:prstGeom>
+          <a:noFill/>
+          <a:ln>
+            <a:noFill/>
+          </a:ln>
+        </p:spPr>
+        <p:txBody>
+          <a:bodyPr lIns="0" rIns="0" tIns="0" bIns="0" anchor="b"/>
+          <a:p>
+            <a:endParaRPr b="1" lang="en-US" sz="3200" spc="-1" strike="noStrike">
+              <a:solidFill>
+                <a:srgbClr val="ffffff"/>
+              </a:solidFill>
+              <a:latin typeface="Source Sans Pro Black"/>
+            </a:endParaRPr>
+          </a:p>
+        </p:txBody>
+      </p:sp>
+      <p:sp>
+        <p:nvSpPr>
+          <p:cNvPr id="136" name="TextShape 2"/>
+          <p:cNvSpPr txBox="1"/>
+          <p:nvPr/>
+        </p:nvSpPr>
+        <p:spPr>
+          <a:xfrm>
+            <a:off x="360000" y="1980000"/>
+            <a:ext cx="9180000" cy="4680000"/>
+          </a:xfrm>
+          <a:prstGeom prst="rect">
+            <a:avLst/>
+          </a:prstGeom>
+          <a:noFill/>
+          <a:ln>
+            <a:noFill/>
+          </a:ln>
+        </p:spPr>
+        <p:txBody>
+          <a:bodyPr lIns="0" rIns="0" tIns="0" bIns="0">
+            <a:normAutofit/>
+          </a:bodyPr>
+          <a:p>
+            <a:pPr>
+              <a:spcAft>
+                <a:spcPts val="1142"/>
+              </a:spcAft>
+            </a:pPr>
+            <a:r>
+              <a:rPr b="1" lang="en-US" sz="2600" spc="-1" strike="noStrike">
+                <a:solidFill>
+                  <a:srgbClr val="1c1c1c"/>
+                </a:solidFill>
+                <a:latin typeface="Source Sans Pro Semibold"/>
+              </a:rPr>
+              <a:t>1. Tambahkan label dan input sesuai gambar petunjuk – Bayar</a:t>
+            </a:r>
+            <a:endParaRPr b="1" lang="en-US" sz="2600" spc="-1" strike="noStrike">
+              <a:solidFill>
+                <a:srgbClr val="1c1c1c"/>
+              </a:solidFill>
+              <a:latin typeface="Source Sans Pro Semibold"/>
+            </a:endParaRPr>
+          </a:p>
+          <a:p>
+            <a:pPr>
+              <a:spcAft>
+                <a:spcPts val="1142"/>
+              </a:spcAft>
+            </a:pPr>
+            <a:r>
+              <a:rPr b="1" lang="en-US" sz="2600" spc="-1" strike="noStrike">
+                <a:solidFill>
+                  <a:srgbClr val="1c1c1c"/>
+                </a:solidFill>
+                <a:latin typeface="Source Sans Pro Semibold"/>
+              </a:rPr>
+              <a:t> </a:t>
+            </a:r>
+            <a:endParaRPr b="1" lang="en-US" sz="2600" spc="-1" strike="noStrike">
+              <a:solidFill>
+                <a:srgbClr val="1c1c1c"/>
+              </a:solidFill>
+              <a:latin typeface="Source Sans Pro Semibold"/>
+            </a:endParaRPr>
+          </a:p>
+          <a:p>
+            <a:pPr>
+              <a:spcAft>
+                <a:spcPts val="1142"/>
+              </a:spcAft>
+            </a:pPr>
+            <a:r>
+              <a:rPr b="1" lang="en-US" sz="2600" spc="-1" strike="noStrike">
+                <a:solidFill>
+                  <a:srgbClr val="1c1c1c"/>
+                </a:solidFill>
+                <a:latin typeface="Source Sans Pro Semibold"/>
+              </a:rPr>
+              <a:t>2. </a:t>
+            </a:r>
+            <a:endParaRPr b="1" lang="en-US" sz="2600" spc="-1" strike="noStrike">
+              <a:solidFill>
+                <a:srgbClr val="1c1c1c"/>
+              </a:solidFill>
+              <a:latin typeface="Source Sans Pro Semibold"/>
+            </a:endParaRPr>
+          </a:p>
+          <a:p>
+            <a:pPr>
+              <a:spcAft>
+                <a:spcPts val="1142"/>
+              </a:spcAft>
+            </a:pPr>
+            <a:r>
+              <a:rPr b="1" lang="en-US" sz="1500" spc="-1" strike="noStrike">
+                <a:solidFill>
+                  <a:srgbClr val="1c1c1c"/>
+                </a:solidFill>
+                <a:latin typeface="Source Sans Pro Semibold"/>
+              </a:rPr>
+              <a:t>&lt;div class="form-group"&gt;</a:t>
+            </a:r>
+            <a:endParaRPr b="1" lang="en-US" sz="1500" spc="-1" strike="noStrike">
+              <a:solidFill>
+                <a:srgbClr val="1c1c1c"/>
+              </a:solidFill>
+              <a:latin typeface="Source Sans Pro Semibold"/>
+            </a:endParaRPr>
+          </a:p>
+          <a:p>
+            <a:pPr>
+              <a:spcAft>
+                <a:spcPts val="1142"/>
+              </a:spcAft>
+            </a:pPr>
+            <a:r>
+              <a:rPr b="1" lang="en-US" sz="1500" spc="-1" strike="noStrike">
+                <a:solidFill>
+                  <a:srgbClr val="1c1c1c"/>
+                </a:solidFill>
+                <a:latin typeface="Source Sans Pro Semibold"/>
+              </a:rPr>
+              <a:t>    </a:t>
+            </a:r>
+            <a:r>
+              <a:rPr b="1" lang="en-US" sz="1500" spc="-1" strike="noStrike">
+                <a:solidFill>
+                  <a:srgbClr val="1c1c1c"/>
+                </a:solidFill>
+                <a:latin typeface="Source Sans Pro Semibold"/>
+              </a:rPr>
+              <a:t>&lt;label for="namakasir" class="col-sm-2 control-label"&gt;Nama Kasir&lt;/label&gt;</a:t>
+            </a:r>
+            <a:endParaRPr b="1" lang="en-US" sz="1500" spc="-1" strike="noStrike">
+              <a:solidFill>
+                <a:srgbClr val="1c1c1c"/>
+              </a:solidFill>
+              <a:latin typeface="Source Sans Pro Semibold"/>
+            </a:endParaRPr>
+          </a:p>
+          <a:p>
+            <a:pPr>
+              <a:spcAft>
+                <a:spcPts val="1142"/>
+              </a:spcAft>
+            </a:pPr>
+            <a:r>
+              <a:rPr b="1" lang="en-US" sz="1500" spc="-1" strike="noStrike">
+                <a:solidFill>
+                  <a:srgbClr val="1c1c1c"/>
+                </a:solidFill>
+                <a:latin typeface="Source Sans Pro Semibold"/>
+              </a:rPr>
+              <a:t>    </a:t>
+            </a:r>
+            <a:r>
+              <a:rPr b="1" lang="en-US" sz="1500" spc="-1" strike="noStrike">
+                <a:solidFill>
+                  <a:srgbClr val="1c1c1c"/>
+                </a:solidFill>
+                <a:latin typeface="Source Sans Pro Semibold"/>
+              </a:rPr>
+              <a:t>&lt;div class="col-sm-10"&gt;</a:t>
+            </a:r>
+            <a:endParaRPr b="1" lang="en-US" sz="1500" spc="-1" strike="noStrike">
+              <a:solidFill>
+                <a:srgbClr val="1c1c1c"/>
+              </a:solidFill>
+              <a:latin typeface="Source Sans Pro Semibold"/>
+            </a:endParaRPr>
+          </a:p>
+          <a:p>
+            <a:pPr>
+              <a:spcAft>
+                <a:spcPts val="1142"/>
+              </a:spcAft>
+            </a:pPr>
+            <a:r>
+              <a:rPr b="1" lang="en-US" sz="1500" spc="-1" strike="noStrike">
+                <a:solidFill>
+                  <a:srgbClr val="1c1c1c"/>
+                </a:solidFill>
+                <a:latin typeface="Source Sans Pro Semibold"/>
+              </a:rPr>
+              <a:t>      </a:t>
+            </a:r>
+            <a:r>
+              <a:rPr b="1" lang="en-US" sz="1500" spc="-1" strike="noStrike">
+                <a:solidFill>
+                  <a:srgbClr val="1c1c1c"/>
+                </a:solidFill>
+                <a:latin typeface="Source Sans Pro Semibold"/>
+              </a:rPr>
+              <a:t>&lt;input type="text" class="form-control" id="idnamakasir" placeholder="Nama Kasir"&gt;</a:t>
+            </a:r>
+            <a:endParaRPr b="1" lang="en-US" sz="1500" spc="-1" strike="noStrike">
+              <a:solidFill>
+                <a:srgbClr val="1c1c1c"/>
+              </a:solidFill>
+              <a:latin typeface="Source Sans Pro Semibold"/>
+            </a:endParaRPr>
+          </a:p>
+          <a:p>
+            <a:pPr>
+              <a:spcAft>
+                <a:spcPts val="1142"/>
+              </a:spcAft>
+            </a:pPr>
+            <a:r>
+              <a:rPr b="1" lang="en-US" sz="1500" spc="-1" strike="noStrike">
+                <a:solidFill>
+                  <a:srgbClr val="1c1c1c"/>
+                </a:solidFill>
+                <a:latin typeface="Source Sans Pro Semibold"/>
+              </a:rPr>
+              <a:t>    </a:t>
+            </a:r>
+            <a:r>
+              <a:rPr b="1" lang="en-US" sz="1500" spc="-1" strike="noStrike">
+                <a:solidFill>
+                  <a:srgbClr val="1c1c1c"/>
+                </a:solidFill>
+                <a:latin typeface="Source Sans Pro Semibold"/>
+              </a:rPr>
+              <a:t>&lt;/div&gt;</a:t>
+            </a:r>
+            <a:endParaRPr b="1" lang="en-US" sz="1500" spc="-1" strike="noStrike">
+              <a:solidFill>
+                <a:srgbClr val="1c1c1c"/>
+              </a:solidFill>
+              <a:latin typeface="Source Sans Pro Semibold"/>
+            </a:endParaRPr>
+          </a:p>
+          <a:p>
+            <a:pPr>
+              <a:spcAft>
+                <a:spcPts val="1142"/>
+              </a:spcAft>
+            </a:pPr>
+            <a:r>
+              <a:rPr b="1" lang="en-US" sz="1500" spc="-1" strike="noStrike">
+                <a:solidFill>
+                  <a:srgbClr val="1c1c1c"/>
+                </a:solidFill>
+                <a:latin typeface="Source Sans Pro Semibold"/>
+              </a:rPr>
+              <a:t>  </a:t>
+            </a:r>
+            <a:r>
+              <a:rPr b="1" lang="en-US" sz="1500" spc="-1" strike="noStrike">
+                <a:solidFill>
+                  <a:srgbClr val="1c1c1c"/>
+                </a:solidFill>
+                <a:latin typeface="Source Sans Pro Semibold"/>
+              </a:rPr>
+              <a:t>&lt;/div&gt;</a:t>
+            </a:r>
+            <a:endParaRPr b="1" lang="en-US" sz="1500" spc="-1" strike="noStrike">
+              <a:solidFill>
+                <a:srgbClr val="1c1c1c"/>
+              </a:solidFill>
+              <a:latin typeface="Source Sans Pro Semibold"/>
+            </a:endParaRPr>
+          </a:p>
+          <a:p>
+            <a:pPr>
+              <a:spcAft>
+                <a:spcPts val="1142"/>
+              </a:spcAft>
+            </a:pPr>
+            <a:r>
+              <a:rPr b="1" lang="en-US" sz="2600" spc="-1" strike="noStrike">
+                <a:solidFill>
+                  <a:srgbClr val="1c1c1c"/>
+                </a:solidFill>
+                <a:latin typeface="Source Sans Pro Semibold"/>
+              </a:rPr>
+              <a:t> </a:t>
+            </a:r>
+            <a:endParaRPr b="1" lang="en-US" sz="2600" spc="-1" strike="noStrike">
+              <a:solidFill>
+                <a:srgbClr val="1c1c1c"/>
+              </a:solidFill>
+              <a:latin typeface="Source Sans Pro Semibold"/>
+            </a:endParaRPr>
+          </a:p>
+        </p:txBody>
+      </p:sp>
+      <p:pic>
+        <p:nvPicPr>
+          <p:cNvPr id="137" name="" descr=""/>
+          <p:cNvPicPr/>
+          <p:nvPr/>
+        </p:nvPicPr>
+        <p:blipFill>
+          <a:blip r:embed="rId1"/>
+          <a:stretch/>
+        </p:blipFill>
+        <p:spPr>
+          <a:xfrm>
+            <a:off x="2834640" y="2926080"/>
+            <a:ext cx="6064200" cy="640080"/>
+          </a:xfrm>
+          <a:prstGeom prst="rect">
+            <a:avLst/>
+          </a:prstGeom>
+          <a:ln>
+            <a:noFill/>
+          </a:ln>
+        </p:spPr>
+      </p:pic>
+    </p:spTree>
+  </p:cSld>
+</p:sld>
+</file>
+
+<file path=ppt/slides/slide21.xml><?xml version="1.0" encoding="utf-8"?>
+<p:sld xmlns:a="http://schemas.openxmlformats.org/drawingml/2006/main" xmlns:p="http://schemas.openxmlformats.org/presentationml/2006/main" xmlns:r="http://schemas.openxmlformats.org/officeDocument/2006/relationships" xmlns:p14="http://schemas.microsoft.com/office/powerpoint/2010/main" xmlns:p15="http://schemas.microsoft.com/office/powerpoint/2012/main" xmlns:mc="http://schemas.openxmlformats.org/markup-compatibility/2006">
+  <p:cSld>
+    <p:spTree>
+      <p:nvGrpSpPr>
+        <p:cNvPr id="1" name=""/>
+        <p:cNvGrpSpPr/>
+        <p:nvPr/>
+      </p:nvGrpSpPr>
+      <p:grpSpPr>
+        <a:xfrm>
+          <a:off x="0" y="0"/>
+          <a:ext cx="0" cy="0"/>
+          <a:chOff x="0" y="0"/>
+          <a:chExt cx="0" cy="0"/>
+        </a:xfrm>
+      </p:grpSpPr>
+      <p:sp>
+        <p:nvSpPr>
+          <p:cNvPr id="138" name="TextShape 1"/>
+          <p:cNvSpPr txBox="1"/>
+          <p:nvPr/>
+        </p:nvSpPr>
+        <p:spPr>
+          <a:xfrm>
+            <a:off x="360000" y="360000"/>
+            <a:ext cx="9360000" cy="900000"/>
+          </a:xfrm>
+          <a:prstGeom prst="rect">
+            <a:avLst/>
+          </a:prstGeom>
+          <a:noFill/>
+          <a:ln>
+            <a:noFill/>
+          </a:ln>
+        </p:spPr>
+        <p:txBody>
+          <a:bodyPr lIns="0" rIns="0" tIns="0" bIns="0" anchor="b"/>
+          <a:p>
+            <a:endParaRPr b="1" lang="en-US" sz="3200" spc="-1" strike="noStrike">
+              <a:solidFill>
+                <a:srgbClr val="ffffff"/>
+              </a:solidFill>
+              <a:latin typeface="Source Sans Pro Black"/>
+            </a:endParaRPr>
+          </a:p>
+        </p:txBody>
+      </p:sp>
+      <p:sp>
+        <p:nvSpPr>
+          <p:cNvPr id="139" name="TextShape 2"/>
+          <p:cNvSpPr txBox="1"/>
+          <p:nvPr/>
+        </p:nvSpPr>
+        <p:spPr>
+          <a:xfrm>
+            <a:off x="360000" y="1980000"/>
+            <a:ext cx="9180000" cy="4680000"/>
+          </a:xfrm>
+          <a:prstGeom prst="rect">
+            <a:avLst/>
+          </a:prstGeom>
+          <a:noFill/>
+          <a:ln>
+            <a:noFill/>
+          </a:ln>
+        </p:spPr>
+        <p:txBody>
+          <a:bodyPr lIns="0" rIns="0" tIns="0" bIns="0">
+            <a:normAutofit/>
+          </a:bodyPr>
+          <a:p>
+            <a:pPr>
+              <a:spcAft>
+                <a:spcPts val="1142"/>
+              </a:spcAft>
+            </a:pPr>
+            <a:r>
+              <a:rPr b="1" lang="en-US" sz="2600" spc="-1" strike="noStrike">
+                <a:solidFill>
+                  <a:srgbClr val="1c1c1c"/>
+                </a:solidFill>
+                <a:latin typeface="Source Sans Pro Semibold"/>
+              </a:rPr>
+              <a:t>1. Tambahkan label dan input sesuai gambar petunjuk – Sisa</a:t>
+            </a:r>
+            <a:endParaRPr b="1" lang="en-US" sz="2600" spc="-1" strike="noStrike">
+              <a:solidFill>
+                <a:srgbClr val="1c1c1c"/>
+              </a:solidFill>
+              <a:latin typeface="Source Sans Pro Semibold"/>
+            </a:endParaRPr>
+          </a:p>
+          <a:p>
+            <a:pPr>
+              <a:spcAft>
+                <a:spcPts val="1142"/>
+              </a:spcAft>
+            </a:pPr>
+            <a:r>
+              <a:rPr b="1" lang="en-US" sz="2600" spc="-1" strike="noStrike">
+                <a:solidFill>
+                  <a:srgbClr val="1c1c1c"/>
+                </a:solidFill>
+                <a:latin typeface="Source Sans Pro Semibold"/>
+              </a:rPr>
+              <a:t> </a:t>
+            </a:r>
+            <a:endParaRPr b="1" lang="en-US" sz="2600" spc="-1" strike="noStrike">
+              <a:solidFill>
+                <a:srgbClr val="1c1c1c"/>
+              </a:solidFill>
+              <a:latin typeface="Source Sans Pro Semibold"/>
+            </a:endParaRPr>
+          </a:p>
+          <a:p>
+            <a:pPr>
+              <a:spcAft>
+                <a:spcPts val="1142"/>
+              </a:spcAft>
+            </a:pPr>
+            <a:r>
+              <a:rPr b="1" lang="en-US" sz="2600" spc="-1" strike="noStrike">
+                <a:solidFill>
+                  <a:srgbClr val="1c1c1c"/>
+                </a:solidFill>
+                <a:latin typeface="Source Sans Pro Semibold"/>
+              </a:rPr>
+              <a:t>2. </a:t>
+            </a:r>
+            <a:endParaRPr b="1" lang="en-US" sz="2600" spc="-1" strike="noStrike">
+              <a:solidFill>
+                <a:srgbClr val="1c1c1c"/>
+              </a:solidFill>
+              <a:latin typeface="Source Sans Pro Semibold"/>
+            </a:endParaRPr>
+          </a:p>
+          <a:p>
+            <a:pPr>
+              <a:spcAft>
+                <a:spcPts val="1142"/>
+              </a:spcAft>
+            </a:pPr>
+            <a:r>
+              <a:rPr b="1" lang="en-US" sz="1500" spc="-1" strike="noStrike">
+                <a:solidFill>
+                  <a:srgbClr val="1c1c1c"/>
+                </a:solidFill>
+                <a:latin typeface="Source Sans Pro Semibold"/>
+              </a:rPr>
+              <a:t>&lt;div class="form-group"&gt;</a:t>
+            </a:r>
+            <a:endParaRPr b="1" lang="en-US" sz="1500" spc="-1" strike="noStrike">
+              <a:solidFill>
+                <a:srgbClr val="1c1c1c"/>
+              </a:solidFill>
+              <a:latin typeface="Source Sans Pro Semibold"/>
+            </a:endParaRPr>
+          </a:p>
+          <a:p>
+            <a:pPr>
+              <a:spcAft>
+                <a:spcPts val="1142"/>
+              </a:spcAft>
+            </a:pPr>
+            <a:r>
+              <a:rPr b="1" lang="en-US" sz="1500" spc="-1" strike="noStrike">
+                <a:solidFill>
+                  <a:srgbClr val="1c1c1c"/>
+                </a:solidFill>
+                <a:latin typeface="Source Sans Pro Semibold"/>
+              </a:rPr>
+              <a:t>    </a:t>
+            </a:r>
+            <a:r>
+              <a:rPr b="1" lang="en-US" sz="1500" spc="-1" strike="noStrike">
+                <a:solidFill>
+                  <a:srgbClr val="1c1c1c"/>
+                </a:solidFill>
+                <a:latin typeface="Source Sans Pro Semibold"/>
+              </a:rPr>
+              <a:t>&lt;label for="namakasir" class="col-sm-2 control-label"&gt;Nama Kasir&lt;/label&gt;</a:t>
+            </a:r>
+            <a:endParaRPr b="1" lang="en-US" sz="1500" spc="-1" strike="noStrike">
+              <a:solidFill>
+                <a:srgbClr val="1c1c1c"/>
+              </a:solidFill>
+              <a:latin typeface="Source Sans Pro Semibold"/>
+            </a:endParaRPr>
+          </a:p>
+          <a:p>
+            <a:pPr>
+              <a:spcAft>
+                <a:spcPts val="1142"/>
+              </a:spcAft>
+            </a:pPr>
+            <a:r>
+              <a:rPr b="1" lang="en-US" sz="1500" spc="-1" strike="noStrike">
+                <a:solidFill>
+                  <a:srgbClr val="1c1c1c"/>
+                </a:solidFill>
+                <a:latin typeface="Source Sans Pro Semibold"/>
+              </a:rPr>
+              <a:t>    </a:t>
+            </a:r>
+            <a:r>
+              <a:rPr b="1" lang="en-US" sz="1500" spc="-1" strike="noStrike">
+                <a:solidFill>
+                  <a:srgbClr val="1c1c1c"/>
+                </a:solidFill>
+                <a:latin typeface="Source Sans Pro Semibold"/>
+              </a:rPr>
+              <a:t>&lt;div class="col-sm-10"&gt;</a:t>
+            </a:r>
+            <a:endParaRPr b="1" lang="en-US" sz="1500" spc="-1" strike="noStrike">
+              <a:solidFill>
+                <a:srgbClr val="1c1c1c"/>
+              </a:solidFill>
+              <a:latin typeface="Source Sans Pro Semibold"/>
+            </a:endParaRPr>
+          </a:p>
+          <a:p>
+            <a:pPr>
+              <a:spcAft>
+                <a:spcPts val="1142"/>
+              </a:spcAft>
+            </a:pPr>
+            <a:r>
+              <a:rPr b="1" lang="en-US" sz="1500" spc="-1" strike="noStrike">
+                <a:solidFill>
+                  <a:srgbClr val="1c1c1c"/>
+                </a:solidFill>
+                <a:latin typeface="Source Sans Pro Semibold"/>
+              </a:rPr>
+              <a:t>      </a:t>
+            </a:r>
+            <a:r>
+              <a:rPr b="1" lang="en-US" sz="1500" spc="-1" strike="noStrike">
+                <a:solidFill>
+                  <a:srgbClr val="1c1c1c"/>
+                </a:solidFill>
+                <a:latin typeface="Source Sans Pro Semibold"/>
+              </a:rPr>
+              <a:t>&lt;input type="text" class="form-control" id="idnamakasir" placeholder="Nama Kasir"&gt;</a:t>
+            </a:r>
+            <a:endParaRPr b="1" lang="en-US" sz="1500" spc="-1" strike="noStrike">
+              <a:solidFill>
+                <a:srgbClr val="1c1c1c"/>
+              </a:solidFill>
+              <a:latin typeface="Source Sans Pro Semibold"/>
+            </a:endParaRPr>
+          </a:p>
+          <a:p>
+            <a:pPr>
+              <a:spcAft>
+                <a:spcPts val="1142"/>
+              </a:spcAft>
+            </a:pPr>
+            <a:r>
+              <a:rPr b="1" lang="en-US" sz="1500" spc="-1" strike="noStrike">
+                <a:solidFill>
+                  <a:srgbClr val="1c1c1c"/>
+                </a:solidFill>
+                <a:latin typeface="Source Sans Pro Semibold"/>
+              </a:rPr>
+              <a:t>    </a:t>
+            </a:r>
+            <a:r>
+              <a:rPr b="1" lang="en-US" sz="1500" spc="-1" strike="noStrike">
+                <a:solidFill>
+                  <a:srgbClr val="1c1c1c"/>
+                </a:solidFill>
+                <a:latin typeface="Source Sans Pro Semibold"/>
+              </a:rPr>
+              <a:t>&lt;/div&gt;</a:t>
+            </a:r>
+            <a:endParaRPr b="1" lang="en-US" sz="1500" spc="-1" strike="noStrike">
+              <a:solidFill>
+                <a:srgbClr val="1c1c1c"/>
+              </a:solidFill>
+              <a:latin typeface="Source Sans Pro Semibold"/>
+            </a:endParaRPr>
+          </a:p>
+          <a:p>
+            <a:pPr>
+              <a:spcAft>
+                <a:spcPts val="1142"/>
+              </a:spcAft>
+            </a:pPr>
+            <a:r>
+              <a:rPr b="1" lang="en-US" sz="1500" spc="-1" strike="noStrike">
+                <a:solidFill>
+                  <a:srgbClr val="1c1c1c"/>
+                </a:solidFill>
+                <a:latin typeface="Source Sans Pro Semibold"/>
+              </a:rPr>
+              <a:t>  </a:t>
+            </a:r>
+            <a:r>
+              <a:rPr b="1" lang="en-US" sz="1500" spc="-1" strike="noStrike">
+                <a:solidFill>
+                  <a:srgbClr val="1c1c1c"/>
+                </a:solidFill>
+                <a:latin typeface="Source Sans Pro Semibold"/>
+              </a:rPr>
+              <a:t>&lt;/div&gt;</a:t>
+            </a:r>
+            <a:endParaRPr b="1" lang="en-US" sz="1500" spc="-1" strike="noStrike">
+              <a:solidFill>
+                <a:srgbClr val="1c1c1c"/>
+              </a:solidFill>
+              <a:latin typeface="Source Sans Pro Semibold"/>
+            </a:endParaRPr>
+          </a:p>
+          <a:p>
+            <a:pPr>
+              <a:spcAft>
+                <a:spcPts val="1142"/>
+              </a:spcAft>
+            </a:pPr>
+            <a:r>
+              <a:rPr b="1" lang="en-US" sz="2600" spc="-1" strike="noStrike">
+                <a:solidFill>
+                  <a:srgbClr val="1c1c1c"/>
+                </a:solidFill>
+                <a:latin typeface="Source Sans Pro Semibold"/>
+              </a:rPr>
+              <a:t> </a:t>
+            </a:r>
+            <a:endParaRPr b="1" lang="en-US" sz="2600" spc="-1" strike="noStrike">
+              <a:solidFill>
+                <a:srgbClr val="1c1c1c"/>
+              </a:solidFill>
+              <a:latin typeface="Source Sans Pro Semibold"/>
+            </a:endParaRPr>
+          </a:p>
+        </p:txBody>
+      </p:sp>
+      <p:pic>
+        <p:nvPicPr>
+          <p:cNvPr id="140" name="" descr=""/>
+          <p:cNvPicPr/>
+          <p:nvPr/>
+        </p:nvPicPr>
+        <p:blipFill>
+          <a:blip r:embed="rId1"/>
+          <a:stretch/>
+        </p:blipFill>
+        <p:spPr>
+          <a:xfrm>
+            <a:off x="2188440" y="2861640"/>
+            <a:ext cx="6681240" cy="613080"/>
+          </a:xfrm>
+          <a:prstGeom prst="rect">
+            <a:avLst/>
+          </a:prstGeom>
+          <a:ln>
+            <a:noFill/>
+          </a:ln>
+        </p:spPr>
+      </p:pic>
+    </p:spTree>
+  </p:cSld>
+</p:sld>
+</file>
+
+<file path=ppt/slides/slide22.xml><?xml version="1.0" encoding="utf-8"?>
+<p:sld xmlns:a="http://schemas.openxmlformats.org/drawingml/2006/main" xmlns:p="http://schemas.openxmlformats.org/presentationml/2006/main" xmlns:r="http://schemas.openxmlformats.org/officeDocument/2006/relationships" xmlns:p14="http://schemas.microsoft.com/office/powerpoint/2010/main" xmlns:p15="http://schemas.microsoft.com/office/powerpoint/2012/main" xmlns:mc="http://schemas.openxmlformats.org/markup-compatibility/2006">
+  <p:cSld>
+    <p:spTree>
+      <p:nvGrpSpPr>
+        <p:cNvPr id="1" name=""/>
+        <p:cNvGrpSpPr/>
+        <p:nvPr/>
+      </p:nvGrpSpPr>
+      <p:grpSpPr>
+        <a:xfrm>
+          <a:off x="0" y="0"/>
+          <a:ext cx="0" cy="0"/>
+          <a:chOff x="0" y="0"/>
+          <a:chExt cx="0" cy="0"/>
+        </a:xfrm>
+      </p:grpSpPr>
+      <p:sp>
+        <p:nvSpPr>
+          <p:cNvPr id="141" name="TextShape 1"/>
+          <p:cNvSpPr txBox="1"/>
+          <p:nvPr/>
+        </p:nvSpPr>
+        <p:spPr>
+          <a:xfrm>
+            <a:off x="360000" y="360000"/>
+            <a:ext cx="9360000" cy="900000"/>
+          </a:xfrm>
+          <a:prstGeom prst="rect">
+            <a:avLst/>
+          </a:prstGeom>
+          <a:noFill/>
+          <a:ln>
+            <a:noFill/>
+          </a:ln>
+        </p:spPr>
+        <p:txBody>
+          <a:bodyPr lIns="0" rIns="0" tIns="0" bIns="0" anchor="b"/>
+          <a:p>
+            <a:r>
+              <a:rPr b="1" lang="en-US" sz="3200" spc="-1" strike="noStrike">
+                <a:solidFill>
+                  <a:srgbClr val="ffffff"/>
+                </a:solidFill>
+                <a:latin typeface="Source Sans Pro Black"/>
+              </a:rPr>
+              <a:t>View Section B</a:t>
+            </a:r>
+            <a:endParaRPr b="1" lang="en-US" sz="3200" spc="-1" strike="noStrike">
+              <a:solidFill>
+                <a:srgbClr val="ffffff"/>
+              </a:solidFill>
+              <a:latin typeface="Source Sans Pro Black"/>
+            </a:endParaRPr>
+          </a:p>
+        </p:txBody>
+      </p:sp>
+      <p:sp>
+        <p:nvSpPr>
+          <p:cNvPr id="142" name="TextShape 2"/>
+          <p:cNvSpPr txBox="1"/>
+          <p:nvPr/>
+        </p:nvSpPr>
+        <p:spPr>
+          <a:xfrm>
+            <a:off x="360000" y="1980000"/>
+            <a:ext cx="9180000" cy="4680000"/>
+          </a:xfrm>
+          <a:prstGeom prst="rect">
+            <a:avLst/>
+          </a:prstGeom>
+          <a:noFill/>
+          <a:ln>
+            <a:noFill/>
+          </a:ln>
+        </p:spPr>
+        <p:txBody>
+          <a:bodyPr lIns="0" rIns="0" tIns="0" bIns="0">
+            <a:normAutofit/>
+          </a:bodyPr>
+          <a:p>
+            <a:pPr>
+              <a:spcAft>
+                <a:spcPts val="1142"/>
+              </a:spcAft>
+            </a:pPr>
+            <a:r>
+              <a:rPr b="1" lang="en-US" sz="2600" spc="-1" strike="noStrike">
+                <a:solidFill>
+                  <a:srgbClr val="1c1c1c"/>
+                </a:solidFill>
+                <a:latin typeface="Source Sans Pro Semibold"/>
+              </a:rPr>
+              <a:t>1. Tambahkan tag button dengan label Submit sesuai gambar </a:t>
+            </a:r>
+            <a:endParaRPr b="1" lang="en-US" sz="2600" spc="-1" strike="noStrike">
+              <a:solidFill>
+                <a:srgbClr val="1c1c1c"/>
+              </a:solidFill>
+              <a:latin typeface="Source Sans Pro Semibold"/>
+            </a:endParaRPr>
+          </a:p>
+        </p:txBody>
+      </p:sp>
+      <p:pic>
+        <p:nvPicPr>
+          <p:cNvPr id="143" name="" descr=""/>
+          <p:cNvPicPr/>
+          <p:nvPr/>
+        </p:nvPicPr>
+        <p:blipFill>
+          <a:blip r:embed="rId1"/>
+          <a:stretch/>
+        </p:blipFill>
+        <p:spPr>
+          <a:xfrm>
+            <a:off x="4020480" y="2703600"/>
+            <a:ext cx="2106000" cy="771120"/>
+          </a:xfrm>
+          <a:prstGeom prst="rect">
+            <a:avLst/>
+          </a:prstGeom>
+          <a:ln>
+            <a:noFill/>
+          </a:ln>
+        </p:spPr>
+      </p:pic>
+    </p:spTree>
+  </p:cSld>
+</p:sld>
+</file>
+
+<file path=ppt/slides/slide23.xml><?xml version="1.0" encoding="utf-8"?>
+<p:sld xmlns:a="http://schemas.openxmlformats.org/drawingml/2006/main" xmlns:p="http://schemas.openxmlformats.org/presentationml/2006/main" xmlns:r="http://schemas.openxmlformats.org/officeDocument/2006/relationships" xmlns:p14="http://schemas.microsoft.com/office/powerpoint/2010/main" xmlns:p15="http://schemas.microsoft.com/office/powerpoint/2012/main" xmlns:mc="http://schemas.openxmlformats.org/markup-compatibility/2006">
+  <p:cSld>
+    <p:spTree>
+      <p:nvGrpSpPr>
+        <p:cNvPr id="1" name=""/>
+        <p:cNvGrpSpPr/>
+        <p:nvPr/>
+      </p:nvGrpSpPr>
+      <p:grpSpPr>
+        <a:xfrm>
+          <a:off x="0" y="0"/>
+          <a:ext cx="0" cy="0"/>
+          <a:chOff x="0" y="0"/>
+          <a:chExt cx="0" cy="0"/>
+        </a:xfrm>
+      </p:grpSpPr>
+      <p:sp>
+        <p:nvSpPr>
+          <p:cNvPr id="144" name="TextShape 1"/>
+          <p:cNvSpPr txBox="1"/>
+          <p:nvPr/>
+        </p:nvSpPr>
+        <p:spPr>
+          <a:xfrm>
+            <a:off x="360000" y="360000"/>
+            <a:ext cx="9360000" cy="900000"/>
+          </a:xfrm>
+          <a:prstGeom prst="rect">
+            <a:avLst/>
+          </a:prstGeom>
+          <a:noFill/>
+          <a:ln>
+            <a:noFill/>
+          </a:ln>
+        </p:spPr>
+        <p:txBody>
+          <a:bodyPr lIns="0" rIns="0" tIns="0" bIns="0" anchor="b"/>
+          <a:p>
+            <a:endParaRPr b="1" lang="en-US" sz="3200" spc="-1" strike="noStrike">
+              <a:solidFill>
+                <a:srgbClr val="ffffff"/>
+              </a:solidFill>
+              <a:latin typeface="Source Sans Pro Black"/>
+            </a:endParaRPr>
+          </a:p>
+        </p:txBody>
+      </p:sp>
+      <p:sp>
+        <p:nvSpPr>
+          <p:cNvPr id="145" name="TextShape 2"/>
+          <p:cNvSpPr txBox="1"/>
+          <p:nvPr/>
+        </p:nvSpPr>
+        <p:spPr>
+          <a:xfrm>
+            <a:off x="360000" y="1980000"/>
+            <a:ext cx="9180000" cy="4680000"/>
+          </a:xfrm>
+          <a:prstGeom prst="rect">
+            <a:avLst/>
+          </a:prstGeom>
+          <a:noFill/>
+          <a:ln>
+            <a:noFill/>
+          </a:ln>
+        </p:spPr>
+        <p:txBody>
+          <a:bodyPr lIns="0" rIns="0" tIns="0" bIns="0">
+            <a:normAutofit/>
+          </a:bodyPr>
+          <a:p>
+            <a:endParaRPr b="1" lang="en-US" sz="2600" spc="-1" strike="noStrike">
+              <a:solidFill>
+                <a:srgbClr val="1c1c1c"/>
+              </a:solidFill>
+              <a:latin typeface="Source Sans Pro Semibold"/>
+            </a:endParaRPr>
+          </a:p>
+        </p:txBody>
+      </p:sp>
+    </p:spTree>
+  </p:cSld>
+</p:sld>
+</file>
+
+<file path=ppt/slides/slide24.xml><?xml version="1.0" encoding="utf-8"?>
+<p:sld xmlns:a="http://schemas.openxmlformats.org/drawingml/2006/main" xmlns:p="http://schemas.openxmlformats.org/presentationml/2006/main" xmlns:r="http://schemas.openxmlformats.org/officeDocument/2006/relationships" xmlns:p14="http://schemas.microsoft.com/office/powerpoint/2010/main" xmlns:p15="http://schemas.microsoft.com/office/powerpoint/2012/main" xmlns:mc="http://schemas.openxmlformats.org/markup-compatibility/2006">
+  <p:cSld>
+    <p:spTree>
+      <p:nvGrpSpPr>
+        <p:cNvPr id="1" name=""/>
+        <p:cNvGrpSpPr/>
+        <p:nvPr/>
+      </p:nvGrpSpPr>
+      <p:grpSpPr>
+        <a:xfrm>
+          <a:off x="0" y="0"/>
+          <a:ext cx="0" cy="0"/>
+          <a:chOff x="0" y="0"/>
+          <a:chExt cx="0" cy="0"/>
+        </a:xfrm>
+      </p:grpSpPr>
+      <p:sp>
+        <p:nvSpPr>
+          <p:cNvPr id="146" name="TextShape 1"/>
+          <p:cNvSpPr txBox="1"/>
+          <p:nvPr/>
+        </p:nvSpPr>
+        <p:spPr>
+          <a:xfrm>
+            <a:off x="360000" y="360000"/>
+            <a:ext cx="9360000" cy="900000"/>
+          </a:xfrm>
+          <a:prstGeom prst="rect">
+            <a:avLst/>
+          </a:prstGeom>
+          <a:noFill/>
+          <a:ln>
+            <a:noFill/>
+          </a:ln>
+        </p:spPr>
+        <p:txBody>
+          <a:bodyPr lIns="0" rIns="0" tIns="0" bIns="0" anchor="b"/>
+          <a:p>
+            <a:endParaRPr b="1" lang="en-US" sz="3200" spc="-1" strike="noStrike">
+              <a:solidFill>
+                <a:srgbClr val="ffffff"/>
+              </a:solidFill>
+              <a:latin typeface="Source Sans Pro Black"/>
+            </a:endParaRPr>
+          </a:p>
+        </p:txBody>
+      </p:sp>
+      <p:sp>
+        <p:nvSpPr>
+          <p:cNvPr id="147" name="TextShape 2"/>
+          <p:cNvSpPr txBox="1"/>
+          <p:nvPr/>
+        </p:nvSpPr>
+        <p:spPr>
+          <a:xfrm>
+            <a:off x="360000" y="1980000"/>
+            <a:ext cx="9180000" cy="4680000"/>
+          </a:xfrm>
+          <a:prstGeom prst="rect">
+            <a:avLst/>
+          </a:prstGeom>
+          <a:noFill/>
+          <a:ln>
+            <a:noFill/>
+          </a:ln>
+        </p:spPr>
+        <p:txBody>
+          <a:bodyPr lIns="0" rIns="0" tIns="0" bIns="0">
+            <a:normAutofit/>
+          </a:bodyPr>
+          <a:p>
+            <a:endParaRPr b="1" lang="en-US" sz="2600" spc="-1" strike="noStrike">
+              <a:solidFill>
+                <a:srgbClr val="1c1c1c"/>
+              </a:solidFill>
+              <a:latin typeface="Source Sans Pro Semibold"/>
+            </a:endParaRPr>
+          </a:p>
+        </p:txBody>
+      </p:sp>
+    </p:spTree>
+  </p:cSld>
 </p:sld>
 </file>
 

</xml_diff>